<commit_message>
Python arithmetics and numbers.
</commit_message>
<xml_diff>
--- a/src/images.pptx
+++ b/src/images.pptx
@@ -12,6 +12,9 @@
     <p:sldId id="258" r:id="rId6"/>
     <p:sldId id="257" r:id="rId7"/>
     <p:sldId id="259" r:id="rId8"/>
+    <p:sldId id="263" r:id="rId9"/>
+    <p:sldId id="264" r:id="rId10"/>
+    <p:sldId id="265" r:id="rId11"/>
   </p:sldIdLst>
   <p:sldSz cx="12192000" cy="6858000"/>
   <p:notesSz cx="6858000" cy="9144000"/>
@@ -267,7 +270,7 @@
           <a:p>
             <a:fld id="{35C3687D-91A5-7C4D-919D-428BCA0C637B}" type="datetimeFigureOut">
               <a:rPr lang="fr-CA" smtClean="0"/>
-              <a:t>2021-03-09</a:t>
+              <a:t>2022-05-02</a:t>
             </a:fld>
             <a:endParaRPr lang="fr-CA"/>
           </a:p>
@@ -467,7 +470,7 @@
           <a:p>
             <a:fld id="{35C3687D-91A5-7C4D-919D-428BCA0C637B}" type="datetimeFigureOut">
               <a:rPr lang="fr-CA" smtClean="0"/>
-              <a:t>2021-03-09</a:t>
+              <a:t>2022-05-02</a:t>
             </a:fld>
             <a:endParaRPr lang="fr-CA"/>
           </a:p>
@@ -677,7 +680,7 @@
           <a:p>
             <a:fld id="{35C3687D-91A5-7C4D-919D-428BCA0C637B}" type="datetimeFigureOut">
               <a:rPr lang="fr-CA" smtClean="0"/>
-              <a:t>2021-03-09</a:t>
+              <a:t>2022-05-02</a:t>
             </a:fld>
             <a:endParaRPr lang="fr-CA"/>
           </a:p>
@@ -877,7 +880,7 @@
           <a:p>
             <a:fld id="{35C3687D-91A5-7C4D-919D-428BCA0C637B}" type="datetimeFigureOut">
               <a:rPr lang="fr-CA" smtClean="0"/>
-              <a:t>2021-03-09</a:t>
+              <a:t>2022-05-02</a:t>
             </a:fld>
             <a:endParaRPr lang="fr-CA"/>
           </a:p>
@@ -1153,7 +1156,7 @@
           <a:p>
             <a:fld id="{35C3687D-91A5-7C4D-919D-428BCA0C637B}" type="datetimeFigureOut">
               <a:rPr lang="fr-CA" smtClean="0"/>
-              <a:t>2021-03-09</a:t>
+              <a:t>2022-05-02</a:t>
             </a:fld>
             <a:endParaRPr lang="fr-CA"/>
           </a:p>
@@ -1421,7 +1424,7 @@
           <a:p>
             <a:fld id="{35C3687D-91A5-7C4D-919D-428BCA0C637B}" type="datetimeFigureOut">
               <a:rPr lang="fr-CA" smtClean="0"/>
-              <a:t>2021-03-09</a:t>
+              <a:t>2022-05-02</a:t>
             </a:fld>
             <a:endParaRPr lang="fr-CA"/>
           </a:p>
@@ -1836,7 +1839,7 @@
           <a:p>
             <a:fld id="{35C3687D-91A5-7C4D-919D-428BCA0C637B}" type="datetimeFigureOut">
               <a:rPr lang="fr-CA" smtClean="0"/>
-              <a:t>2021-03-09</a:t>
+              <a:t>2022-05-02</a:t>
             </a:fld>
             <a:endParaRPr lang="fr-CA"/>
           </a:p>
@@ -1978,7 +1981,7 @@
           <a:p>
             <a:fld id="{35C3687D-91A5-7C4D-919D-428BCA0C637B}" type="datetimeFigureOut">
               <a:rPr lang="fr-CA" smtClean="0"/>
-              <a:t>2021-03-09</a:t>
+              <a:t>2022-05-02</a:t>
             </a:fld>
             <a:endParaRPr lang="fr-CA"/>
           </a:p>
@@ -2091,7 +2094,7 @@
           <a:p>
             <a:fld id="{35C3687D-91A5-7C4D-919D-428BCA0C637B}" type="datetimeFigureOut">
               <a:rPr lang="fr-CA" smtClean="0"/>
-              <a:t>2021-03-09</a:t>
+              <a:t>2022-05-02</a:t>
             </a:fld>
             <a:endParaRPr lang="fr-CA"/>
           </a:p>
@@ -2404,7 +2407,7 @@
           <a:p>
             <a:fld id="{35C3687D-91A5-7C4D-919D-428BCA0C637B}" type="datetimeFigureOut">
               <a:rPr lang="fr-CA" smtClean="0"/>
-              <a:t>2021-03-09</a:t>
+              <a:t>2022-05-02</a:t>
             </a:fld>
             <a:endParaRPr lang="fr-CA"/>
           </a:p>
@@ -2693,7 +2696,7 @@
           <a:p>
             <a:fld id="{35C3687D-91A5-7C4D-919D-428BCA0C637B}" type="datetimeFigureOut">
               <a:rPr lang="fr-CA" smtClean="0"/>
-              <a:t>2021-03-09</a:t>
+              <a:t>2022-05-02</a:t>
             </a:fld>
             <a:endParaRPr lang="fr-CA"/>
           </a:p>
@@ -2936,7 +2939,7 @@
           <a:p>
             <a:fld id="{35C3687D-91A5-7C4D-919D-428BCA0C637B}" type="datetimeFigureOut">
               <a:rPr lang="fr-CA" smtClean="0"/>
-              <a:t>2021-03-09</a:t>
+              <a:t>2022-05-02</a:t>
             </a:fld>
             <a:endParaRPr lang="fr-CA"/>
           </a:p>
@@ -11327,6 +11330,507 @@
 </p:sld>
 </file>
 
+<file path=ppt/slides/slide10.xml><?xml version="1.0" encoding="utf-8"?>
+<p:sld xmlns:a="http://schemas.openxmlformats.org/drawingml/2006/main" xmlns:r="http://schemas.openxmlformats.org/officeDocument/2006/relationships" xmlns:p="http://schemas.openxmlformats.org/presentationml/2006/main">
+  <p:cSld>
+    <p:spTree>
+      <p:nvGrpSpPr>
+        <p:cNvPr id="1" name=""/>
+        <p:cNvGrpSpPr/>
+        <p:nvPr/>
+      </p:nvGrpSpPr>
+      <p:grpSpPr>
+        <a:xfrm>
+          <a:off x="0" y="0"/>
+          <a:ext cx="0" cy="0"/>
+          <a:chOff x="0" y="0"/>
+          <a:chExt cx="0" cy="0"/>
+        </a:xfrm>
+      </p:grpSpPr>
+      <p:pic>
+        <p:nvPicPr>
+          <p:cNvPr id="2" name="Picture 1" descr="Shape&#10;&#10;Description automatically generated with medium confidence">
+            <a:extLst>
+              <a:ext uri="{FF2B5EF4-FFF2-40B4-BE49-F238E27FC236}">
+                <a16:creationId xmlns:a16="http://schemas.microsoft.com/office/drawing/2014/main" id="{49870F65-56C3-C19A-0E1A-CC31EE2D3A76}"/>
+              </a:ext>
+            </a:extLst>
+          </p:cNvPr>
+          <p:cNvPicPr>
+            <a:picLocks noChangeAspect="1"/>
+          </p:cNvPicPr>
+          <p:nvPr/>
+        </p:nvPicPr>
+        <p:blipFill>
+          <a:blip r:embed="rId2"/>
+          <a:stretch>
+            <a:fillRect/>
+          </a:stretch>
+        </p:blipFill>
+        <p:spPr>
+          <a:xfrm flipH="1">
+            <a:off x="6392599" y="2057400"/>
+            <a:ext cx="537391" cy="679597"/>
+          </a:xfrm>
+          <a:prstGeom prst="rect">
+            <a:avLst/>
+          </a:prstGeom>
+        </p:spPr>
+      </p:pic>
+      <p:pic>
+        <p:nvPicPr>
+          <p:cNvPr id="3" name="Picture 2" descr="Shape&#10;&#10;Description automatically generated with medium confidence">
+            <a:extLst>
+              <a:ext uri="{FF2B5EF4-FFF2-40B4-BE49-F238E27FC236}">
+                <a16:creationId xmlns:a16="http://schemas.microsoft.com/office/drawing/2014/main" id="{42A88B15-BB3F-BA68-F77A-FBEEFCC6746A}"/>
+              </a:ext>
+            </a:extLst>
+          </p:cNvPr>
+          <p:cNvPicPr>
+            <a:picLocks noChangeAspect="1"/>
+          </p:cNvPicPr>
+          <p:nvPr/>
+        </p:nvPicPr>
+        <p:blipFill>
+          <a:blip r:embed="rId2"/>
+          <a:stretch>
+            <a:fillRect/>
+          </a:stretch>
+        </p:blipFill>
+        <p:spPr>
+          <a:xfrm flipH="1">
+            <a:off x="4390883" y="3089201"/>
+            <a:ext cx="537391" cy="679597"/>
+          </a:xfrm>
+          <a:prstGeom prst="rect">
+            <a:avLst/>
+          </a:prstGeom>
+        </p:spPr>
+      </p:pic>
+      <p:cxnSp>
+        <p:nvCxnSpPr>
+          <p:cNvPr id="5" name="Straight Arrow Connector 4">
+            <a:extLst>
+              <a:ext uri="{FF2B5EF4-FFF2-40B4-BE49-F238E27FC236}">
+                <a16:creationId xmlns:a16="http://schemas.microsoft.com/office/drawing/2014/main" id="{822D2792-3F03-43B2-8DC9-99EB59B794CC}"/>
+              </a:ext>
+            </a:extLst>
+          </p:cNvPr>
+          <p:cNvCxnSpPr>
+            <a:stCxn id="3" idx="1"/>
+            <a:endCxn id="2" idx="2"/>
+          </p:cNvCxnSpPr>
+          <p:nvPr/>
+        </p:nvCxnSpPr>
+        <p:spPr>
+          <a:xfrm flipV="1">
+            <a:off x="4928274" y="2736997"/>
+            <a:ext cx="1733020" cy="692003"/>
+          </a:xfrm>
+          <a:prstGeom prst="straightConnector1">
+            <a:avLst/>
+          </a:prstGeom>
+          <a:ln>
+            <a:tailEnd type="triangle"/>
+          </a:ln>
+        </p:spPr>
+        <p:style>
+          <a:lnRef idx="1">
+            <a:schemeClr val="accent1"/>
+          </a:lnRef>
+          <a:fillRef idx="0">
+            <a:schemeClr val="accent1"/>
+          </a:fillRef>
+          <a:effectRef idx="0">
+            <a:schemeClr val="accent1"/>
+          </a:effectRef>
+          <a:fontRef idx="minor">
+            <a:schemeClr val="tx1"/>
+          </a:fontRef>
+        </p:style>
+      </p:cxnSp>
+      <p:cxnSp>
+        <p:nvCxnSpPr>
+          <p:cNvPr id="6" name="Straight Arrow Connector 5">
+            <a:extLst>
+              <a:ext uri="{FF2B5EF4-FFF2-40B4-BE49-F238E27FC236}">
+                <a16:creationId xmlns:a16="http://schemas.microsoft.com/office/drawing/2014/main" id="{13E8F079-058D-57DF-77A9-31DEE6BEEB65}"/>
+              </a:ext>
+            </a:extLst>
+          </p:cNvPr>
+          <p:cNvCxnSpPr>
+            <a:cxnSpLocks/>
+            <a:stCxn id="3" idx="1"/>
+          </p:cNvCxnSpPr>
+          <p:nvPr/>
+        </p:nvCxnSpPr>
+        <p:spPr>
+          <a:xfrm>
+            <a:off x="4928274" y="3429000"/>
+            <a:ext cx="1733020" cy="0"/>
+          </a:xfrm>
+          <a:prstGeom prst="straightConnector1">
+            <a:avLst/>
+          </a:prstGeom>
+          <a:ln>
+            <a:tailEnd type="triangle"/>
+          </a:ln>
+        </p:spPr>
+        <p:style>
+          <a:lnRef idx="2">
+            <a:schemeClr val="dk1"/>
+          </a:lnRef>
+          <a:fillRef idx="0">
+            <a:schemeClr val="dk1"/>
+          </a:fillRef>
+          <a:effectRef idx="1">
+            <a:schemeClr val="dk1"/>
+          </a:effectRef>
+          <a:fontRef idx="minor">
+            <a:schemeClr val="tx1"/>
+          </a:fontRef>
+        </p:style>
+      </p:cxnSp>
+      <p:cxnSp>
+        <p:nvCxnSpPr>
+          <p:cNvPr id="9" name="Straight Arrow Connector 8">
+            <a:extLst>
+              <a:ext uri="{FF2B5EF4-FFF2-40B4-BE49-F238E27FC236}">
+                <a16:creationId xmlns:a16="http://schemas.microsoft.com/office/drawing/2014/main" id="{281A1D31-BFBE-BD04-3893-8D0B26829FE4}"/>
+              </a:ext>
+            </a:extLst>
+          </p:cNvPr>
+          <p:cNvCxnSpPr>
+            <a:cxnSpLocks/>
+            <a:endCxn id="2" idx="2"/>
+          </p:cNvCxnSpPr>
+          <p:nvPr/>
+        </p:nvCxnSpPr>
+        <p:spPr>
+          <a:xfrm flipV="1">
+            <a:off x="6661294" y="2736997"/>
+            <a:ext cx="0" cy="692002"/>
+          </a:xfrm>
+          <a:prstGeom prst="straightConnector1">
+            <a:avLst/>
+          </a:prstGeom>
+          <a:ln>
+            <a:tailEnd type="triangle"/>
+          </a:ln>
+        </p:spPr>
+        <p:style>
+          <a:lnRef idx="2">
+            <a:schemeClr val="dk1"/>
+          </a:lnRef>
+          <a:fillRef idx="0">
+            <a:schemeClr val="dk1"/>
+          </a:fillRef>
+          <a:effectRef idx="1">
+            <a:schemeClr val="dk1"/>
+          </a:effectRef>
+          <a:fontRef idx="minor">
+            <a:schemeClr val="tx1"/>
+          </a:fontRef>
+        </p:style>
+      </p:cxnSp>
+      <mc:AlternateContent xmlns:mc="http://schemas.openxmlformats.org/markup-compatibility/2006">
+        <mc:Choice xmlns:a14="http://schemas.microsoft.com/office/drawing/2010/main" Requires="a14">
+          <p:sp>
+            <p:nvSpPr>
+              <p:cNvPr id="11" name="TextBox 10">
+                <a:extLst>
+                  <a:ext uri="{FF2B5EF4-FFF2-40B4-BE49-F238E27FC236}">
+                    <a16:creationId xmlns:a16="http://schemas.microsoft.com/office/drawing/2014/main" id="{8EBB2305-BCB1-E7B8-7C90-4266C3D917AF}"/>
+                  </a:ext>
+                </a:extLst>
+              </p:cNvPr>
+              <p:cNvSpPr txBox="1"/>
+              <p:nvPr/>
+            </p:nvSpPr>
+            <p:spPr>
+              <a:xfrm>
+                <a:off x="5671040" y="3367455"/>
+                <a:ext cx="367985" cy="369332"/>
+              </a:xfrm>
+              <a:prstGeom prst="rect">
+                <a:avLst/>
+              </a:prstGeom>
+              <a:noFill/>
+            </p:spPr>
+            <p:txBody>
+              <a:bodyPr wrap="none" rtlCol="0">
+                <a:spAutoFit/>
+              </a:bodyPr>
+              <a:lstStyle/>
+              <a:p>
+                <a14:m>
+                  <m:oMathPara xmlns:m="http://schemas.openxmlformats.org/officeDocument/2006/math">
+                    <m:oMathParaPr>
+                      <m:jc m:val="centerGroup"/>
+                    </m:oMathParaPr>
+                    <m:oMath xmlns:m="http://schemas.openxmlformats.org/officeDocument/2006/math">
+                      <m:r>
+                        <a:rPr lang="fr-FR" b="0" i="1" smtClean="0">
+                          <a:latin typeface="Cambria Math" panose="02040503050406030204" pitchFamily="18" charset="0"/>
+                        </a:rPr>
+                        <m:t>𝑥</m:t>
+                      </m:r>
+                    </m:oMath>
+                  </m:oMathPara>
+                </a14:m>
+                <a:endParaRPr lang="fr-CA" dirty="0"/>
+              </a:p>
+            </p:txBody>
+          </p:sp>
+        </mc:Choice>
+        <mc:Fallback>
+          <p:sp>
+            <p:nvSpPr>
+              <p:cNvPr id="11" name="TextBox 10">
+                <a:extLst>
+                  <a:ext uri="{FF2B5EF4-FFF2-40B4-BE49-F238E27FC236}">
+                    <a16:creationId xmlns:a16="http://schemas.microsoft.com/office/drawing/2014/main" id="{8EBB2305-BCB1-E7B8-7C90-4266C3D917AF}"/>
+                  </a:ext>
+                </a:extLst>
+              </p:cNvPr>
+              <p:cNvSpPr txBox="1">
+                <a:spLocks noRot="1" noChangeAspect="1" noMove="1" noResize="1" noEditPoints="1" noAdjustHandles="1" noChangeArrowheads="1" noChangeShapeType="1" noTextEdit="1"/>
+              </p:cNvSpPr>
+              <p:nvPr/>
+            </p:nvSpPr>
+            <p:spPr>
+              <a:xfrm>
+                <a:off x="5671040" y="3367455"/>
+                <a:ext cx="367985" cy="369332"/>
+              </a:xfrm>
+              <a:prstGeom prst="rect">
+                <a:avLst/>
+              </a:prstGeom>
+              <a:blipFill>
+                <a:blip r:embed="rId3"/>
+                <a:stretch>
+                  <a:fillRect/>
+                </a:stretch>
+              </a:blipFill>
+            </p:spPr>
+            <p:txBody>
+              <a:bodyPr/>
+              <a:lstStyle/>
+              <a:p>
+                <a:r>
+                  <a:rPr lang="fr-CA">
+                    <a:noFill/>
+                  </a:rPr>
+                  <a:t> </a:t>
+                </a:r>
+              </a:p>
+            </p:txBody>
+          </p:sp>
+        </mc:Fallback>
+      </mc:AlternateContent>
+      <mc:AlternateContent xmlns:mc="http://schemas.openxmlformats.org/markup-compatibility/2006">
+        <mc:Choice xmlns:a14="http://schemas.microsoft.com/office/drawing/2010/main" Requires="a14">
+          <p:sp>
+            <p:nvSpPr>
+              <p:cNvPr id="12" name="TextBox 11">
+                <a:extLst>
+                  <a:ext uri="{FF2B5EF4-FFF2-40B4-BE49-F238E27FC236}">
+                    <a16:creationId xmlns:a16="http://schemas.microsoft.com/office/drawing/2014/main" id="{17985C34-1A0E-E0DB-9CA2-1BC35A2F5C5D}"/>
+                  </a:ext>
+                </a:extLst>
+              </p:cNvPr>
+              <p:cNvSpPr txBox="1"/>
+              <p:nvPr/>
+            </p:nvSpPr>
+            <p:spPr>
+              <a:xfrm>
+                <a:off x="6653155" y="2898387"/>
+                <a:ext cx="367985" cy="369332"/>
+              </a:xfrm>
+              <a:prstGeom prst="rect">
+                <a:avLst/>
+              </a:prstGeom>
+              <a:noFill/>
+            </p:spPr>
+            <p:txBody>
+              <a:bodyPr wrap="none" rtlCol="0">
+                <a:spAutoFit/>
+              </a:bodyPr>
+              <a:lstStyle/>
+              <a:p>
+                <a14:m>
+                  <m:oMathPara xmlns:m="http://schemas.openxmlformats.org/officeDocument/2006/math">
+                    <m:oMathParaPr>
+                      <m:jc m:val="centerGroup"/>
+                    </m:oMathParaPr>
+                    <m:oMath xmlns:m="http://schemas.openxmlformats.org/officeDocument/2006/math">
+                      <m:r>
+                        <a:rPr lang="fr-FR" b="0" i="1" smtClean="0">
+                          <a:latin typeface="Cambria Math" panose="02040503050406030204" pitchFamily="18" charset="0"/>
+                        </a:rPr>
+                        <m:t>𝑦</m:t>
+                      </m:r>
+                    </m:oMath>
+                  </m:oMathPara>
+                </a14:m>
+                <a:endParaRPr lang="fr-CA" dirty="0"/>
+              </a:p>
+            </p:txBody>
+          </p:sp>
+        </mc:Choice>
+        <mc:Fallback>
+          <p:sp>
+            <p:nvSpPr>
+              <p:cNvPr id="12" name="TextBox 11">
+                <a:extLst>
+                  <a:ext uri="{FF2B5EF4-FFF2-40B4-BE49-F238E27FC236}">
+                    <a16:creationId xmlns:a16="http://schemas.microsoft.com/office/drawing/2014/main" id="{17985C34-1A0E-E0DB-9CA2-1BC35A2F5C5D}"/>
+                  </a:ext>
+                </a:extLst>
+              </p:cNvPr>
+              <p:cNvSpPr txBox="1">
+                <a:spLocks noRot="1" noChangeAspect="1" noMove="1" noResize="1" noEditPoints="1" noAdjustHandles="1" noChangeArrowheads="1" noChangeShapeType="1" noTextEdit="1"/>
+              </p:cNvSpPr>
+              <p:nvPr/>
+            </p:nvSpPr>
+            <p:spPr>
+              <a:xfrm>
+                <a:off x="6653155" y="2898387"/>
+                <a:ext cx="367985" cy="369332"/>
+              </a:xfrm>
+              <a:prstGeom prst="rect">
+                <a:avLst/>
+              </a:prstGeom>
+              <a:blipFill>
+                <a:blip r:embed="rId4"/>
+                <a:stretch>
+                  <a:fillRect b="-6667"/>
+                </a:stretch>
+              </a:blipFill>
+            </p:spPr>
+            <p:txBody>
+              <a:bodyPr/>
+              <a:lstStyle/>
+              <a:p>
+                <a:r>
+                  <a:rPr lang="fr-CA">
+                    <a:noFill/>
+                  </a:rPr>
+                  <a:t> </a:t>
+                </a:r>
+              </a:p>
+            </p:txBody>
+          </p:sp>
+        </mc:Fallback>
+      </mc:AlternateContent>
+      <mc:AlternateContent xmlns:mc="http://schemas.openxmlformats.org/markup-compatibility/2006">
+        <mc:Choice xmlns:a14="http://schemas.microsoft.com/office/drawing/2010/main" Requires="a14">
+          <p:sp>
+            <p:nvSpPr>
+              <p:cNvPr id="13" name="TextBox 12">
+                <a:extLst>
+                  <a:ext uri="{FF2B5EF4-FFF2-40B4-BE49-F238E27FC236}">
+                    <a16:creationId xmlns:a16="http://schemas.microsoft.com/office/drawing/2014/main" id="{D46CC948-1F84-9229-3E4B-BFA59511134A}"/>
+                  </a:ext>
+                </a:extLst>
+              </p:cNvPr>
+              <p:cNvSpPr txBox="1"/>
+              <p:nvPr/>
+            </p:nvSpPr>
+            <p:spPr>
+              <a:xfrm>
+                <a:off x="5524996" y="2722486"/>
+                <a:ext cx="377924" cy="369332"/>
+              </a:xfrm>
+              <a:prstGeom prst="rect">
+                <a:avLst/>
+              </a:prstGeom>
+              <a:noFill/>
+            </p:spPr>
+            <p:txBody>
+              <a:bodyPr wrap="none" rtlCol="0">
+                <a:spAutoFit/>
+              </a:bodyPr>
+              <a:lstStyle/>
+              <a:p>
+                <a14:m>
+                  <m:oMathPara xmlns:m="http://schemas.openxmlformats.org/officeDocument/2006/math">
+                    <m:oMathParaPr>
+                      <m:jc m:val="centerGroup"/>
+                    </m:oMathParaPr>
+                    <m:oMath xmlns:m="http://schemas.openxmlformats.org/officeDocument/2006/math">
+                      <m:r>
+                        <a:rPr lang="fr-FR" b="0" i="1" smtClean="0">
+                          <a:latin typeface="Cambria Math" panose="02040503050406030204" pitchFamily="18" charset="0"/>
+                        </a:rPr>
+                        <m:t>𝑑</m:t>
+                      </m:r>
+                    </m:oMath>
+                  </m:oMathPara>
+                </a14:m>
+                <a:endParaRPr lang="fr-CA" dirty="0"/>
+              </a:p>
+            </p:txBody>
+          </p:sp>
+        </mc:Choice>
+        <mc:Fallback>
+          <p:sp>
+            <p:nvSpPr>
+              <p:cNvPr id="13" name="TextBox 12">
+                <a:extLst>
+                  <a:ext uri="{FF2B5EF4-FFF2-40B4-BE49-F238E27FC236}">
+                    <a16:creationId xmlns:a16="http://schemas.microsoft.com/office/drawing/2014/main" id="{D46CC948-1F84-9229-3E4B-BFA59511134A}"/>
+                  </a:ext>
+                </a:extLst>
+              </p:cNvPr>
+              <p:cNvSpPr txBox="1">
+                <a:spLocks noRot="1" noChangeAspect="1" noMove="1" noResize="1" noEditPoints="1" noAdjustHandles="1" noChangeArrowheads="1" noChangeShapeType="1" noTextEdit="1"/>
+              </p:cNvSpPr>
+              <p:nvPr/>
+            </p:nvSpPr>
+            <p:spPr>
+              <a:xfrm>
+                <a:off x="5524996" y="2722486"/>
+                <a:ext cx="377924" cy="369332"/>
+              </a:xfrm>
+              <a:prstGeom prst="rect">
+                <a:avLst/>
+              </a:prstGeom>
+              <a:blipFill>
+                <a:blip r:embed="rId5"/>
+                <a:stretch>
+                  <a:fillRect/>
+                </a:stretch>
+              </a:blipFill>
+            </p:spPr>
+            <p:txBody>
+              <a:bodyPr/>
+              <a:lstStyle/>
+              <a:p>
+                <a:r>
+                  <a:rPr lang="fr-CA">
+                    <a:noFill/>
+                  </a:rPr>
+                  <a:t> </a:t>
+                </a:r>
+              </a:p>
+            </p:txBody>
+          </p:sp>
+        </mc:Fallback>
+      </mc:AlternateContent>
+    </p:spTree>
+    <p:extLst>
+      <p:ext uri="{BB962C8B-B14F-4D97-AF65-F5344CB8AC3E}">
+        <p14:creationId xmlns:p14="http://schemas.microsoft.com/office/powerpoint/2010/main" val="58764999"/>
+      </p:ext>
+    </p:extLst>
+  </p:cSld>
+  <p:clrMapOvr>
+    <a:masterClrMapping/>
+  </p:clrMapOvr>
+</p:sld>
+</file>
+
 <file path=ppt/slides/slide2.xml><?xml version="1.0" encoding="utf-8"?>
 <p:sld xmlns:a="http://schemas.openxmlformats.org/drawingml/2006/main" xmlns:r="http://schemas.openxmlformats.org/officeDocument/2006/relationships" xmlns:p="http://schemas.openxmlformats.org/presentationml/2006/main">
   <p:cSld>
@@ -19095,8 +19599,8 @@
             </p:txBody>
           </p:sp>
         </p:grpSp>
-        <mc:AlternateContent xmlns:mc="http://schemas.openxmlformats.org/markup-compatibility/2006">
-          <mc:Choice xmlns:a14="http://schemas.microsoft.com/office/drawing/2010/main" Requires="a14">
+        <mc:AlternateContent xmlns:mc="http://schemas.openxmlformats.org/markup-compatibility/2006" xmlns:a14="http://schemas.microsoft.com/office/drawing/2010/main">
+          <mc:Choice Requires="a14">
             <p:sp>
               <p:nvSpPr>
                 <p:cNvPr id="26" name="TextBox 25">
@@ -19146,7 +19650,7 @@
               </p:txBody>
             </p:sp>
           </mc:Choice>
-          <mc:Fallback>
+          <mc:Fallback xmlns="">
             <p:sp>
               <p:nvSpPr>
                 <p:cNvPr id="26" name="TextBox 25">
@@ -19191,8 +19695,8 @@
             </p:sp>
           </mc:Fallback>
         </mc:AlternateContent>
-        <mc:AlternateContent xmlns:mc="http://schemas.openxmlformats.org/markup-compatibility/2006">
-          <mc:Choice xmlns:a14="http://schemas.microsoft.com/office/drawing/2010/main" Requires="a14">
+        <mc:AlternateContent xmlns:mc="http://schemas.openxmlformats.org/markup-compatibility/2006" xmlns:a14="http://schemas.microsoft.com/office/drawing/2010/main">
+          <mc:Choice Requires="a14">
             <p:sp>
               <p:nvSpPr>
                 <p:cNvPr id="28" name="TextBox 27">
@@ -19242,7 +19746,7 @@
               </p:txBody>
             </p:sp>
           </mc:Choice>
-          <mc:Fallback>
+          <mc:Fallback xmlns="">
             <p:sp>
               <p:nvSpPr>
                 <p:cNvPr id="28" name="TextBox 27">
@@ -19439,8 +19943,8 @@
             </a:fontRef>
           </p:style>
         </p:cxnSp>
-        <mc:AlternateContent xmlns:mc="http://schemas.openxmlformats.org/markup-compatibility/2006">
-          <mc:Choice xmlns:a14="http://schemas.microsoft.com/office/drawing/2010/main" Requires="a14">
+        <mc:AlternateContent xmlns:mc="http://schemas.openxmlformats.org/markup-compatibility/2006" xmlns:a14="http://schemas.microsoft.com/office/drawing/2010/main">
+          <mc:Choice Requires="a14">
             <p:sp>
               <p:nvSpPr>
                 <p:cNvPr id="42" name="TextBox 41">
@@ -19511,7 +20015,7 @@
               </p:txBody>
             </p:sp>
           </mc:Choice>
-          <mc:Fallback>
+          <mc:Fallback xmlns="">
             <p:sp>
               <p:nvSpPr>
                 <p:cNvPr id="42" name="TextBox 41">
@@ -19556,8 +20060,8 @@
             </p:sp>
           </mc:Fallback>
         </mc:AlternateContent>
-        <mc:AlternateContent xmlns:mc="http://schemas.openxmlformats.org/markup-compatibility/2006">
-          <mc:Choice xmlns:a14="http://schemas.microsoft.com/office/drawing/2010/main" Requires="a14">
+        <mc:AlternateContent xmlns:mc="http://schemas.openxmlformats.org/markup-compatibility/2006" xmlns:a14="http://schemas.microsoft.com/office/drawing/2010/main">
+          <mc:Choice Requires="a14">
             <p:sp>
               <p:nvSpPr>
                 <p:cNvPr id="43" name="TextBox 42">
@@ -19628,7 +20132,7 @@
               </p:txBody>
             </p:sp>
           </mc:Choice>
-          <mc:Fallback>
+          <mc:Fallback xmlns="">
             <p:sp>
               <p:nvSpPr>
                 <p:cNvPr id="43" name="TextBox 42">
@@ -19751,8 +20255,8 @@
             </a:p>
           </p:txBody>
         </p:sp>
-        <mc:AlternateContent xmlns:mc="http://schemas.openxmlformats.org/markup-compatibility/2006">
-          <mc:Choice xmlns:a14="http://schemas.microsoft.com/office/drawing/2010/main" Requires="a14">
+        <mc:AlternateContent xmlns:mc="http://schemas.openxmlformats.org/markup-compatibility/2006" xmlns:a14="http://schemas.microsoft.com/office/drawing/2010/main">
+          <mc:Choice Requires="a14">
             <p:sp>
               <p:nvSpPr>
                 <p:cNvPr id="46" name="TextBox 45">
@@ -19829,7 +20333,7 @@
               </p:txBody>
             </p:sp>
           </mc:Choice>
-          <mc:Fallback>
+          <mc:Fallback xmlns="">
             <p:sp>
               <p:nvSpPr>
                 <p:cNvPr id="46" name="TextBox 45">
@@ -19874,8 +20378,8 @@
             </p:sp>
           </mc:Fallback>
         </mc:AlternateContent>
-        <mc:AlternateContent xmlns:mc="http://schemas.openxmlformats.org/markup-compatibility/2006">
-          <mc:Choice xmlns:a14="http://schemas.microsoft.com/office/drawing/2010/main" Requires="a14">
+        <mc:AlternateContent xmlns:mc="http://schemas.openxmlformats.org/markup-compatibility/2006" xmlns:a14="http://schemas.microsoft.com/office/drawing/2010/main">
+          <mc:Choice Requires="a14">
             <p:sp>
               <p:nvSpPr>
                 <p:cNvPr id="47" name="TextBox 46">
@@ -19946,7 +20450,7 @@
               </p:txBody>
             </p:sp>
           </mc:Choice>
-          <mc:Fallback>
+          <mc:Fallback xmlns="">
             <p:sp>
               <p:nvSpPr>
                 <p:cNvPr id="47" name="TextBox 46">
@@ -20536,7 +21040,6 @@
           </a:bodyPr>
           <a:lstStyle/>
           <a:p>
-            <a:pPr/>
             <a:r>
               <a:rPr lang="fr-CA" noProof="1"/>
               <a:t>30°</a:t>
@@ -20832,8 +21335,8 @@
           </a:p>
         </p:txBody>
       </p:sp>
-      <mc:AlternateContent xmlns:mc="http://schemas.openxmlformats.org/markup-compatibility/2006">
-        <mc:Choice xmlns:a14="http://schemas.microsoft.com/office/drawing/2010/main" Requires="a14">
+      <mc:AlternateContent xmlns:mc="http://schemas.openxmlformats.org/markup-compatibility/2006" xmlns:a14="http://schemas.microsoft.com/office/drawing/2010/main">
+        <mc:Choice Requires="a14">
           <p:sp>
             <p:nvSpPr>
               <p:cNvPr id="73" name="TextBox 72">
@@ -20862,7 +21365,6 @@
               </a:bodyPr>
               <a:lstStyle/>
               <a:p>
-                <a:pPr/>
                 <a:r>
                   <a:rPr lang="fr-FR" sz="1100" b="0" dirty="0"/>
                   <a:t>2 + 10</a:t>
@@ -20921,7 +21423,7 @@
             </p:txBody>
           </p:sp>
         </mc:Choice>
-        <mc:Fallback>
+        <mc:Fallback xmlns="">
           <p:sp>
             <p:nvSpPr>
               <p:cNvPr id="73" name="TextBox 72">
@@ -20966,8 +21468,8 @@
           </p:sp>
         </mc:Fallback>
       </mc:AlternateContent>
-      <mc:AlternateContent xmlns:mc="http://schemas.openxmlformats.org/markup-compatibility/2006">
-        <mc:Choice xmlns:a14="http://schemas.microsoft.com/office/drawing/2010/main" Requires="a14">
+      <mc:AlternateContent xmlns:mc="http://schemas.openxmlformats.org/markup-compatibility/2006" xmlns:a14="http://schemas.microsoft.com/office/drawing/2010/main">
+        <mc:Choice Requires="a14">
           <p:sp>
             <p:nvSpPr>
               <p:cNvPr id="74" name="TextBox 73">
@@ -20996,7 +21498,6 @@
               </a:bodyPr>
               <a:lstStyle/>
               <a:p>
-                <a:pPr/>
                 <a:r>
                   <a:rPr lang="fr-FR" sz="1100" b="0" dirty="0"/>
                   <a:t>10</a:t>
@@ -21016,19 +21517,7 @@
                       <a:rPr lang="fr-FR" sz="1100" b="0" i="1" smtClean="0">
                         <a:latin typeface="Cambria Math" panose="02040503050406030204" pitchFamily="18" charset="0"/>
                       </a:rPr>
-                      <m:t>⁡(</m:t>
-                    </m:r>
-                    <m:r>
-                      <a:rPr lang="fr-FR" sz="1100" b="0" i="1" smtClean="0">
-                        <a:latin typeface="Cambria Math" panose="02040503050406030204" pitchFamily="18" charset="0"/>
-                      </a:rPr>
-                      <m:t>30</m:t>
-                    </m:r>
-                    <m:r>
-                      <a:rPr lang="fr-FR" sz="1100" b="0" i="1" smtClean="0">
-                        <a:latin typeface="Cambria Math" panose="02040503050406030204" pitchFamily="18" charset="0"/>
-                      </a:rPr>
-                      <m:t>)</m:t>
+                      <m:t>⁡(30)</m:t>
                     </m:r>
                   </m:oMath>
                 </a14:m>
@@ -21037,7 +21526,7 @@
             </p:txBody>
           </p:sp>
         </mc:Choice>
-        <mc:Fallback>
+        <mc:Fallback xmlns="">
           <p:sp>
             <p:nvSpPr>
               <p:cNvPr id="74" name="TextBox 73">
@@ -32149,6 +32638,1531 @@
 </p:sld>
 </file>
 
+<file path=ppt/slides/slide8.xml><?xml version="1.0" encoding="utf-8"?>
+<p:sld xmlns:a="http://schemas.openxmlformats.org/drawingml/2006/main" xmlns:r="http://schemas.openxmlformats.org/officeDocument/2006/relationships" xmlns:p="http://schemas.openxmlformats.org/presentationml/2006/main">
+  <p:cSld>
+    <p:spTree>
+      <p:nvGrpSpPr>
+        <p:cNvPr id="1" name=""/>
+        <p:cNvGrpSpPr/>
+        <p:nvPr/>
+      </p:nvGrpSpPr>
+      <p:grpSpPr>
+        <a:xfrm>
+          <a:off x="0" y="0"/>
+          <a:ext cx="0" cy="0"/>
+          <a:chOff x="0" y="0"/>
+          <a:chExt cx="0" cy="0"/>
+        </a:xfrm>
+      </p:grpSpPr>
+      <p:pic>
+        <p:nvPicPr>
+          <p:cNvPr id="3" name="Picture 2" descr="Shape&#10;&#10;Description automatically generated with medium confidence">
+            <a:extLst>
+              <a:ext uri="{FF2B5EF4-FFF2-40B4-BE49-F238E27FC236}">
+                <a16:creationId xmlns:a16="http://schemas.microsoft.com/office/drawing/2014/main" id="{F96D446E-9B6B-2D11-C8A6-E76434C5C328}"/>
+              </a:ext>
+            </a:extLst>
+          </p:cNvPr>
+          <p:cNvPicPr>
+            <a:picLocks noChangeAspect="1"/>
+          </p:cNvPicPr>
+          <p:nvPr/>
+        </p:nvPicPr>
+        <p:blipFill>
+          <a:blip r:embed="rId2"/>
+          <a:stretch>
+            <a:fillRect/>
+          </a:stretch>
+        </p:blipFill>
+        <p:spPr>
+          <a:xfrm flipH="1">
+            <a:off x="3611805" y="1611336"/>
+            <a:ext cx="945744" cy="1196009"/>
+          </a:xfrm>
+          <a:prstGeom prst="rect">
+            <a:avLst/>
+          </a:prstGeom>
+        </p:spPr>
+      </p:pic>
+      <p:grpSp>
+        <p:nvGrpSpPr>
+          <p:cNvPr id="11" name="Group 10">
+            <a:extLst>
+              <a:ext uri="{FF2B5EF4-FFF2-40B4-BE49-F238E27FC236}">
+                <a16:creationId xmlns:a16="http://schemas.microsoft.com/office/drawing/2014/main" id="{A4400DEC-1C54-E8E8-F42C-3869C6DFB7D5}"/>
+              </a:ext>
+            </a:extLst>
+          </p:cNvPr>
+          <p:cNvGrpSpPr/>
+          <p:nvPr/>
+        </p:nvGrpSpPr>
+        <p:grpSpPr>
+          <a:xfrm>
+            <a:off x="2049518" y="1923393"/>
+            <a:ext cx="157655" cy="651641"/>
+            <a:chOff x="2711669" y="2165131"/>
+            <a:chExt cx="157655" cy="651641"/>
+          </a:xfrm>
+        </p:grpSpPr>
+        <p:sp>
+          <p:nvSpPr>
+            <p:cNvPr id="4" name="Rectangle 3">
+              <a:extLst>
+                <a:ext uri="{FF2B5EF4-FFF2-40B4-BE49-F238E27FC236}">
+                  <a16:creationId xmlns:a16="http://schemas.microsoft.com/office/drawing/2014/main" id="{DA97D74A-D36B-77AF-7612-5CFD6547BF2E}"/>
+                </a:ext>
+              </a:extLst>
+            </p:cNvPr>
+            <p:cNvSpPr/>
+            <p:nvPr/>
+          </p:nvSpPr>
+          <p:spPr>
+            <a:xfrm>
+              <a:off x="2711669" y="2165131"/>
+              <a:ext cx="157655" cy="185015"/>
+            </a:xfrm>
+            <a:prstGeom prst="rect">
+              <a:avLst/>
+            </a:prstGeom>
+          </p:spPr>
+          <p:style>
+            <a:lnRef idx="2">
+              <a:schemeClr val="dk1">
+                <a:shade val="50000"/>
+              </a:schemeClr>
+            </a:lnRef>
+            <a:fillRef idx="1">
+              <a:schemeClr val="dk1"/>
+            </a:fillRef>
+            <a:effectRef idx="0">
+              <a:schemeClr val="dk1"/>
+            </a:effectRef>
+            <a:fontRef idx="minor">
+              <a:schemeClr val="lt1"/>
+            </a:fontRef>
+          </p:style>
+          <p:txBody>
+            <a:bodyPr rtlCol="0" anchor="ctr"/>
+            <a:lstStyle/>
+            <a:p>
+              <a:pPr algn="ctr"/>
+              <a:endParaRPr lang="fr-CA"/>
+            </a:p>
+          </p:txBody>
+        </p:sp>
+        <p:cxnSp>
+          <p:nvCxnSpPr>
+            <p:cNvPr id="6" name="Straight Connector 5">
+              <a:extLst>
+                <a:ext uri="{FF2B5EF4-FFF2-40B4-BE49-F238E27FC236}">
+                  <a16:creationId xmlns:a16="http://schemas.microsoft.com/office/drawing/2014/main" id="{33132581-6681-930A-CDEB-EDD7E6C784B8}"/>
+                </a:ext>
+              </a:extLst>
+            </p:cNvPr>
+            <p:cNvCxnSpPr>
+              <a:stCxn id="4" idx="2"/>
+            </p:cNvCxnSpPr>
+            <p:nvPr/>
+          </p:nvCxnSpPr>
+          <p:spPr>
+            <a:xfrm flipH="1">
+              <a:off x="2711669" y="2350146"/>
+              <a:ext cx="78828" cy="466626"/>
+            </a:xfrm>
+            <a:prstGeom prst="line">
+              <a:avLst/>
+            </a:prstGeom>
+          </p:spPr>
+          <p:style>
+            <a:lnRef idx="3">
+              <a:schemeClr val="dk1"/>
+            </a:lnRef>
+            <a:fillRef idx="0">
+              <a:schemeClr val="dk1"/>
+            </a:fillRef>
+            <a:effectRef idx="2">
+              <a:schemeClr val="dk1"/>
+            </a:effectRef>
+            <a:fontRef idx="minor">
+              <a:schemeClr val="tx1"/>
+            </a:fontRef>
+          </p:style>
+        </p:cxnSp>
+        <p:cxnSp>
+          <p:nvCxnSpPr>
+            <p:cNvPr id="7" name="Straight Connector 6">
+              <a:extLst>
+                <a:ext uri="{FF2B5EF4-FFF2-40B4-BE49-F238E27FC236}">
+                  <a16:creationId xmlns:a16="http://schemas.microsoft.com/office/drawing/2014/main" id="{D21BB952-0C7C-4831-8CDB-ADF77D4EFC8D}"/>
+                </a:ext>
+              </a:extLst>
+            </p:cNvPr>
+            <p:cNvCxnSpPr>
+              <a:cxnSpLocks/>
+            </p:cNvCxnSpPr>
+            <p:nvPr/>
+          </p:nvCxnSpPr>
+          <p:spPr>
+            <a:xfrm>
+              <a:off x="2787869" y="2320700"/>
+              <a:ext cx="81455" cy="496072"/>
+            </a:xfrm>
+            <a:prstGeom prst="line">
+              <a:avLst/>
+            </a:prstGeom>
+          </p:spPr>
+          <p:style>
+            <a:lnRef idx="3">
+              <a:schemeClr val="dk1"/>
+            </a:lnRef>
+            <a:fillRef idx="0">
+              <a:schemeClr val="dk1"/>
+            </a:fillRef>
+            <a:effectRef idx="2">
+              <a:schemeClr val="dk1"/>
+            </a:effectRef>
+            <a:fontRef idx="minor">
+              <a:schemeClr val="tx1"/>
+            </a:fontRef>
+          </p:style>
+        </p:cxnSp>
+        <p:cxnSp>
+          <p:nvCxnSpPr>
+            <p:cNvPr id="9" name="Straight Connector 8">
+              <a:extLst>
+                <a:ext uri="{FF2B5EF4-FFF2-40B4-BE49-F238E27FC236}">
+                  <a16:creationId xmlns:a16="http://schemas.microsoft.com/office/drawing/2014/main" id="{F669075D-AA15-B610-D5A8-7161FFC2A121}"/>
+                </a:ext>
+              </a:extLst>
+            </p:cNvPr>
+            <p:cNvCxnSpPr>
+              <a:cxnSpLocks/>
+            </p:cNvCxnSpPr>
+            <p:nvPr/>
+          </p:nvCxnSpPr>
+          <p:spPr>
+            <a:xfrm flipH="1">
+              <a:off x="2787869" y="2350146"/>
+              <a:ext cx="5255" cy="466626"/>
+            </a:xfrm>
+            <a:prstGeom prst="line">
+              <a:avLst/>
+            </a:prstGeom>
+          </p:spPr>
+          <p:style>
+            <a:lnRef idx="3">
+              <a:schemeClr val="dk1"/>
+            </a:lnRef>
+            <a:fillRef idx="0">
+              <a:schemeClr val="dk1"/>
+            </a:fillRef>
+            <a:effectRef idx="2">
+              <a:schemeClr val="dk1"/>
+            </a:effectRef>
+            <a:fontRef idx="minor">
+              <a:schemeClr val="tx1"/>
+            </a:fontRef>
+          </p:style>
+        </p:cxnSp>
+      </p:grpSp>
+      <p:grpSp>
+        <p:nvGrpSpPr>
+          <p:cNvPr id="12" name="Group 11">
+            <a:extLst>
+              <a:ext uri="{FF2B5EF4-FFF2-40B4-BE49-F238E27FC236}">
+                <a16:creationId xmlns:a16="http://schemas.microsoft.com/office/drawing/2014/main" id="{7840AED9-9540-6007-AF47-C42D47F73C46}"/>
+              </a:ext>
+            </a:extLst>
+          </p:cNvPr>
+          <p:cNvGrpSpPr/>
+          <p:nvPr/>
+        </p:nvGrpSpPr>
+        <p:grpSpPr>
+          <a:xfrm>
+            <a:off x="2427985" y="2622330"/>
+            <a:ext cx="157655" cy="651641"/>
+            <a:chOff x="2711669" y="2165131"/>
+            <a:chExt cx="157655" cy="651641"/>
+          </a:xfrm>
+        </p:grpSpPr>
+        <p:sp>
+          <p:nvSpPr>
+            <p:cNvPr id="13" name="Rectangle 12">
+              <a:extLst>
+                <a:ext uri="{FF2B5EF4-FFF2-40B4-BE49-F238E27FC236}">
+                  <a16:creationId xmlns:a16="http://schemas.microsoft.com/office/drawing/2014/main" id="{35673A3C-1683-B846-03DA-74EE4AF394C5}"/>
+                </a:ext>
+              </a:extLst>
+            </p:cNvPr>
+            <p:cNvSpPr/>
+            <p:nvPr/>
+          </p:nvSpPr>
+          <p:spPr>
+            <a:xfrm>
+              <a:off x="2711669" y="2165131"/>
+              <a:ext cx="157655" cy="185015"/>
+            </a:xfrm>
+            <a:prstGeom prst="rect">
+              <a:avLst/>
+            </a:prstGeom>
+          </p:spPr>
+          <p:style>
+            <a:lnRef idx="2">
+              <a:schemeClr val="dk1">
+                <a:shade val="50000"/>
+              </a:schemeClr>
+            </a:lnRef>
+            <a:fillRef idx="1">
+              <a:schemeClr val="dk1"/>
+            </a:fillRef>
+            <a:effectRef idx="0">
+              <a:schemeClr val="dk1"/>
+            </a:effectRef>
+            <a:fontRef idx="minor">
+              <a:schemeClr val="lt1"/>
+            </a:fontRef>
+          </p:style>
+          <p:txBody>
+            <a:bodyPr rtlCol="0" anchor="ctr"/>
+            <a:lstStyle/>
+            <a:p>
+              <a:pPr algn="ctr"/>
+              <a:endParaRPr lang="fr-CA"/>
+            </a:p>
+          </p:txBody>
+        </p:sp>
+        <p:cxnSp>
+          <p:nvCxnSpPr>
+            <p:cNvPr id="14" name="Straight Connector 13">
+              <a:extLst>
+                <a:ext uri="{FF2B5EF4-FFF2-40B4-BE49-F238E27FC236}">
+                  <a16:creationId xmlns:a16="http://schemas.microsoft.com/office/drawing/2014/main" id="{76372EBE-846E-8BDD-9E0B-C469B7EA4782}"/>
+                </a:ext>
+              </a:extLst>
+            </p:cNvPr>
+            <p:cNvCxnSpPr>
+              <a:stCxn id="13" idx="2"/>
+            </p:cNvCxnSpPr>
+            <p:nvPr/>
+          </p:nvCxnSpPr>
+          <p:spPr>
+            <a:xfrm flipH="1">
+              <a:off x="2711669" y="2350146"/>
+              <a:ext cx="78828" cy="466626"/>
+            </a:xfrm>
+            <a:prstGeom prst="line">
+              <a:avLst/>
+            </a:prstGeom>
+          </p:spPr>
+          <p:style>
+            <a:lnRef idx="3">
+              <a:schemeClr val="dk1"/>
+            </a:lnRef>
+            <a:fillRef idx="0">
+              <a:schemeClr val="dk1"/>
+            </a:fillRef>
+            <a:effectRef idx="2">
+              <a:schemeClr val="dk1"/>
+            </a:effectRef>
+            <a:fontRef idx="minor">
+              <a:schemeClr val="tx1"/>
+            </a:fontRef>
+          </p:style>
+        </p:cxnSp>
+        <p:cxnSp>
+          <p:nvCxnSpPr>
+            <p:cNvPr id="15" name="Straight Connector 14">
+              <a:extLst>
+                <a:ext uri="{FF2B5EF4-FFF2-40B4-BE49-F238E27FC236}">
+                  <a16:creationId xmlns:a16="http://schemas.microsoft.com/office/drawing/2014/main" id="{EFC3A96E-6C6F-BD5E-3D33-352B65C6BE44}"/>
+                </a:ext>
+              </a:extLst>
+            </p:cNvPr>
+            <p:cNvCxnSpPr>
+              <a:cxnSpLocks/>
+            </p:cNvCxnSpPr>
+            <p:nvPr/>
+          </p:nvCxnSpPr>
+          <p:spPr>
+            <a:xfrm>
+              <a:off x="2787869" y="2320700"/>
+              <a:ext cx="81455" cy="496072"/>
+            </a:xfrm>
+            <a:prstGeom prst="line">
+              <a:avLst/>
+            </a:prstGeom>
+          </p:spPr>
+          <p:style>
+            <a:lnRef idx="3">
+              <a:schemeClr val="dk1"/>
+            </a:lnRef>
+            <a:fillRef idx="0">
+              <a:schemeClr val="dk1"/>
+            </a:fillRef>
+            <a:effectRef idx="2">
+              <a:schemeClr val="dk1"/>
+            </a:effectRef>
+            <a:fontRef idx="minor">
+              <a:schemeClr val="tx1"/>
+            </a:fontRef>
+          </p:style>
+        </p:cxnSp>
+        <p:cxnSp>
+          <p:nvCxnSpPr>
+            <p:cNvPr id="16" name="Straight Connector 15">
+              <a:extLst>
+                <a:ext uri="{FF2B5EF4-FFF2-40B4-BE49-F238E27FC236}">
+                  <a16:creationId xmlns:a16="http://schemas.microsoft.com/office/drawing/2014/main" id="{8C10CEC6-57F3-0D99-BD1A-F3B182A0CA2A}"/>
+                </a:ext>
+              </a:extLst>
+            </p:cNvPr>
+            <p:cNvCxnSpPr>
+              <a:cxnSpLocks/>
+            </p:cNvCxnSpPr>
+            <p:nvPr/>
+          </p:nvCxnSpPr>
+          <p:spPr>
+            <a:xfrm flipH="1">
+              <a:off x="2787869" y="2350146"/>
+              <a:ext cx="5255" cy="466626"/>
+            </a:xfrm>
+            <a:prstGeom prst="line">
+              <a:avLst/>
+            </a:prstGeom>
+          </p:spPr>
+          <p:style>
+            <a:lnRef idx="3">
+              <a:schemeClr val="dk1"/>
+            </a:lnRef>
+            <a:fillRef idx="0">
+              <a:schemeClr val="dk1"/>
+            </a:fillRef>
+            <a:effectRef idx="2">
+              <a:schemeClr val="dk1"/>
+            </a:effectRef>
+            <a:fontRef idx="minor">
+              <a:schemeClr val="tx1"/>
+            </a:fontRef>
+          </p:style>
+        </p:cxnSp>
+      </p:grpSp>
+      <p:grpSp>
+        <p:nvGrpSpPr>
+          <p:cNvPr id="17" name="Group 16">
+            <a:extLst>
+              <a:ext uri="{FF2B5EF4-FFF2-40B4-BE49-F238E27FC236}">
+                <a16:creationId xmlns:a16="http://schemas.microsoft.com/office/drawing/2014/main" id="{2225460A-6FFC-396D-C62F-CE1B84B28217}"/>
+              </a:ext>
+            </a:extLst>
+          </p:cNvPr>
+          <p:cNvGrpSpPr/>
+          <p:nvPr/>
+        </p:nvGrpSpPr>
+        <p:grpSpPr>
+          <a:xfrm>
+            <a:off x="5962181" y="1923393"/>
+            <a:ext cx="157655" cy="651641"/>
+            <a:chOff x="2711669" y="2165131"/>
+            <a:chExt cx="157655" cy="651641"/>
+          </a:xfrm>
+        </p:grpSpPr>
+        <p:sp>
+          <p:nvSpPr>
+            <p:cNvPr id="18" name="Rectangle 17">
+              <a:extLst>
+                <a:ext uri="{FF2B5EF4-FFF2-40B4-BE49-F238E27FC236}">
+                  <a16:creationId xmlns:a16="http://schemas.microsoft.com/office/drawing/2014/main" id="{40497C9A-CA6C-3D58-B3FC-BE2174A8EE15}"/>
+                </a:ext>
+              </a:extLst>
+            </p:cNvPr>
+            <p:cNvSpPr/>
+            <p:nvPr/>
+          </p:nvSpPr>
+          <p:spPr>
+            <a:xfrm>
+              <a:off x="2711669" y="2165131"/>
+              <a:ext cx="157655" cy="185015"/>
+            </a:xfrm>
+            <a:prstGeom prst="rect">
+              <a:avLst/>
+            </a:prstGeom>
+          </p:spPr>
+          <p:style>
+            <a:lnRef idx="2">
+              <a:schemeClr val="dk1">
+                <a:shade val="50000"/>
+              </a:schemeClr>
+            </a:lnRef>
+            <a:fillRef idx="1">
+              <a:schemeClr val="dk1"/>
+            </a:fillRef>
+            <a:effectRef idx="0">
+              <a:schemeClr val="dk1"/>
+            </a:effectRef>
+            <a:fontRef idx="minor">
+              <a:schemeClr val="lt1"/>
+            </a:fontRef>
+          </p:style>
+          <p:txBody>
+            <a:bodyPr rtlCol="0" anchor="ctr"/>
+            <a:lstStyle/>
+            <a:p>
+              <a:pPr algn="ctr"/>
+              <a:endParaRPr lang="fr-CA"/>
+            </a:p>
+          </p:txBody>
+        </p:sp>
+        <p:cxnSp>
+          <p:nvCxnSpPr>
+            <p:cNvPr id="19" name="Straight Connector 18">
+              <a:extLst>
+                <a:ext uri="{FF2B5EF4-FFF2-40B4-BE49-F238E27FC236}">
+                  <a16:creationId xmlns:a16="http://schemas.microsoft.com/office/drawing/2014/main" id="{E6885CB7-D73B-9636-F033-9C4130923417}"/>
+                </a:ext>
+              </a:extLst>
+            </p:cNvPr>
+            <p:cNvCxnSpPr>
+              <a:stCxn id="18" idx="2"/>
+            </p:cNvCxnSpPr>
+            <p:nvPr/>
+          </p:nvCxnSpPr>
+          <p:spPr>
+            <a:xfrm flipH="1">
+              <a:off x="2711669" y="2350146"/>
+              <a:ext cx="78828" cy="466626"/>
+            </a:xfrm>
+            <a:prstGeom prst="line">
+              <a:avLst/>
+            </a:prstGeom>
+          </p:spPr>
+          <p:style>
+            <a:lnRef idx="3">
+              <a:schemeClr val="dk1"/>
+            </a:lnRef>
+            <a:fillRef idx="0">
+              <a:schemeClr val="dk1"/>
+            </a:fillRef>
+            <a:effectRef idx="2">
+              <a:schemeClr val="dk1"/>
+            </a:effectRef>
+            <a:fontRef idx="minor">
+              <a:schemeClr val="tx1"/>
+            </a:fontRef>
+          </p:style>
+        </p:cxnSp>
+        <p:cxnSp>
+          <p:nvCxnSpPr>
+            <p:cNvPr id="20" name="Straight Connector 19">
+              <a:extLst>
+                <a:ext uri="{FF2B5EF4-FFF2-40B4-BE49-F238E27FC236}">
+                  <a16:creationId xmlns:a16="http://schemas.microsoft.com/office/drawing/2014/main" id="{EBA89244-85C8-F9AB-5CCB-A285187FFC87}"/>
+                </a:ext>
+              </a:extLst>
+            </p:cNvPr>
+            <p:cNvCxnSpPr>
+              <a:cxnSpLocks/>
+            </p:cNvCxnSpPr>
+            <p:nvPr/>
+          </p:nvCxnSpPr>
+          <p:spPr>
+            <a:xfrm>
+              <a:off x="2787869" y="2320700"/>
+              <a:ext cx="81455" cy="496072"/>
+            </a:xfrm>
+            <a:prstGeom prst="line">
+              <a:avLst/>
+            </a:prstGeom>
+          </p:spPr>
+          <p:style>
+            <a:lnRef idx="3">
+              <a:schemeClr val="dk1"/>
+            </a:lnRef>
+            <a:fillRef idx="0">
+              <a:schemeClr val="dk1"/>
+            </a:fillRef>
+            <a:effectRef idx="2">
+              <a:schemeClr val="dk1"/>
+            </a:effectRef>
+            <a:fontRef idx="minor">
+              <a:schemeClr val="tx1"/>
+            </a:fontRef>
+          </p:style>
+        </p:cxnSp>
+        <p:cxnSp>
+          <p:nvCxnSpPr>
+            <p:cNvPr id="21" name="Straight Connector 20">
+              <a:extLst>
+                <a:ext uri="{FF2B5EF4-FFF2-40B4-BE49-F238E27FC236}">
+                  <a16:creationId xmlns:a16="http://schemas.microsoft.com/office/drawing/2014/main" id="{85ACF263-8F89-7270-49CD-33D7C8FB0838}"/>
+                </a:ext>
+              </a:extLst>
+            </p:cNvPr>
+            <p:cNvCxnSpPr>
+              <a:cxnSpLocks/>
+            </p:cNvCxnSpPr>
+            <p:nvPr/>
+          </p:nvCxnSpPr>
+          <p:spPr>
+            <a:xfrm flipH="1">
+              <a:off x="2787869" y="2350146"/>
+              <a:ext cx="5255" cy="466626"/>
+            </a:xfrm>
+            <a:prstGeom prst="line">
+              <a:avLst/>
+            </a:prstGeom>
+          </p:spPr>
+          <p:style>
+            <a:lnRef idx="3">
+              <a:schemeClr val="dk1"/>
+            </a:lnRef>
+            <a:fillRef idx="0">
+              <a:schemeClr val="dk1"/>
+            </a:fillRef>
+            <a:effectRef idx="2">
+              <a:schemeClr val="dk1"/>
+            </a:effectRef>
+            <a:fontRef idx="minor">
+              <a:schemeClr val="tx1"/>
+            </a:fontRef>
+          </p:style>
+        </p:cxnSp>
+      </p:grpSp>
+      <p:grpSp>
+        <p:nvGrpSpPr>
+          <p:cNvPr id="22" name="Group 21">
+            <a:extLst>
+              <a:ext uri="{FF2B5EF4-FFF2-40B4-BE49-F238E27FC236}">
+                <a16:creationId xmlns:a16="http://schemas.microsoft.com/office/drawing/2014/main" id="{2C463B14-192F-2B19-FD93-B919B610E4AE}"/>
+              </a:ext>
+            </a:extLst>
+          </p:cNvPr>
+          <p:cNvGrpSpPr/>
+          <p:nvPr/>
+        </p:nvGrpSpPr>
+        <p:grpSpPr>
+          <a:xfrm>
+            <a:off x="6340648" y="2622330"/>
+            <a:ext cx="157655" cy="651641"/>
+            <a:chOff x="2711669" y="2165131"/>
+            <a:chExt cx="157655" cy="651641"/>
+          </a:xfrm>
+        </p:grpSpPr>
+        <p:sp>
+          <p:nvSpPr>
+            <p:cNvPr id="23" name="Rectangle 22">
+              <a:extLst>
+                <a:ext uri="{FF2B5EF4-FFF2-40B4-BE49-F238E27FC236}">
+                  <a16:creationId xmlns:a16="http://schemas.microsoft.com/office/drawing/2014/main" id="{88295879-A903-AB91-1E13-26A59A88BE5B}"/>
+                </a:ext>
+              </a:extLst>
+            </p:cNvPr>
+            <p:cNvSpPr/>
+            <p:nvPr/>
+          </p:nvSpPr>
+          <p:spPr>
+            <a:xfrm>
+              <a:off x="2711669" y="2165131"/>
+              <a:ext cx="157655" cy="185015"/>
+            </a:xfrm>
+            <a:prstGeom prst="rect">
+              <a:avLst/>
+            </a:prstGeom>
+          </p:spPr>
+          <p:style>
+            <a:lnRef idx="2">
+              <a:schemeClr val="dk1">
+                <a:shade val="50000"/>
+              </a:schemeClr>
+            </a:lnRef>
+            <a:fillRef idx="1">
+              <a:schemeClr val="dk1"/>
+            </a:fillRef>
+            <a:effectRef idx="0">
+              <a:schemeClr val="dk1"/>
+            </a:effectRef>
+            <a:fontRef idx="minor">
+              <a:schemeClr val="lt1"/>
+            </a:fontRef>
+          </p:style>
+          <p:txBody>
+            <a:bodyPr rtlCol="0" anchor="ctr"/>
+            <a:lstStyle/>
+            <a:p>
+              <a:pPr algn="ctr"/>
+              <a:endParaRPr lang="fr-CA"/>
+            </a:p>
+          </p:txBody>
+        </p:sp>
+        <p:cxnSp>
+          <p:nvCxnSpPr>
+            <p:cNvPr id="24" name="Straight Connector 23">
+              <a:extLst>
+                <a:ext uri="{FF2B5EF4-FFF2-40B4-BE49-F238E27FC236}">
+                  <a16:creationId xmlns:a16="http://schemas.microsoft.com/office/drawing/2014/main" id="{55F5EAEF-0669-9DAB-C58F-D33DF8343AD7}"/>
+                </a:ext>
+              </a:extLst>
+            </p:cNvPr>
+            <p:cNvCxnSpPr>
+              <a:stCxn id="23" idx="2"/>
+            </p:cNvCxnSpPr>
+            <p:nvPr/>
+          </p:nvCxnSpPr>
+          <p:spPr>
+            <a:xfrm flipH="1">
+              <a:off x="2711669" y="2350146"/>
+              <a:ext cx="78828" cy="466626"/>
+            </a:xfrm>
+            <a:prstGeom prst="line">
+              <a:avLst/>
+            </a:prstGeom>
+          </p:spPr>
+          <p:style>
+            <a:lnRef idx="3">
+              <a:schemeClr val="dk1"/>
+            </a:lnRef>
+            <a:fillRef idx="0">
+              <a:schemeClr val="dk1"/>
+            </a:fillRef>
+            <a:effectRef idx="2">
+              <a:schemeClr val="dk1"/>
+            </a:effectRef>
+            <a:fontRef idx="minor">
+              <a:schemeClr val="tx1"/>
+            </a:fontRef>
+          </p:style>
+        </p:cxnSp>
+        <p:cxnSp>
+          <p:nvCxnSpPr>
+            <p:cNvPr id="25" name="Straight Connector 24">
+              <a:extLst>
+                <a:ext uri="{FF2B5EF4-FFF2-40B4-BE49-F238E27FC236}">
+                  <a16:creationId xmlns:a16="http://schemas.microsoft.com/office/drawing/2014/main" id="{DBD88BAE-3604-0BCE-0E56-5B6E49F195A1}"/>
+                </a:ext>
+              </a:extLst>
+            </p:cNvPr>
+            <p:cNvCxnSpPr>
+              <a:cxnSpLocks/>
+            </p:cNvCxnSpPr>
+            <p:nvPr/>
+          </p:nvCxnSpPr>
+          <p:spPr>
+            <a:xfrm>
+              <a:off x="2787869" y="2320700"/>
+              <a:ext cx="81455" cy="496072"/>
+            </a:xfrm>
+            <a:prstGeom prst="line">
+              <a:avLst/>
+            </a:prstGeom>
+          </p:spPr>
+          <p:style>
+            <a:lnRef idx="3">
+              <a:schemeClr val="dk1"/>
+            </a:lnRef>
+            <a:fillRef idx="0">
+              <a:schemeClr val="dk1"/>
+            </a:fillRef>
+            <a:effectRef idx="2">
+              <a:schemeClr val="dk1"/>
+            </a:effectRef>
+            <a:fontRef idx="minor">
+              <a:schemeClr val="tx1"/>
+            </a:fontRef>
+          </p:style>
+        </p:cxnSp>
+        <p:cxnSp>
+          <p:nvCxnSpPr>
+            <p:cNvPr id="26" name="Straight Connector 25">
+              <a:extLst>
+                <a:ext uri="{FF2B5EF4-FFF2-40B4-BE49-F238E27FC236}">
+                  <a16:creationId xmlns:a16="http://schemas.microsoft.com/office/drawing/2014/main" id="{A8E807BA-37FC-C9A7-A3FD-6D0AED0003EA}"/>
+                </a:ext>
+              </a:extLst>
+            </p:cNvPr>
+            <p:cNvCxnSpPr>
+              <a:cxnSpLocks/>
+            </p:cNvCxnSpPr>
+            <p:nvPr/>
+          </p:nvCxnSpPr>
+          <p:spPr>
+            <a:xfrm flipH="1">
+              <a:off x="2787869" y="2350146"/>
+              <a:ext cx="5255" cy="466626"/>
+            </a:xfrm>
+            <a:prstGeom prst="line">
+              <a:avLst/>
+            </a:prstGeom>
+          </p:spPr>
+          <p:style>
+            <a:lnRef idx="3">
+              <a:schemeClr val="dk1"/>
+            </a:lnRef>
+            <a:fillRef idx="0">
+              <a:schemeClr val="dk1"/>
+            </a:fillRef>
+            <a:effectRef idx="2">
+              <a:schemeClr val="dk1"/>
+            </a:effectRef>
+            <a:fontRef idx="minor">
+              <a:schemeClr val="tx1"/>
+            </a:fontRef>
+          </p:style>
+        </p:cxnSp>
+      </p:grpSp>
+      <p:cxnSp>
+        <p:nvCxnSpPr>
+          <p:cNvPr id="28" name="Straight Connector 27">
+            <a:extLst>
+              <a:ext uri="{FF2B5EF4-FFF2-40B4-BE49-F238E27FC236}">
+                <a16:creationId xmlns:a16="http://schemas.microsoft.com/office/drawing/2014/main" id="{AF306867-09F0-BD43-3FBE-D868A80E9BD2}"/>
+              </a:ext>
+            </a:extLst>
+          </p:cNvPr>
+          <p:cNvCxnSpPr/>
+          <p:nvPr/>
+        </p:nvCxnSpPr>
+        <p:spPr>
+          <a:xfrm>
+            <a:off x="2207173" y="2196662"/>
+            <a:ext cx="220812" cy="378372"/>
+          </a:xfrm>
+          <a:prstGeom prst="line">
+            <a:avLst/>
+          </a:prstGeom>
+          <a:ln w="12700">
+            <a:solidFill>
+              <a:srgbClr val="FF0000"/>
+            </a:solidFill>
+            <a:prstDash val="dash"/>
+          </a:ln>
+        </p:spPr>
+        <p:style>
+          <a:lnRef idx="1">
+            <a:schemeClr val="accent2"/>
+          </a:lnRef>
+          <a:fillRef idx="0">
+            <a:schemeClr val="accent2"/>
+          </a:fillRef>
+          <a:effectRef idx="0">
+            <a:schemeClr val="accent2"/>
+          </a:effectRef>
+          <a:fontRef idx="minor">
+            <a:schemeClr val="tx1"/>
+          </a:fontRef>
+        </p:style>
+      </p:cxnSp>
+      <p:cxnSp>
+        <p:nvCxnSpPr>
+          <p:cNvPr id="29" name="Straight Connector 28">
+            <a:extLst>
+              <a:ext uri="{FF2B5EF4-FFF2-40B4-BE49-F238E27FC236}">
+                <a16:creationId xmlns:a16="http://schemas.microsoft.com/office/drawing/2014/main" id="{2FAFFD46-8063-2FB0-7D81-47AADD574C3F}"/>
+              </a:ext>
+            </a:extLst>
+          </p:cNvPr>
+          <p:cNvCxnSpPr/>
+          <p:nvPr/>
+        </p:nvCxnSpPr>
+        <p:spPr>
+          <a:xfrm>
+            <a:off x="6135324" y="2201916"/>
+            <a:ext cx="220812" cy="378372"/>
+          </a:xfrm>
+          <a:prstGeom prst="line">
+            <a:avLst/>
+          </a:prstGeom>
+          <a:ln w="12700">
+            <a:solidFill>
+              <a:srgbClr val="FF0000"/>
+            </a:solidFill>
+            <a:prstDash val="dash"/>
+          </a:ln>
+        </p:spPr>
+        <p:style>
+          <a:lnRef idx="1">
+            <a:schemeClr val="accent2"/>
+          </a:lnRef>
+          <a:fillRef idx="0">
+            <a:schemeClr val="accent2"/>
+          </a:fillRef>
+          <a:effectRef idx="0">
+            <a:schemeClr val="accent2"/>
+          </a:effectRef>
+          <a:fontRef idx="minor">
+            <a:schemeClr val="tx1"/>
+          </a:fontRef>
+        </p:style>
+      </p:cxnSp>
+      <p:cxnSp>
+        <p:nvCxnSpPr>
+          <p:cNvPr id="31" name="Straight Arrow Connector 30">
+            <a:extLst>
+              <a:ext uri="{FF2B5EF4-FFF2-40B4-BE49-F238E27FC236}">
+                <a16:creationId xmlns:a16="http://schemas.microsoft.com/office/drawing/2014/main" id="{3EB5A66B-D588-20E5-6465-B4A1D67756D1}"/>
+              </a:ext>
+            </a:extLst>
+          </p:cNvPr>
+          <p:cNvCxnSpPr/>
+          <p:nvPr/>
+        </p:nvCxnSpPr>
+        <p:spPr>
+          <a:xfrm>
+            <a:off x="2504185" y="3429000"/>
+            <a:ext cx="3912663" cy="0"/>
+          </a:xfrm>
+          <a:prstGeom prst="straightConnector1">
+            <a:avLst/>
+          </a:prstGeom>
+          <a:ln>
+            <a:headEnd type="triangle"/>
+            <a:tailEnd type="triangle"/>
+          </a:ln>
+        </p:spPr>
+        <p:style>
+          <a:lnRef idx="1">
+            <a:schemeClr val="dk1"/>
+          </a:lnRef>
+          <a:fillRef idx="0">
+            <a:schemeClr val="dk1"/>
+          </a:fillRef>
+          <a:effectRef idx="0">
+            <a:schemeClr val="dk1"/>
+          </a:effectRef>
+          <a:fontRef idx="minor">
+            <a:schemeClr val="tx1"/>
+          </a:fontRef>
+        </p:style>
+      </p:cxnSp>
+      <p:sp>
+        <p:nvSpPr>
+          <p:cNvPr id="32" name="TextBox 31">
+            <a:extLst>
+              <a:ext uri="{FF2B5EF4-FFF2-40B4-BE49-F238E27FC236}">
+                <a16:creationId xmlns:a16="http://schemas.microsoft.com/office/drawing/2014/main" id="{CAEF7147-7D1E-B899-4E92-D3D0DD5A3E33}"/>
+              </a:ext>
+            </a:extLst>
+          </p:cNvPr>
+          <p:cNvSpPr txBox="1"/>
+          <p:nvPr/>
+        </p:nvSpPr>
+        <p:spPr>
+          <a:xfrm>
+            <a:off x="4229574" y="3089305"/>
+            <a:ext cx="655949" cy="369332"/>
+          </a:xfrm>
+          <a:prstGeom prst="rect">
+            <a:avLst/>
+          </a:prstGeom>
+          <a:noFill/>
+        </p:spPr>
+        <p:txBody>
+          <a:bodyPr wrap="none" rtlCol="0">
+            <a:spAutoFit/>
+          </a:bodyPr>
+          <a:lstStyle/>
+          <a:p>
+            <a:r>
+              <a:rPr lang="fr-CA" dirty="0"/>
+              <a:t>50 m</a:t>
+            </a:r>
+          </a:p>
+        </p:txBody>
+      </p:sp>
+    </p:spTree>
+    <p:extLst>
+      <p:ext uri="{BB962C8B-B14F-4D97-AF65-F5344CB8AC3E}">
+        <p14:creationId xmlns:p14="http://schemas.microsoft.com/office/powerpoint/2010/main" val="1230535076"/>
+      </p:ext>
+    </p:extLst>
+  </p:cSld>
+  <p:clrMapOvr>
+    <a:masterClrMapping/>
+  </p:clrMapOvr>
+</p:sld>
+</file>
+
+<file path=ppt/slides/slide9.xml><?xml version="1.0" encoding="utf-8"?>
+<p:sld xmlns:a="http://schemas.openxmlformats.org/drawingml/2006/main" xmlns:r="http://schemas.openxmlformats.org/officeDocument/2006/relationships" xmlns:p="http://schemas.openxmlformats.org/presentationml/2006/main">
+  <p:cSld>
+    <p:spTree>
+      <p:nvGrpSpPr>
+        <p:cNvPr id="1" name=""/>
+        <p:cNvGrpSpPr/>
+        <p:nvPr/>
+      </p:nvGrpSpPr>
+      <p:grpSpPr>
+        <a:xfrm>
+          <a:off x="0" y="0"/>
+          <a:ext cx="0" cy="0"/>
+          <a:chOff x="0" y="0"/>
+          <a:chExt cx="0" cy="0"/>
+        </a:xfrm>
+      </p:grpSpPr>
+      <p:sp>
+        <p:nvSpPr>
+          <p:cNvPr id="2" name="Oval 1">
+            <a:extLst>
+              <a:ext uri="{FF2B5EF4-FFF2-40B4-BE49-F238E27FC236}">
+                <a16:creationId xmlns:a16="http://schemas.microsoft.com/office/drawing/2014/main" id="{89D02488-0DE1-7152-8B4A-5100AB3DA3B4}"/>
+              </a:ext>
+            </a:extLst>
+          </p:cNvPr>
+          <p:cNvSpPr/>
+          <p:nvPr/>
+        </p:nvSpPr>
+        <p:spPr>
+          <a:xfrm>
+            <a:off x="2057400" y="2312377"/>
+            <a:ext cx="5917223" cy="1776046"/>
+          </a:xfrm>
+          <a:prstGeom prst="ellipse">
+            <a:avLst/>
+          </a:prstGeom>
+          <a:noFill/>
+        </p:spPr>
+        <p:style>
+          <a:lnRef idx="2">
+            <a:schemeClr val="dk1"/>
+          </a:lnRef>
+          <a:fillRef idx="1">
+            <a:schemeClr val="lt1"/>
+          </a:fillRef>
+          <a:effectRef idx="0">
+            <a:schemeClr val="dk1"/>
+          </a:effectRef>
+          <a:fontRef idx="minor">
+            <a:schemeClr val="dk1"/>
+          </a:fontRef>
+        </p:style>
+        <p:txBody>
+          <a:bodyPr rtlCol="0" anchor="ctr"/>
+          <a:lstStyle/>
+          <a:p>
+            <a:pPr algn="ctr"/>
+            <a:endParaRPr lang="fr-CA" noProof="1"/>
+          </a:p>
+        </p:txBody>
+      </p:sp>
+      <p:sp>
+        <p:nvSpPr>
+          <p:cNvPr id="3" name="Oval 2">
+            <a:extLst>
+              <a:ext uri="{FF2B5EF4-FFF2-40B4-BE49-F238E27FC236}">
+                <a16:creationId xmlns:a16="http://schemas.microsoft.com/office/drawing/2014/main" id="{92815B07-68C4-84F3-BC59-EBB7D4B032B7}"/>
+              </a:ext>
+            </a:extLst>
+          </p:cNvPr>
+          <p:cNvSpPr/>
+          <p:nvPr/>
+        </p:nvSpPr>
+        <p:spPr>
+          <a:xfrm>
+            <a:off x="3323494" y="2521928"/>
+            <a:ext cx="4407874" cy="1356944"/>
+          </a:xfrm>
+          <a:prstGeom prst="ellipse">
+            <a:avLst/>
+          </a:prstGeom>
+          <a:noFill/>
+        </p:spPr>
+        <p:style>
+          <a:lnRef idx="2">
+            <a:schemeClr val="dk1"/>
+          </a:lnRef>
+          <a:fillRef idx="1">
+            <a:schemeClr val="lt1"/>
+          </a:fillRef>
+          <a:effectRef idx="0">
+            <a:schemeClr val="dk1"/>
+          </a:effectRef>
+          <a:fontRef idx="minor">
+            <a:schemeClr val="dk1"/>
+          </a:fontRef>
+        </p:style>
+        <p:txBody>
+          <a:bodyPr rtlCol="0" anchor="ctr"/>
+          <a:lstStyle/>
+          <a:p>
+            <a:pPr algn="ctr"/>
+            <a:endParaRPr lang="fr-CA" noProof="1"/>
+          </a:p>
+        </p:txBody>
+      </p:sp>
+      <p:sp>
+        <p:nvSpPr>
+          <p:cNvPr id="4" name="Oval 3">
+            <a:extLst>
+              <a:ext uri="{FF2B5EF4-FFF2-40B4-BE49-F238E27FC236}">
+                <a16:creationId xmlns:a16="http://schemas.microsoft.com/office/drawing/2014/main" id="{173B9BB6-F27A-1000-82A5-775A5C77B4EA}"/>
+              </a:ext>
+            </a:extLst>
+          </p:cNvPr>
+          <p:cNvSpPr/>
+          <p:nvPr/>
+        </p:nvSpPr>
+        <p:spPr>
+          <a:xfrm>
+            <a:off x="4703886" y="2751260"/>
+            <a:ext cx="2784228" cy="898279"/>
+          </a:xfrm>
+          <a:prstGeom prst="ellipse">
+            <a:avLst/>
+          </a:prstGeom>
+          <a:noFill/>
+        </p:spPr>
+        <p:style>
+          <a:lnRef idx="2">
+            <a:schemeClr val="dk1"/>
+          </a:lnRef>
+          <a:fillRef idx="1">
+            <a:schemeClr val="lt1"/>
+          </a:fillRef>
+          <a:effectRef idx="0">
+            <a:schemeClr val="dk1"/>
+          </a:effectRef>
+          <a:fontRef idx="minor">
+            <a:schemeClr val="dk1"/>
+          </a:fontRef>
+        </p:style>
+        <p:txBody>
+          <a:bodyPr rtlCol="0" anchor="ctr"/>
+          <a:lstStyle/>
+          <a:p>
+            <a:pPr algn="ctr"/>
+            <a:endParaRPr lang="fr-CA" noProof="1"/>
+          </a:p>
+        </p:txBody>
+      </p:sp>
+      <mc:AlternateContent xmlns:mc="http://schemas.openxmlformats.org/markup-compatibility/2006">
+        <mc:Choice xmlns:a14="http://schemas.microsoft.com/office/drawing/2010/main" Requires="a14">
+          <p:sp>
+            <p:nvSpPr>
+              <p:cNvPr id="5" name="TextBox 4">
+                <a:extLst>
+                  <a:ext uri="{FF2B5EF4-FFF2-40B4-BE49-F238E27FC236}">
+                    <a16:creationId xmlns:a16="http://schemas.microsoft.com/office/drawing/2014/main" id="{EE68770B-47DB-5E4C-59BC-EC662AE268BB}"/>
+                  </a:ext>
+                </a:extLst>
+              </p:cNvPr>
+              <p:cNvSpPr txBox="1"/>
+              <p:nvPr/>
+            </p:nvSpPr>
+            <p:spPr>
+              <a:xfrm>
+                <a:off x="2352675" y="2908011"/>
+                <a:ext cx="1053494" cy="584775"/>
+              </a:xfrm>
+              <a:prstGeom prst="rect">
+                <a:avLst/>
+              </a:prstGeom>
+              <a:noFill/>
+            </p:spPr>
+            <p:txBody>
+              <a:bodyPr wrap="none" rtlCol="0">
+                <a:spAutoFit/>
+              </a:bodyPr>
+              <a:lstStyle/>
+              <a:p>
+                <a:r>
+                  <a:rPr lang="fr-CA" sz="1600" noProof="1"/>
+                  <a:t>Complex</a:t>
+                </a:r>
+              </a:p>
+              <a:p>
+                <a14:m>
+                  <m:oMathPara xmlns:m="http://schemas.openxmlformats.org/officeDocument/2006/math">
+                    <m:oMathParaPr>
+                      <m:jc m:val="centerGroup"/>
+                    </m:oMathParaPr>
+                    <m:oMath xmlns:m="http://schemas.openxmlformats.org/officeDocument/2006/math">
+                      <m:r>
+                        <a:rPr lang="fr-FR" sz="1600" i="1" noProof="1" dirty="0" smtClean="0">
+                          <a:latin typeface="Cambria Math" panose="02040503050406030204" pitchFamily="18" charset="0"/>
+                        </a:rPr>
+                        <m:t>3</m:t>
+                      </m:r>
+                      <m:r>
+                        <a:rPr lang="fr-FR" sz="1600" b="0" i="1" noProof="1" dirty="0" smtClean="0">
+                          <a:latin typeface="Cambria Math" panose="02040503050406030204" pitchFamily="18" charset="0"/>
+                        </a:rPr>
+                        <m:t>.2+4</m:t>
+                      </m:r>
+                      <m:r>
+                        <a:rPr lang="fr-FR" sz="1600" b="0" i="1" noProof="1" dirty="0" smtClean="0">
+                          <a:latin typeface="Cambria Math" panose="02040503050406030204" pitchFamily="18" charset="0"/>
+                        </a:rPr>
+                        <m:t>𝑖</m:t>
+                      </m:r>
+                    </m:oMath>
+                  </m:oMathPara>
+                </a14:m>
+                <a:endParaRPr lang="fr-CA" sz="1600" noProof="1"/>
+              </a:p>
+            </p:txBody>
+          </p:sp>
+        </mc:Choice>
+        <mc:Fallback>
+          <p:sp>
+            <p:nvSpPr>
+              <p:cNvPr id="5" name="TextBox 4">
+                <a:extLst>
+                  <a:ext uri="{FF2B5EF4-FFF2-40B4-BE49-F238E27FC236}">
+                    <a16:creationId xmlns:a16="http://schemas.microsoft.com/office/drawing/2014/main" id="{EE68770B-47DB-5E4C-59BC-EC662AE268BB}"/>
+                  </a:ext>
+                </a:extLst>
+              </p:cNvPr>
+              <p:cNvSpPr txBox="1">
+                <a:spLocks noRot="1" noChangeAspect="1" noMove="1" noResize="1" noEditPoints="1" noAdjustHandles="1" noChangeArrowheads="1" noChangeShapeType="1" noTextEdit="1"/>
+              </p:cNvSpPr>
+              <p:nvPr/>
+            </p:nvSpPr>
+            <p:spPr>
+              <a:xfrm>
+                <a:off x="2352675" y="2908011"/>
+                <a:ext cx="1053494" cy="584775"/>
+              </a:xfrm>
+              <a:prstGeom prst="rect">
+                <a:avLst/>
+              </a:prstGeom>
+              <a:blipFill>
+                <a:blip r:embed="rId2"/>
+                <a:stretch>
+                  <a:fillRect l="-3571" t="-2083"/>
+                </a:stretch>
+              </a:blipFill>
+            </p:spPr>
+            <p:txBody>
+              <a:bodyPr/>
+              <a:lstStyle/>
+              <a:p>
+                <a:r>
+                  <a:rPr lang="fr-CA">
+                    <a:noFill/>
+                  </a:rPr>
+                  <a:t> </a:t>
+                </a:r>
+              </a:p>
+            </p:txBody>
+          </p:sp>
+        </mc:Fallback>
+      </mc:AlternateContent>
+      <mc:AlternateContent xmlns:mc="http://schemas.openxmlformats.org/markup-compatibility/2006">
+        <mc:Choice xmlns:a14="http://schemas.microsoft.com/office/drawing/2010/main" Requires="a14">
+          <p:sp>
+            <p:nvSpPr>
+              <p:cNvPr id="6" name="TextBox 5">
+                <a:extLst>
+                  <a:ext uri="{FF2B5EF4-FFF2-40B4-BE49-F238E27FC236}">
+                    <a16:creationId xmlns:a16="http://schemas.microsoft.com/office/drawing/2014/main" id="{A19D8E57-7758-F044-ED5C-34207ECD8DBE}"/>
+                  </a:ext>
+                </a:extLst>
+              </p:cNvPr>
+              <p:cNvSpPr txBox="1"/>
+              <p:nvPr/>
+            </p:nvSpPr>
+            <p:spPr>
+              <a:xfrm>
+                <a:off x="4003797" y="2908011"/>
+                <a:ext cx="589392" cy="584775"/>
+              </a:xfrm>
+              <a:prstGeom prst="rect">
+                <a:avLst/>
+              </a:prstGeom>
+              <a:noFill/>
+            </p:spPr>
+            <p:txBody>
+              <a:bodyPr wrap="none" rtlCol="0">
+                <a:spAutoFit/>
+              </a:bodyPr>
+              <a:lstStyle/>
+              <a:p>
+                <a:r>
+                  <a:rPr lang="fr-CA" sz="1600" noProof="1"/>
+                  <a:t>Real</a:t>
+                </a:r>
+              </a:p>
+              <a:p>
+                <a14:m>
+                  <m:oMathPara xmlns:m="http://schemas.openxmlformats.org/officeDocument/2006/math">
+                    <m:oMathParaPr>
+                      <m:jc m:val="centerGroup"/>
+                    </m:oMathParaPr>
+                    <m:oMath xmlns:m="http://schemas.openxmlformats.org/officeDocument/2006/math">
+                      <m:r>
+                        <a:rPr lang="fr-FR" sz="1600" b="0" i="1" noProof="1" dirty="0" smtClean="0">
+                          <a:latin typeface="Cambria Math" panose="02040503050406030204" pitchFamily="18" charset="0"/>
+                        </a:rPr>
+                        <m:t>3.2</m:t>
+                      </m:r>
+                    </m:oMath>
+                  </m:oMathPara>
+                </a14:m>
+                <a:endParaRPr lang="fr-CA" sz="1600" noProof="1"/>
+              </a:p>
+            </p:txBody>
+          </p:sp>
+        </mc:Choice>
+        <mc:Fallback>
+          <p:sp>
+            <p:nvSpPr>
+              <p:cNvPr id="6" name="TextBox 5">
+                <a:extLst>
+                  <a:ext uri="{FF2B5EF4-FFF2-40B4-BE49-F238E27FC236}">
+                    <a16:creationId xmlns:a16="http://schemas.microsoft.com/office/drawing/2014/main" id="{A19D8E57-7758-F044-ED5C-34207ECD8DBE}"/>
+                  </a:ext>
+                </a:extLst>
+              </p:cNvPr>
+              <p:cNvSpPr txBox="1">
+                <a:spLocks noRot="1" noChangeAspect="1" noMove="1" noResize="1" noEditPoints="1" noAdjustHandles="1" noChangeArrowheads="1" noChangeShapeType="1" noTextEdit="1"/>
+              </p:cNvSpPr>
+              <p:nvPr/>
+            </p:nvSpPr>
+            <p:spPr>
+              <a:xfrm>
+                <a:off x="4003797" y="2908011"/>
+                <a:ext cx="589392" cy="584775"/>
+              </a:xfrm>
+              <a:prstGeom prst="rect">
+                <a:avLst/>
+              </a:prstGeom>
+              <a:blipFill>
+                <a:blip r:embed="rId3"/>
+                <a:stretch>
+                  <a:fillRect l="-6383" t="-2083"/>
+                </a:stretch>
+              </a:blipFill>
+            </p:spPr>
+            <p:txBody>
+              <a:bodyPr/>
+              <a:lstStyle/>
+              <a:p>
+                <a:r>
+                  <a:rPr lang="fr-CA">
+                    <a:noFill/>
+                  </a:rPr>
+                  <a:t> </a:t>
+                </a:r>
+              </a:p>
+            </p:txBody>
+          </p:sp>
+        </mc:Fallback>
+      </mc:AlternateContent>
+      <mc:AlternateContent xmlns:mc="http://schemas.openxmlformats.org/markup-compatibility/2006">
+        <mc:Choice xmlns:a14="http://schemas.microsoft.com/office/drawing/2010/main" Requires="a14">
+          <p:sp>
+            <p:nvSpPr>
+              <p:cNvPr id="7" name="TextBox 6">
+                <a:extLst>
+                  <a:ext uri="{FF2B5EF4-FFF2-40B4-BE49-F238E27FC236}">
+                    <a16:creationId xmlns:a16="http://schemas.microsoft.com/office/drawing/2014/main" id="{69727F5E-F6AC-7940-A332-95B71B7E488C}"/>
+                  </a:ext>
+                </a:extLst>
+              </p:cNvPr>
+              <p:cNvSpPr txBox="1"/>
+              <p:nvPr/>
+            </p:nvSpPr>
+            <p:spPr>
+              <a:xfrm>
+                <a:off x="6010451" y="2908011"/>
+                <a:ext cx="779957" cy="584775"/>
+              </a:xfrm>
+              <a:prstGeom prst="rect">
+                <a:avLst/>
+              </a:prstGeom>
+              <a:noFill/>
+            </p:spPr>
+            <p:txBody>
+              <a:bodyPr wrap="none" rtlCol="0">
+                <a:spAutoFit/>
+              </a:bodyPr>
+              <a:lstStyle/>
+              <a:p>
+                <a:r>
+                  <a:rPr lang="fr-CA" sz="1600" noProof="1"/>
+                  <a:t>Integer</a:t>
+                </a:r>
+              </a:p>
+              <a:p>
+                <a14:m>
+                  <m:oMathPara xmlns:m="http://schemas.openxmlformats.org/officeDocument/2006/math">
+                    <m:oMathParaPr>
+                      <m:jc m:val="centerGroup"/>
+                    </m:oMathParaPr>
+                    <m:oMath xmlns:m="http://schemas.openxmlformats.org/officeDocument/2006/math">
+                      <m:r>
+                        <a:rPr lang="fr-FR" sz="1600" b="0" i="1" noProof="1" dirty="0" smtClean="0">
+                          <a:latin typeface="Cambria Math" panose="02040503050406030204" pitchFamily="18" charset="0"/>
+                        </a:rPr>
+                        <m:t>3</m:t>
+                      </m:r>
+                    </m:oMath>
+                  </m:oMathPara>
+                </a14:m>
+                <a:endParaRPr lang="fr-CA" sz="1600" noProof="1"/>
+              </a:p>
+            </p:txBody>
+          </p:sp>
+        </mc:Choice>
+        <mc:Fallback>
+          <p:sp>
+            <p:nvSpPr>
+              <p:cNvPr id="7" name="TextBox 6">
+                <a:extLst>
+                  <a:ext uri="{FF2B5EF4-FFF2-40B4-BE49-F238E27FC236}">
+                    <a16:creationId xmlns:a16="http://schemas.microsoft.com/office/drawing/2014/main" id="{69727F5E-F6AC-7940-A332-95B71B7E488C}"/>
+                  </a:ext>
+                </a:extLst>
+              </p:cNvPr>
+              <p:cNvSpPr txBox="1">
+                <a:spLocks noRot="1" noChangeAspect="1" noMove="1" noResize="1" noEditPoints="1" noAdjustHandles="1" noChangeArrowheads="1" noChangeShapeType="1" noTextEdit="1"/>
+              </p:cNvSpPr>
+              <p:nvPr/>
+            </p:nvSpPr>
+            <p:spPr>
+              <a:xfrm>
+                <a:off x="6010451" y="2908011"/>
+                <a:ext cx="779957" cy="584775"/>
+              </a:xfrm>
+              <a:prstGeom prst="rect">
+                <a:avLst/>
+              </a:prstGeom>
+              <a:blipFill>
+                <a:blip r:embed="rId4"/>
+                <a:stretch>
+                  <a:fillRect l="-4839" t="-2083" r="-3226"/>
+                </a:stretch>
+              </a:blipFill>
+            </p:spPr>
+            <p:txBody>
+              <a:bodyPr/>
+              <a:lstStyle/>
+              <a:p>
+                <a:r>
+                  <a:rPr lang="fr-CA">
+                    <a:noFill/>
+                  </a:rPr>
+                  <a:t> </a:t>
+                </a:r>
+              </a:p>
+            </p:txBody>
+          </p:sp>
+        </mc:Fallback>
+      </mc:AlternateContent>
+      <p:sp>
+        <p:nvSpPr>
+          <p:cNvPr id="8" name="Rectangle 7">
+            <a:extLst>
+              <a:ext uri="{FF2B5EF4-FFF2-40B4-BE49-F238E27FC236}">
+                <a16:creationId xmlns:a16="http://schemas.microsoft.com/office/drawing/2014/main" id="{24998AED-5156-39A2-73DE-BC585CE57C68}"/>
+              </a:ext>
+            </a:extLst>
+          </p:cNvPr>
+          <p:cNvSpPr/>
+          <p:nvPr/>
+        </p:nvSpPr>
+        <p:spPr>
+          <a:xfrm>
+            <a:off x="2079785" y="3015732"/>
+            <a:ext cx="377026" cy="369332"/>
+          </a:xfrm>
+          <a:prstGeom prst="rect">
+            <a:avLst/>
+          </a:prstGeom>
+        </p:spPr>
+        <p:txBody>
+          <a:bodyPr wrap="none">
+            <a:spAutoFit/>
+          </a:bodyPr>
+          <a:lstStyle/>
+          <a:p>
+            <a:r>
+              <a:rPr lang="fr-CA" noProof="1"/>
+              <a:t>ℂ </a:t>
+            </a:r>
+          </a:p>
+        </p:txBody>
+      </p:sp>
+      <p:sp>
+        <p:nvSpPr>
+          <p:cNvPr id="9" name="Rectangle 8">
+            <a:extLst>
+              <a:ext uri="{FF2B5EF4-FFF2-40B4-BE49-F238E27FC236}">
+                <a16:creationId xmlns:a16="http://schemas.microsoft.com/office/drawing/2014/main" id="{1AF4FE36-5280-210D-935E-0BE522219A38}"/>
+              </a:ext>
+            </a:extLst>
+          </p:cNvPr>
+          <p:cNvSpPr/>
+          <p:nvPr/>
+        </p:nvSpPr>
+        <p:spPr>
+          <a:xfrm>
+            <a:off x="3657502" y="3015732"/>
+            <a:ext cx="356188" cy="369332"/>
+          </a:xfrm>
+          <a:prstGeom prst="rect">
+            <a:avLst/>
+          </a:prstGeom>
+        </p:spPr>
+        <p:txBody>
+          <a:bodyPr wrap="none">
+            <a:spAutoFit/>
+          </a:bodyPr>
+          <a:lstStyle/>
+          <a:p>
+            <a:r>
+              <a:rPr lang="fr-CA" noProof="1"/>
+              <a:t>ℝ</a:t>
+            </a:r>
+          </a:p>
+        </p:txBody>
+      </p:sp>
+      <p:sp>
+        <p:nvSpPr>
+          <p:cNvPr id="10" name="Rectangle 9">
+            <a:extLst>
+              <a:ext uri="{FF2B5EF4-FFF2-40B4-BE49-F238E27FC236}">
+                <a16:creationId xmlns:a16="http://schemas.microsoft.com/office/drawing/2014/main" id="{F795A074-2263-58FD-A069-8AFFC227C466}"/>
+              </a:ext>
+            </a:extLst>
+          </p:cNvPr>
+          <p:cNvSpPr/>
+          <p:nvPr/>
+        </p:nvSpPr>
+        <p:spPr>
+          <a:xfrm>
+            <a:off x="5336529" y="3015732"/>
+            <a:ext cx="377026" cy="369332"/>
+          </a:xfrm>
+          <a:prstGeom prst="rect">
+            <a:avLst/>
+          </a:prstGeom>
+        </p:spPr>
+        <p:txBody>
+          <a:bodyPr wrap="none">
+            <a:spAutoFit/>
+          </a:bodyPr>
+          <a:lstStyle/>
+          <a:p>
+            <a:r>
+              <a:rPr lang="fr-CA" noProof="1"/>
+              <a:t>ℤ </a:t>
+            </a:r>
+          </a:p>
+        </p:txBody>
+      </p:sp>
+    </p:spTree>
+    <p:extLst>
+      <p:ext uri="{BB962C8B-B14F-4D97-AF65-F5344CB8AC3E}">
+        <p14:creationId xmlns:p14="http://schemas.microsoft.com/office/powerpoint/2010/main" val="2763882811"/>
+      </p:ext>
+    </p:extLst>
+  </p:cSld>
+  <p:clrMapOvr>
+    <a:masterClrMapping/>
+  </p:clrMapOvr>
+</p:sld>
+</file>
+
 <file path=ppt/theme/theme1.xml><?xml version="1.0" encoding="utf-8"?>
 <a:theme xmlns:a="http://schemas.openxmlformats.org/drawingml/2006/main" name="Office Theme">
   <a:themeElements>

</xml_diff>

<commit_message>
Added custom directives for exercise and goodpractice
</commit_message>
<xml_diff>
--- a/src/images.pptx
+++ b/src/images.pptx
@@ -11818,6 +11818,71 @@
           </p:sp>
         </mc:Fallback>
       </mc:AlternateContent>
+      <p:pic>
+        <p:nvPicPr>
+          <p:cNvPr id="14" name="Picture 13">
+            <a:extLst>
+              <a:ext uri="{FF2B5EF4-FFF2-40B4-BE49-F238E27FC236}">
+                <a16:creationId xmlns:a16="http://schemas.microsoft.com/office/drawing/2014/main" id="{0FC55182-B665-81CB-0058-6D79545F24D7}"/>
+              </a:ext>
+            </a:extLst>
+          </p:cNvPr>
+          <p:cNvPicPr>
+            <a:picLocks noChangeAspect="1"/>
+          </p:cNvPicPr>
+          <p:nvPr/>
+        </p:nvPicPr>
+        <p:blipFill>
+          <a:blip r:embed="rId6"/>
+          <a:stretch>
+            <a:fillRect/>
+          </a:stretch>
+        </p:blipFill>
+        <p:spPr>
+          <a:xfrm>
+            <a:off x="4659578" y="2111866"/>
+            <a:ext cx="537391" cy="558260"/>
+          </a:xfrm>
+          <a:prstGeom prst="rect">
+            <a:avLst/>
+          </a:prstGeom>
+        </p:spPr>
+      </p:pic>
+      <p:sp>
+        <p:nvSpPr>
+          <p:cNvPr id="15" name="TextBox 14">
+            <a:extLst>
+              <a:ext uri="{FF2B5EF4-FFF2-40B4-BE49-F238E27FC236}">
+                <a16:creationId xmlns:a16="http://schemas.microsoft.com/office/drawing/2014/main" id="{966F5D0A-75BD-F53A-79DB-98684F14B4F3}"/>
+              </a:ext>
+            </a:extLst>
+          </p:cNvPr>
+          <p:cNvSpPr txBox="1"/>
+          <p:nvPr/>
+        </p:nvSpPr>
+        <p:spPr>
+          <a:xfrm>
+            <a:off x="4761400" y="1793871"/>
+            <a:ext cx="333746" cy="369332"/>
+          </a:xfrm>
+          <a:prstGeom prst="rect">
+            <a:avLst/>
+          </a:prstGeom>
+          <a:noFill/>
+        </p:spPr>
+        <p:txBody>
+          <a:bodyPr wrap="none" rtlCol="0">
+            <a:spAutoFit/>
+          </a:bodyPr>
+          <a:lstStyle/>
+          <a:p>
+            <a:r>
+              <a:rPr lang="fr-CA" dirty="0"/>
+              <a:t>N</a:t>
+            </a:r>
+          </a:p>
+        </p:txBody>
+      </p:sp>
     </p:spTree>
     <p:extLst>
       <p:ext uri="{BB962C8B-B14F-4D97-AF65-F5344CB8AC3E}">

</xml_diff>

<commit_message>
Ready for the upcoming 0.9 release
</commit_message>
<xml_diff>
--- a/src/images.pptx
+++ b/src/images.pptx
@@ -15,6 +15,7 @@
     <p:sldId id="263" r:id="rId9"/>
     <p:sldId id="264" r:id="rId10"/>
     <p:sldId id="265" r:id="rId11"/>
+    <p:sldId id="266" r:id="rId12"/>
   </p:sldIdLst>
   <p:sldSz cx="12192000" cy="6858000"/>
   <p:notesSz cx="6858000" cy="9144000"/>
@@ -270,7 +271,7 @@
           <a:p>
             <a:fld id="{35C3687D-91A5-7C4D-919D-428BCA0C637B}" type="datetimeFigureOut">
               <a:rPr lang="fr-CA" smtClean="0"/>
-              <a:t>2022-05-02</a:t>
+              <a:t>2022-08-05</a:t>
             </a:fld>
             <a:endParaRPr lang="fr-CA"/>
           </a:p>
@@ -470,7 +471,7 @@
           <a:p>
             <a:fld id="{35C3687D-91A5-7C4D-919D-428BCA0C637B}" type="datetimeFigureOut">
               <a:rPr lang="fr-CA" smtClean="0"/>
-              <a:t>2022-05-02</a:t>
+              <a:t>2022-08-05</a:t>
             </a:fld>
             <a:endParaRPr lang="fr-CA"/>
           </a:p>
@@ -680,7 +681,7 @@
           <a:p>
             <a:fld id="{35C3687D-91A5-7C4D-919D-428BCA0C637B}" type="datetimeFigureOut">
               <a:rPr lang="fr-CA" smtClean="0"/>
-              <a:t>2022-05-02</a:t>
+              <a:t>2022-08-05</a:t>
             </a:fld>
             <a:endParaRPr lang="fr-CA"/>
           </a:p>
@@ -880,7 +881,7 @@
           <a:p>
             <a:fld id="{35C3687D-91A5-7C4D-919D-428BCA0C637B}" type="datetimeFigureOut">
               <a:rPr lang="fr-CA" smtClean="0"/>
-              <a:t>2022-05-02</a:t>
+              <a:t>2022-08-05</a:t>
             </a:fld>
             <a:endParaRPr lang="fr-CA"/>
           </a:p>
@@ -1156,7 +1157,7 @@
           <a:p>
             <a:fld id="{35C3687D-91A5-7C4D-919D-428BCA0C637B}" type="datetimeFigureOut">
               <a:rPr lang="fr-CA" smtClean="0"/>
-              <a:t>2022-05-02</a:t>
+              <a:t>2022-08-05</a:t>
             </a:fld>
             <a:endParaRPr lang="fr-CA"/>
           </a:p>
@@ -1424,7 +1425,7 @@
           <a:p>
             <a:fld id="{35C3687D-91A5-7C4D-919D-428BCA0C637B}" type="datetimeFigureOut">
               <a:rPr lang="fr-CA" smtClean="0"/>
-              <a:t>2022-05-02</a:t>
+              <a:t>2022-08-05</a:t>
             </a:fld>
             <a:endParaRPr lang="fr-CA"/>
           </a:p>
@@ -1839,7 +1840,7 @@
           <a:p>
             <a:fld id="{35C3687D-91A5-7C4D-919D-428BCA0C637B}" type="datetimeFigureOut">
               <a:rPr lang="fr-CA" smtClean="0"/>
-              <a:t>2022-05-02</a:t>
+              <a:t>2022-08-05</a:t>
             </a:fld>
             <a:endParaRPr lang="fr-CA"/>
           </a:p>
@@ -1981,7 +1982,7 @@
           <a:p>
             <a:fld id="{35C3687D-91A5-7C4D-919D-428BCA0C637B}" type="datetimeFigureOut">
               <a:rPr lang="fr-CA" smtClean="0"/>
-              <a:t>2022-05-02</a:t>
+              <a:t>2022-08-05</a:t>
             </a:fld>
             <a:endParaRPr lang="fr-CA"/>
           </a:p>
@@ -2094,7 +2095,7 @@
           <a:p>
             <a:fld id="{35C3687D-91A5-7C4D-919D-428BCA0C637B}" type="datetimeFigureOut">
               <a:rPr lang="fr-CA" smtClean="0"/>
-              <a:t>2022-05-02</a:t>
+              <a:t>2022-08-05</a:t>
             </a:fld>
             <a:endParaRPr lang="fr-CA"/>
           </a:p>
@@ -2407,7 +2408,7 @@
           <a:p>
             <a:fld id="{35C3687D-91A5-7C4D-919D-428BCA0C637B}" type="datetimeFigureOut">
               <a:rPr lang="fr-CA" smtClean="0"/>
-              <a:t>2022-05-02</a:t>
+              <a:t>2022-08-05</a:t>
             </a:fld>
             <a:endParaRPr lang="fr-CA"/>
           </a:p>
@@ -2696,7 +2697,7 @@
           <a:p>
             <a:fld id="{35C3687D-91A5-7C4D-919D-428BCA0C637B}" type="datetimeFigureOut">
               <a:rPr lang="fr-CA" smtClean="0"/>
-              <a:t>2022-05-02</a:t>
+              <a:t>2022-08-05</a:t>
             </a:fld>
             <a:endParaRPr lang="fr-CA"/>
           </a:p>
@@ -2939,7 +2940,7 @@
           <a:p>
             <a:fld id="{35C3687D-91A5-7C4D-919D-428BCA0C637B}" type="datetimeFigureOut">
               <a:rPr lang="fr-CA" smtClean="0"/>
-              <a:t>2022-05-02</a:t>
+              <a:t>2022-08-05</a:t>
             </a:fld>
             <a:endParaRPr lang="fr-CA"/>
           </a:p>
@@ -11533,8 +11534,8 @@
           </a:fontRef>
         </p:style>
       </p:cxnSp>
-      <mc:AlternateContent xmlns:mc="http://schemas.openxmlformats.org/markup-compatibility/2006">
-        <mc:Choice xmlns:a14="http://schemas.microsoft.com/office/drawing/2010/main" Requires="a14">
+      <mc:AlternateContent xmlns:mc="http://schemas.openxmlformats.org/markup-compatibility/2006" xmlns:a14="http://schemas.microsoft.com/office/drawing/2010/main">
+        <mc:Choice Requires="a14">
           <p:sp>
             <p:nvSpPr>
               <p:cNvPr id="11" name="TextBox 10">
@@ -11563,6 +11564,7 @@
               </a:bodyPr>
               <a:lstStyle/>
               <a:p>
+                <a:pPr/>
                 <a14:m>
                   <m:oMathPara xmlns:m="http://schemas.openxmlformats.org/officeDocument/2006/math">
                     <m:oMathParaPr>
@@ -11583,7 +11585,7 @@
             </p:txBody>
           </p:sp>
         </mc:Choice>
-        <mc:Fallback>
+        <mc:Fallback xmlns="">
           <p:sp>
             <p:nvSpPr>
               <p:cNvPr id="11" name="TextBox 10">
@@ -11628,8 +11630,8 @@
           </p:sp>
         </mc:Fallback>
       </mc:AlternateContent>
-      <mc:AlternateContent xmlns:mc="http://schemas.openxmlformats.org/markup-compatibility/2006">
-        <mc:Choice xmlns:a14="http://schemas.microsoft.com/office/drawing/2010/main" Requires="a14">
+      <mc:AlternateContent xmlns:mc="http://schemas.openxmlformats.org/markup-compatibility/2006" xmlns:a14="http://schemas.microsoft.com/office/drawing/2010/main">
+        <mc:Choice Requires="a14">
           <p:sp>
             <p:nvSpPr>
               <p:cNvPr id="12" name="TextBox 11">
@@ -11658,6 +11660,7 @@
               </a:bodyPr>
               <a:lstStyle/>
               <a:p>
+                <a:pPr/>
                 <a14:m>
                   <m:oMathPara xmlns:m="http://schemas.openxmlformats.org/officeDocument/2006/math">
                     <m:oMathParaPr>
@@ -11678,7 +11681,7 @@
             </p:txBody>
           </p:sp>
         </mc:Choice>
-        <mc:Fallback>
+        <mc:Fallback xmlns="">
           <p:sp>
             <p:nvSpPr>
               <p:cNvPr id="12" name="TextBox 11">
@@ -11723,8 +11726,8 @@
           </p:sp>
         </mc:Fallback>
       </mc:AlternateContent>
-      <mc:AlternateContent xmlns:mc="http://schemas.openxmlformats.org/markup-compatibility/2006">
-        <mc:Choice xmlns:a14="http://schemas.microsoft.com/office/drawing/2010/main" Requires="a14">
+      <mc:AlternateContent xmlns:mc="http://schemas.openxmlformats.org/markup-compatibility/2006" xmlns:a14="http://schemas.microsoft.com/office/drawing/2010/main">
+        <mc:Choice Requires="a14">
           <p:sp>
             <p:nvSpPr>
               <p:cNvPr id="13" name="TextBox 12">
@@ -11753,6 +11756,7 @@
               </a:bodyPr>
               <a:lstStyle/>
               <a:p>
+                <a:pPr/>
                 <a14:m>
                   <m:oMathPara xmlns:m="http://schemas.openxmlformats.org/officeDocument/2006/math">
                     <m:oMathParaPr>
@@ -11773,7 +11777,7 @@
             </p:txBody>
           </p:sp>
         </mc:Choice>
-        <mc:Fallback>
+        <mc:Fallback xmlns="">
           <p:sp>
             <p:nvSpPr>
               <p:cNvPr id="13" name="TextBox 12">
@@ -11887,6 +11891,2400 @@
     <p:extLst>
       <p:ext uri="{BB962C8B-B14F-4D97-AF65-F5344CB8AC3E}">
         <p14:creationId xmlns:p14="http://schemas.microsoft.com/office/powerpoint/2010/main" val="58764999"/>
+      </p:ext>
+    </p:extLst>
+  </p:cSld>
+  <p:clrMapOvr>
+    <a:masterClrMapping/>
+  </p:clrMapOvr>
+</p:sld>
+</file>
+
+<file path=ppt/slides/slide11.xml><?xml version="1.0" encoding="utf-8"?>
+<p:sld xmlns:a="http://schemas.openxmlformats.org/drawingml/2006/main" xmlns:r="http://schemas.openxmlformats.org/officeDocument/2006/relationships" xmlns:p="http://schemas.openxmlformats.org/presentationml/2006/main">
+  <p:cSld>
+    <p:spTree>
+      <p:nvGrpSpPr>
+        <p:cNvPr id="1" name=""/>
+        <p:cNvGrpSpPr/>
+        <p:nvPr/>
+      </p:nvGrpSpPr>
+      <p:grpSpPr>
+        <a:xfrm>
+          <a:off x="0" y="0"/>
+          <a:ext cx="0" cy="0"/>
+          <a:chOff x="0" y="0"/>
+          <a:chExt cx="0" cy="0"/>
+        </a:xfrm>
+      </p:grpSpPr>
+      <p:sp>
+        <p:nvSpPr>
+          <p:cNvPr id="211" name="Down Arrow 210">
+            <a:extLst>
+              <a:ext uri="{FF2B5EF4-FFF2-40B4-BE49-F238E27FC236}">
+                <a16:creationId xmlns:a16="http://schemas.microsoft.com/office/drawing/2014/main" id="{A24DBBF0-6122-15DF-F65D-2B5C488AA2B6}"/>
+              </a:ext>
+            </a:extLst>
+          </p:cNvPr>
+          <p:cNvSpPr/>
+          <p:nvPr/>
+        </p:nvSpPr>
+        <p:spPr>
+          <a:xfrm>
+            <a:off x="6990434" y="2629796"/>
+            <a:ext cx="323682" cy="690779"/>
+          </a:xfrm>
+          <a:prstGeom prst="downArrow">
+            <a:avLst/>
+          </a:prstGeom>
+        </p:spPr>
+        <p:style>
+          <a:lnRef idx="1">
+            <a:schemeClr val="accent6"/>
+          </a:lnRef>
+          <a:fillRef idx="2">
+            <a:schemeClr val="accent6"/>
+          </a:fillRef>
+          <a:effectRef idx="1">
+            <a:schemeClr val="accent6"/>
+          </a:effectRef>
+          <a:fontRef idx="minor">
+            <a:schemeClr val="dk1"/>
+          </a:fontRef>
+        </p:style>
+        <p:txBody>
+          <a:bodyPr rtlCol="0" anchor="ctr"/>
+          <a:lstStyle/>
+          <a:p>
+            <a:pPr algn="ctr"/>
+            <a:endParaRPr lang="fr-CA" noProof="1"/>
+          </a:p>
+        </p:txBody>
+      </p:sp>
+      <p:sp>
+        <p:nvSpPr>
+          <p:cNvPr id="201" name="Down Arrow 200">
+            <a:extLst>
+              <a:ext uri="{FF2B5EF4-FFF2-40B4-BE49-F238E27FC236}">
+                <a16:creationId xmlns:a16="http://schemas.microsoft.com/office/drawing/2014/main" id="{3074577A-31F2-7999-377E-ED65A6572243}"/>
+              </a:ext>
+            </a:extLst>
+          </p:cNvPr>
+          <p:cNvSpPr/>
+          <p:nvPr/>
+        </p:nvSpPr>
+        <p:spPr>
+          <a:xfrm>
+            <a:off x="4927006" y="2014346"/>
+            <a:ext cx="323682" cy="1294773"/>
+          </a:xfrm>
+          <a:prstGeom prst="downArrow">
+            <a:avLst/>
+          </a:prstGeom>
+        </p:spPr>
+        <p:style>
+          <a:lnRef idx="1">
+            <a:schemeClr val="accent6"/>
+          </a:lnRef>
+          <a:fillRef idx="2">
+            <a:schemeClr val="accent6"/>
+          </a:fillRef>
+          <a:effectRef idx="1">
+            <a:schemeClr val="accent6"/>
+          </a:effectRef>
+          <a:fontRef idx="minor">
+            <a:schemeClr val="dk1"/>
+          </a:fontRef>
+        </p:style>
+        <p:txBody>
+          <a:bodyPr rtlCol="0" anchor="ctr"/>
+          <a:lstStyle/>
+          <a:p>
+            <a:pPr algn="ctr"/>
+            <a:endParaRPr lang="fr-CA" noProof="1"/>
+          </a:p>
+        </p:txBody>
+      </p:sp>
+      <p:sp>
+        <p:nvSpPr>
+          <p:cNvPr id="196" name="Down Arrow 195">
+            <a:extLst>
+              <a:ext uri="{FF2B5EF4-FFF2-40B4-BE49-F238E27FC236}">
+                <a16:creationId xmlns:a16="http://schemas.microsoft.com/office/drawing/2014/main" id="{502BA429-F209-C175-F02A-EC2D3BBC6521}"/>
+              </a:ext>
+            </a:extLst>
+          </p:cNvPr>
+          <p:cNvSpPr/>
+          <p:nvPr/>
+        </p:nvSpPr>
+        <p:spPr>
+          <a:xfrm>
+            <a:off x="4931597" y="1229310"/>
+            <a:ext cx="323682" cy="362898"/>
+          </a:xfrm>
+          <a:prstGeom prst="downArrow">
+            <a:avLst/>
+          </a:prstGeom>
+        </p:spPr>
+        <p:style>
+          <a:lnRef idx="1">
+            <a:schemeClr val="accent6"/>
+          </a:lnRef>
+          <a:fillRef idx="2">
+            <a:schemeClr val="accent6"/>
+          </a:fillRef>
+          <a:effectRef idx="1">
+            <a:schemeClr val="accent6"/>
+          </a:effectRef>
+          <a:fontRef idx="minor">
+            <a:schemeClr val="dk1"/>
+          </a:fontRef>
+        </p:style>
+        <p:txBody>
+          <a:bodyPr rtlCol="0" anchor="ctr"/>
+          <a:lstStyle/>
+          <a:p>
+            <a:pPr algn="ctr"/>
+            <a:endParaRPr lang="fr-CA" noProof="1"/>
+          </a:p>
+        </p:txBody>
+      </p:sp>
+      <p:sp>
+        <p:nvSpPr>
+          <p:cNvPr id="198" name="Down Arrow 197">
+            <a:extLst>
+              <a:ext uri="{FF2B5EF4-FFF2-40B4-BE49-F238E27FC236}">
+                <a16:creationId xmlns:a16="http://schemas.microsoft.com/office/drawing/2014/main" id="{7A4D7948-F9D3-DB8C-CDC1-4509C5BD3B5B}"/>
+              </a:ext>
+            </a:extLst>
+          </p:cNvPr>
+          <p:cNvSpPr/>
+          <p:nvPr/>
+        </p:nvSpPr>
+        <p:spPr>
+          <a:xfrm>
+            <a:off x="6990434" y="572926"/>
+            <a:ext cx="323682" cy="1647283"/>
+          </a:xfrm>
+          <a:prstGeom prst="downArrow">
+            <a:avLst/>
+          </a:prstGeom>
+        </p:spPr>
+        <p:style>
+          <a:lnRef idx="1">
+            <a:schemeClr val="accent6"/>
+          </a:lnRef>
+          <a:fillRef idx="2">
+            <a:schemeClr val="accent6"/>
+          </a:fillRef>
+          <a:effectRef idx="1">
+            <a:schemeClr val="accent6"/>
+          </a:effectRef>
+          <a:fontRef idx="minor">
+            <a:schemeClr val="dk1"/>
+          </a:fontRef>
+        </p:style>
+        <p:txBody>
+          <a:bodyPr rtlCol="0" anchor="ctr"/>
+          <a:lstStyle/>
+          <a:p>
+            <a:pPr algn="ctr"/>
+            <a:endParaRPr lang="fr-CA" noProof="1"/>
+          </a:p>
+        </p:txBody>
+      </p:sp>
+      <p:sp>
+        <p:nvSpPr>
+          <p:cNvPr id="194" name="Down Arrow 193">
+            <a:extLst>
+              <a:ext uri="{FF2B5EF4-FFF2-40B4-BE49-F238E27FC236}">
+                <a16:creationId xmlns:a16="http://schemas.microsoft.com/office/drawing/2014/main" id="{3750694A-D99A-233F-EC77-E22355D01906}"/>
+              </a:ext>
+            </a:extLst>
+          </p:cNvPr>
+          <p:cNvSpPr/>
+          <p:nvPr/>
+        </p:nvSpPr>
+        <p:spPr>
+          <a:xfrm>
+            <a:off x="3868339" y="584384"/>
+            <a:ext cx="323682" cy="362898"/>
+          </a:xfrm>
+          <a:prstGeom prst="downArrow">
+            <a:avLst/>
+          </a:prstGeom>
+        </p:spPr>
+        <p:style>
+          <a:lnRef idx="1">
+            <a:schemeClr val="accent6"/>
+          </a:lnRef>
+          <a:fillRef idx="2">
+            <a:schemeClr val="accent6"/>
+          </a:fillRef>
+          <a:effectRef idx="1">
+            <a:schemeClr val="accent6"/>
+          </a:effectRef>
+          <a:fontRef idx="minor">
+            <a:schemeClr val="dk1"/>
+          </a:fontRef>
+        </p:style>
+        <p:txBody>
+          <a:bodyPr rtlCol="0" anchor="ctr"/>
+          <a:lstStyle/>
+          <a:p>
+            <a:pPr algn="ctr"/>
+            <a:endParaRPr lang="fr-CA" noProof="1"/>
+          </a:p>
+        </p:txBody>
+      </p:sp>
+      <p:sp>
+        <p:nvSpPr>
+          <p:cNvPr id="195" name="Down Arrow 194">
+            <a:extLst>
+              <a:ext uri="{FF2B5EF4-FFF2-40B4-BE49-F238E27FC236}">
+                <a16:creationId xmlns:a16="http://schemas.microsoft.com/office/drawing/2014/main" id="{5A04E056-84BF-1A13-3DBA-0A44E0AF271A}"/>
+              </a:ext>
+            </a:extLst>
+          </p:cNvPr>
+          <p:cNvSpPr/>
+          <p:nvPr/>
+        </p:nvSpPr>
+        <p:spPr>
+          <a:xfrm>
+            <a:off x="5975387" y="575052"/>
+            <a:ext cx="323682" cy="362898"/>
+          </a:xfrm>
+          <a:prstGeom prst="downArrow">
+            <a:avLst/>
+          </a:prstGeom>
+        </p:spPr>
+        <p:style>
+          <a:lnRef idx="1">
+            <a:schemeClr val="accent6"/>
+          </a:lnRef>
+          <a:fillRef idx="2">
+            <a:schemeClr val="accent6"/>
+          </a:fillRef>
+          <a:effectRef idx="1">
+            <a:schemeClr val="accent6"/>
+          </a:effectRef>
+          <a:fontRef idx="minor">
+            <a:schemeClr val="dk1"/>
+          </a:fontRef>
+        </p:style>
+        <p:txBody>
+          <a:bodyPr rtlCol="0" anchor="ctr"/>
+          <a:lstStyle/>
+          <a:p>
+            <a:pPr algn="ctr"/>
+            <a:endParaRPr lang="fr-CA" noProof="1"/>
+          </a:p>
+        </p:txBody>
+      </p:sp>
+      <p:sp>
+        <p:nvSpPr>
+          <p:cNvPr id="193" name="Down Arrow 192">
+            <a:extLst>
+              <a:ext uri="{FF2B5EF4-FFF2-40B4-BE49-F238E27FC236}">
+                <a16:creationId xmlns:a16="http://schemas.microsoft.com/office/drawing/2014/main" id="{0B626C21-6CAD-C5A1-70FD-C74A932F94E0}"/>
+              </a:ext>
+            </a:extLst>
+          </p:cNvPr>
+          <p:cNvSpPr/>
+          <p:nvPr/>
+        </p:nvSpPr>
+        <p:spPr>
+          <a:xfrm>
+            <a:off x="4931597" y="577177"/>
+            <a:ext cx="323682" cy="362898"/>
+          </a:xfrm>
+          <a:prstGeom prst="downArrow">
+            <a:avLst/>
+          </a:prstGeom>
+        </p:spPr>
+        <p:style>
+          <a:lnRef idx="1">
+            <a:schemeClr val="accent6"/>
+          </a:lnRef>
+          <a:fillRef idx="2">
+            <a:schemeClr val="accent6"/>
+          </a:fillRef>
+          <a:effectRef idx="1">
+            <a:schemeClr val="accent6"/>
+          </a:effectRef>
+          <a:fontRef idx="minor">
+            <a:schemeClr val="dk1"/>
+          </a:fontRef>
+        </p:style>
+        <p:txBody>
+          <a:bodyPr rtlCol="0" anchor="ctr"/>
+          <a:lstStyle/>
+          <a:p>
+            <a:pPr algn="ctr"/>
+            <a:endParaRPr lang="fr-CA" noProof="1"/>
+          </a:p>
+        </p:txBody>
+      </p:sp>
+      <p:sp>
+        <p:nvSpPr>
+          <p:cNvPr id="4" name="Rectangle 3">
+            <a:extLst>
+              <a:ext uri="{FF2B5EF4-FFF2-40B4-BE49-F238E27FC236}">
+                <a16:creationId xmlns:a16="http://schemas.microsoft.com/office/drawing/2014/main" id="{B86B956B-7045-52E8-B718-6603A16CE59E}"/>
+              </a:ext>
+            </a:extLst>
+          </p:cNvPr>
+          <p:cNvSpPr/>
+          <p:nvPr/>
+        </p:nvSpPr>
+        <p:spPr>
+          <a:xfrm>
+            <a:off x="3749316" y="935825"/>
+            <a:ext cx="2676053" cy="411382"/>
+          </a:xfrm>
+          <a:prstGeom prst="rect">
+            <a:avLst/>
+          </a:prstGeom>
+        </p:spPr>
+        <p:style>
+          <a:lnRef idx="2">
+            <a:schemeClr val="accent6"/>
+          </a:lnRef>
+          <a:fillRef idx="1">
+            <a:schemeClr val="lt1"/>
+          </a:fillRef>
+          <a:effectRef idx="0">
+            <a:schemeClr val="accent6"/>
+          </a:effectRef>
+          <a:fontRef idx="minor">
+            <a:schemeClr val="dk1"/>
+          </a:fontRef>
+        </p:style>
+        <p:txBody>
+          <a:bodyPr rtlCol="0" anchor="ctr"/>
+          <a:lstStyle/>
+          <a:p>
+            <a:pPr marL="171450" indent="-171450">
+              <a:buFontTx/>
+              <a:buChar char="-"/>
+            </a:pPr>
+            <a:r>
+              <a:rPr lang="fr-CA" sz="1400" noProof="1"/>
+              <a:t>pd.read_csv()</a:t>
+            </a:r>
+          </a:p>
+          <a:p>
+            <a:pPr marL="171450" indent="-171450">
+              <a:buFontTx/>
+              <a:buChar char="-"/>
+            </a:pPr>
+            <a:r>
+              <a:rPr lang="fr-CA" sz="1400" noProof="1"/>
+              <a:t>pd.read_excel()</a:t>
+            </a:r>
+          </a:p>
+        </p:txBody>
+      </p:sp>
+      <p:sp>
+        <p:nvSpPr>
+          <p:cNvPr id="6" name="Can 5">
+            <a:extLst>
+              <a:ext uri="{FF2B5EF4-FFF2-40B4-BE49-F238E27FC236}">
+                <a16:creationId xmlns:a16="http://schemas.microsoft.com/office/drawing/2014/main" id="{81444611-7366-F412-0F7E-FBF73807E6BE}"/>
+              </a:ext>
+            </a:extLst>
+          </p:cNvPr>
+          <p:cNvSpPr/>
+          <p:nvPr/>
+        </p:nvSpPr>
+        <p:spPr>
+          <a:xfrm>
+            <a:off x="5857001" y="171525"/>
+            <a:ext cx="572812" cy="411381"/>
+          </a:xfrm>
+          <a:prstGeom prst="can">
+            <a:avLst/>
+          </a:prstGeom>
+        </p:spPr>
+        <p:style>
+          <a:lnRef idx="2">
+            <a:schemeClr val="accent6"/>
+          </a:lnRef>
+          <a:fillRef idx="1">
+            <a:schemeClr val="lt1"/>
+          </a:fillRef>
+          <a:effectRef idx="0">
+            <a:schemeClr val="accent6"/>
+          </a:effectRef>
+          <a:fontRef idx="minor">
+            <a:schemeClr val="dk1"/>
+          </a:fontRef>
+        </p:style>
+        <p:txBody>
+          <a:bodyPr rtlCol="0" anchor="ctr"/>
+          <a:lstStyle/>
+          <a:p>
+            <a:pPr algn="ctr"/>
+            <a:r>
+              <a:rPr lang="fr-CA" sz="1400" noProof="1"/>
+              <a:t>Excel</a:t>
+            </a:r>
+          </a:p>
+        </p:txBody>
+      </p:sp>
+      <p:sp>
+        <p:nvSpPr>
+          <p:cNvPr id="7" name="Can 6">
+            <a:extLst>
+              <a:ext uri="{FF2B5EF4-FFF2-40B4-BE49-F238E27FC236}">
+                <a16:creationId xmlns:a16="http://schemas.microsoft.com/office/drawing/2014/main" id="{A232841B-8886-86F1-1004-4BA50722E811}"/>
+              </a:ext>
+            </a:extLst>
+          </p:cNvPr>
+          <p:cNvSpPr/>
+          <p:nvPr/>
+        </p:nvSpPr>
+        <p:spPr>
+          <a:xfrm>
+            <a:off x="3749316" y="171525"/>
+            <a:ext cx="572812" cy="411381"/>
+          </a:xfrm>
+          <a:prstGeom prst="can">
+            <a:avLst/>
+          </a:prstGeom>
+        </p:spPr>
+        <p:style>
+          <a:lnRef idx="2">
+            <a:schemeClr val="accent6"/>
+          </a:lnRef>
+          <a:fillRef idx="1">
+            <a:schemeClr val="lt1"/>
+          </a:fillRef>
+          <a:effectRef idx="0">
+            <a:schemeClr val="accent6"/>
+          </a:effectRef>
+          <a:fontRef idx="minor">
+            <a:schemeClr val="dk1"/>
+          </a:fontRef>
+        </p:style>
+        <p:txBody>
+          <a:bodyPr rtlCol="0" anchor="ctr"/>
+          <a:lstStyle/>
+          <a:p>
+            <a:pPr algn="ctr"/>
+            <a:r>
+              <a:rPr lang="fr-CA" sz="1400" noProof="1"/>
+              <a:t>csv</a:t>
+            </a:r>
+          </a:p>
+        </p:txBody>
+      </p:sp>
+      <p:sp>
+        <p:nvSpPr>
+          <p:cNvPr id="8" name="Can 7">
+            <a:extLst>
+              <a:ext uri="{FF2B5EF4-FFF2-40B4-BE49-F238E27FC236}">
+                <a16:creationId xmlns:a16="http://schemas.microsoft.com/office/drawing/2014/main" id="{A853D765-6DAD-046D-C056-CEB1B33C3476}"/>
+              </a:ext>
+            </a:extLst>
+          </p:cNvPr>
+          <p:cNvSpPr/>
+          <p:nvPr/>
+        </p:nvSpPr>
+        <p:spPr>
+          <a:xfrm>
+            <a:off x="4797790" y="170047"/>
+            <a:ext cx="572812" cy="411381"/>
+          </a:xfrm>
+          <a:prstGeom prst="can">
+            <a:avLst/>
+          </a:prstGeom>
+        </p:spPr>
+        <p:style>
+          <a:lnRef idx="2">
+            <a:schemeClr val="accent6"/>
+          </a:lnRef>
+          <a:fillRef idx="1">
+            <a:schemeClr val="lt1"/>
+          </a:fillRef>
+          <a:effectRef idx="0">
+            <a:schemeClr val="accent6"/>
+          </a:effectRef>
+          <a:fontRef idx="minor">
+            <a:schemeClr val="dk1"/>
+          </a:fontRef>
+        </p:style>
+        <p:txBody>
+          <a:bodyPr rtlCol="0" anchor="ctr"/>
+          <a:lstStyle/>
+          <a:p>
+            <a:pPr algn="ctr"/>
+            <a:r>
+              <a:rPr lang="fr-CA" sz="1400" noProof="1"/>
+              <a:t>txt</a:t>
+            </a:r>
+          </a:p>
+        </p:txBody>
+      </p:sp>
+      <p:sp>
+        <p:nvSpPr>
+          <p:cNvPr id="9" name="Can 8">
+            <a:extLst>
+              <a:ext uri="{FF2B5EF4-FFF2-40B4-BE49-F238E27FC236}">
+                <a16:creationId xmlns:a16="http://schemas.microsoft.com/office/drawing/2014/main" id="{F6E06393-4CE1-9613-6722-0AEF9C52514A}"/>
+              </a:ext>
+            </a:extLst>
+          </p:cNvPr>
+          <p:cNvSpPr/>
+          <p:nvPr/>
+        </p:nvSpPr>
+        <p:spPr>
+          <a:xfrm>
+            <a:off x="6877945" y="170047"/>
+            <a:ext cx="572812" cy="411381"/>
+          </a:xfrm>
+          <a:prstGeom prst="can">
+            <a:avLst/>
+          </a:prstGeom>
+        </p:spPr>
+        <p:style>
+          <a:lnRef idx="2">
+            <a:schemeClr val="accent6"/>
+          </a:lnRef>
+          <a:fillRef idx="1">
+            <a:schemeClr val="lt1"/>
+          </a:fillRef>
+          <a:effectRef idx="0">
+            <a:schemeClr val="accent6"/>
+          </a:effectRef>
+          <a:fontRef idx="minor">
+            <a:schemeClr val="dk1"/>
+          </a:fontRef>
+        </p:style>
+        <p:txBody>
+          <a:bodyPr rtlCol="0" anchor="ctr"/>
+          <a:lstStyle/>
+          <a:p>
+            <a:pPr algn="ctr"/>
+            <a:r>
+              <a:rPr lang="fr-CA" sz="1400" noProof="1"/>
+              <a:t>c3d</a:t>
+            </a:r>
+          </a:p>
+        </p:txBody>
+      </p:sp>
+      <p:sp>
+        <p:nvSpPr>
+          <p:cNvPr id="13" name="Rectangle 12">
+            <a:extLst>
+              <a:ext uri="{FF2B5EF4-FFF2-40B4-BE49-F238E27FC236}">
+                <a16:creationId xmlns:a16="http://schemas.microsoft.com/office/drawing/2014/main" id="{3FEDA4A0-4BD3-C36F-009E-91E8C98BA2F5}"/>
+              </a:ext>
+            </a:extLst>
+          </p:cNvPr>
+          <p:cNvSpPr/>
+          <p:nvPr/>
+        </p:nvSpPr>
+        <p:spPr>
+          <a:xfrm>
+            <a:off x="6361404" y="2223164"/>
+            <a:ext cx="1617232" cy="411381"/>
+          </a:xfrm>
+          <a:prstGeom prst="rect">
+            <a:avLst/>
+          </a:prstGeom>
+        </p:spPr>
+        <p:style>
+          <a:lnRef idx="2">
+            <a:schemeClr val="accent6"/>
+          </a:lnRef>
+          <a:fillRef idx="1">
+            <a:schemeClr val="lt1"/>
+          </a:fillRef>
+          <a:effectRef idx="0">
+            <a:schemeClr val="accent6"/>
+          </a:effectRef>
+          <a:fontRef idx="minor">
+            <a:schemeClr val="dk1"/>
+          </a:fontRef>
+        </p:style>
+        <p:txBody>
+          <a:bodyPr rtlCol="0" anchor="ctr"/>
+          <a:lstStyle/>
+          <a:p>
+            <a:pPr algn="ctr"/>
+            <a:r>
+              <a:rPr lang="fr-CA" sz="1400" noProof="1"/>
+              <a:t>ktk.read_c3d()</a:t>
+            </a:r>
+          </a:p>
+        </p:txBody>
+      </p:sp>
+      <p:sp>
+        <p:nvSpPr>
+          <p:cNvPr id="14" name="Rectangle 13">
+            <a:extLst>
+              <a:ext uri="{FF2B5EF4-FFF2-40B4-BE49-F238E27FC236}">
+                <a16:creationId xmlns:a16="http://schemas.microsoft.com/office/drawing/2014/main" id="{F4707AD9-2334-B9CC-6B1D-7D6571F7C10D}"/>
+              </a:ext>
+            </a:extLst>
+          </p:cNvPr>
+          <p:cNvSpPr/>
+          <p:nvPr/>
+        </p:nvSpPr>
+        <p:spPr>
+          <a:xfrm>
+            <a:off x="3749316" y="1601661"/>
+            <a:ext cx="2676055" cy="414335"/>
+          </a:xfrm>
+          <a:prstGeom prst="rect">
+            <a:avLst/>
+          </a:prstGeom>
+        </p:spPr>
+        <p:style>
+          <a:lnRef idx="2">
+            <a:schemeClr val="accent6"/>
+          </a:lnRef>
+          <a:fillRef idx="1">
+            <a:schemeClr val="lt1"/>
+          </a:fillRef>
+          <a:effectRef idx="0">
+            <a:schemeClr val="accent6"/>
+          </a:effectRef>
+          <a:fontRef idx="minor">
+            <a:schemeClr val="dk1"/>
+          </a:fontRef>
+        </p:style>
+        <p:txBody>
+          <a:bodyPr rtlCol="0" anchor="ctr"/>
+          <a:lstStyle/>
+          <a:p>
+            <a:r>
+              <a:rPr lang="fr-CA" sz="1400" noProof="1"/>
+              <a:t>ktk.TimeSeries.from_dataframe()</a:t>
+            </a:r>
+          </a:p>
+        </p:txBody>
+      </p:sp>
+      <p:sp>
+        <p:nvSpPr>
+          <p:cNvPr id="212" name="Down Arrow 211">
+            <a:extLst>
+              <a:ext uri="{FF2B5EF4-FFF2-40B4-BE49-F238E27FC236}">
+                <a16:creationId xmlns:a16="http://schemas.microsoft.com/office/drawing/2014/main" id="{5B1F1C25-BC9A-1095-2D18-8DCED43D5A95}"/>
+              </a:ext>
+            </a:extLst>
+          </p:cNvPr>
+          <p:cNvSpPr/>
+          <p:nvPr/>
+        </p:nvSpPr>
+        <p:spPr>
+          <a:xfrm>
+            <a:off x="8677915" y="2616112"/>
+            <a:ext cx="323682" cy="690779"/>
+          </a:xfrm>
+          <a:prstGeom prst="downArrow">
+            <a:avLst/>
+          </a:prstGeom>
+        </p:spPr>
+        <p:style>
+          <a:lnRef idx="1">
+            <a:schemeClr val="accent6"/>
+          </a:lnRef>
+          <a:fillRef idx="2">
+            <a:schemeClr val="accent6"/>
+          </a:fillRef>
+          <a:effectRef idx="1">
+            <a:schemeClr val="accent6"/>
+          </a:effectRef>
+          <a:fontRef idx="minor">
+            <a:schemeClr val="dk1"/>
+          </a:fontRef>
+        </p:style>
+        <p:txBody>
+          <a:bodyPr rtlCol="0" anchor="ctr"/>
+          <a:lstStyle/>
+          <a:p>
+            <a:pPr algn="ctr"/>
+            <a:endParaRPr lang="fr-CA" noProof="1"/>
+          </a:p>
+        </p:txBody>
+      </p:sp>
+      <p:sp>
+        <p:nvSpPr>
+          <p:cNvPr id="200" name="Down Arrow 199">
+            <a:extLst>
+              <a:ext uri="{FF2B5EF4-FFF2-40B4-BE49-F238E27FC236}">
+                <a16:creationId xmlns:a16="http://schemas.microsoft.com/office/drawing/2014/main" id="{7D4DA4DB-F949-96F4-0551-D78DE0D2A42C}"/>
+              </a:ext>
+            </a:extLst>
+          </p:cNvPr>
+          <p:cNvSpPr/>
+          <p:nvPr/>
+        </p:nvSpPr>
+        <p:spPr>
+          <a:xfrm>
+            <a:off x="8675149" y="568300"/>
+            <a:ext cx="323682" cy="1647283"/>
+          </a:xfrm>
+          <a:prstGeom prst="downArrow">
+            <a:avLst/>
+          </a:prstGeom>
+        </p:spPr>
+        <p:style>
+          <a:lnRef idx="1">
+            <a:schemeClr val="accent6"/>
+          </a:lnRef>
+          <a:fillRef idx="2">
+            <a:schemeClr val="accent6"/>
+          </a:fillRef>
+          <a:effectRef idx="1">
+            <a:schemeClr val="accent6"/>
+          </a:effectRef>
+          <a:fontRef idx="minor">
+            <a:schemeClr val="dk1"/>
+          </a:fontRef>
+        </p:style>
+        <p:txBody>
+          <a:bodyPr rtlCol="0" anchor="ctr"/>
+          <a:lstStyle/>
+          <a:p>
+            <a:pPr algn="ctr"/>
+            <a:endParaRPr lang="fr-CA" noProof="1"/>
+          </a:p>
+        </p:txBody>
+      </p:sp>
+      <p:sp>
+        <p:nvSpPr>
+          <p:cNvPr id="11" name="Can 10">
+            <a:extLst>
+              <a:ext uri="{FF2B5EF4-FFF2-40B4-BE49-F238E27FC236}">
+                <a16:creationId xmlns:a16="http://schemas.microsoft.com/office/drawing/2014/main" id="{BC5F889C-0CB6-B29E-A5AC-FCEAE70A10E0}"/>
+              </a:ext>
+            </a:extLst>
+          </p:cNvPr>
+          <p:cNvSpPr/>
+          <p:nvPr/>
+        </p:nvSpPr>
+        <p:spPr>
+          <a:xfrm>
+            <a:off x="8492497" y="170047"/>
+            <a:ext cx="688987" cy="411381"/>
+          </a:xfrm>
+          <a:prstGeom prst="can">
+            <a:avLst/>
+          </a:prstGeom>
+        </p:spPr>
+        <p:style>
+          <a:lnRef idx="2">
+            <a:schemeClr val="accent6"/>
+          </a:lnRef>
+          <a:fillRef idx="1">
+            <a:schemeClr val="lt1"/>
+          </a:fillRef>
+          <a:effectRef idx="0">
+            <a:schemeClr val="accent6"/>
+          </a:effectRef>
+          <a:fontRef idx="minor">
+            <a:schemeClr val="dk1"/>
+          </a:fontRef>
+        </p:style>
+        <p:txBody>
+          <a:bodyPr rtlCol="0" anchor="ctr"/>
+          <a:lstStyle/>
+          <a:p>
+            <a:pPr algn="ctr"/>
+            <a:r>
+              <a:rPr lang="fr-CA" sz="1400" noProof="1"/>
+              <a:t>ktk.zip</a:t>
+            </a:r>
+          </a:p>
+        </p:txBody>
+      </p:sp>
+      <p:sp>
+        <p:nvSpPr>
+          <p:cNvPr id="15" name="Rectangle 14">
+            <a:extLst>
+              <a:ext uri="{FF2B5EF4-FFF2-40B4-BE49-F238E27FC236}">
+                <a16:creationId xmlns:a16="http://schemas.microsoft.com/office/drawing/2014/main" id="{90F8C9E6-5F07-68C1-24AB-63BD5EDBACA9}"/>
+              </a:ext>
+            </a:extLst>
+          </p:cNvPr>
+          <p:cNvSpPr/>
+          <p:nvPr/>
+        </p:nvSpPr>
+        <p:spPr>
+          <a:xfrm>
+            <a:off x="8351400" y="2224052"/>
+            <a:ext cx="962262" cy="410493"/>
+          </a:xfrm>
+          <a:prstGeom prst="rect">
+            <a:avLst/>
+          </a:prstGeom>
+        </p:spPr>
+        <p:style>
+          <a:lnRef idx="2">
+            <a:schemeClr val="accent6"/>
+          </a:lnRef>
+          <a:fillRef idx="1">
+            <a:schemeClr val="lt1"/>
+          </a:fillRef>
+          <a:effectRef idx="0">
+            <a:schemeClr val="accent6"/>
+          </a:effectRef>
+          <a:fontRef idx="minor">
+            <a:schemeClr val="dk1"/>
+          </a:fontRef>
+        </p:style>
+        <p:txBody>
+          <a:bodyPr rtlCol="0" anchor="ctr"/>
+          <a:lstStyle/>
+          <a:p>
+            <a:pPr algn="ctr"/>
+            <a:r>
+              <a:rPr lang="fr-CA" sz="1400" noProof="1"/>
+              <a:t>ktk.load()</a:t>
+            </a:r>
+          </a:p>
+        </p:txBody>
+      </p:sp>
+      <p:sp>
+        <p:nvSpPr>
+          <p:cNvPr id="222" name="Down Arrow 221">
+            <a:extLst>
+              <a:ext uri="{FF2B5EF4-FFF2-40B4-BE49-F238E27FC236}">
+                <a16:creationId xmlns:a16="http://schemas.microsoft.com/office/drawing/2014/main" id="{BE4DB92A-9918-ED4A-A1E3-18F4CF670216}"/>
+              </a:ext>
+            </a:extLst>
+          </p:cNvPr>
+          <p:cNvSpPr/>
+          <p:nvPr/>
+        </p:nvSpPr>
+        <p:spPr>
+          <a:xfrm>
+            <a:off x="4929723" y="5182906"/>
+            <a:ext cx="323682" cy="362898"/>
+          </a:xfrm>
+          <a:prstGeom prst="downArrow">
+            <a:avLst/>
+          </a:prstGeom>
+        </p:spPr>
+        <p:style>
+          <a:lnRef idx="1">
+            <a:schemeClr val="accent2"/>
+          </a:lnRef>
+          <a:fillRef idx="2">
+            <a:schemeClr val="accent2"/>
+          </a:fillRef>
+          <a:effectRef idx="1">
+            <a:schemeClr val="accent2"/>
+          </a:effectRef>
+          <a:fontRef idx="minor">
+            <a:schemeClr val="dk1"/>
+          </a:fontRef>
+        </p:style>
+        <p:txBody>
+          <a:bodyPr rtlCol="0" anchor="ctr"/>
+          <a:lstStyle/>
+          <a:p>
+            <a:pPr algn="ctr"/>
+            <a:endParaRPr lang="fr-CA" noProof="1"/>
+          </a:p>
+        </p:txBody>
+      </p:sp>
+      <p:sp>
+        <p:nvSpPr>
+          <p:cNvPr id="256" name="Down Arrow 255">
+            <a:extLst>
+              <a:ext uri="{FF2B5EF4-FFF2-40B4-BE49-F238E27FC236}">
+                <a16:creationId xmlns:a16="http://schemas.microsoft.com/office/drawing/2014/main" id="{F9E363BA-C644-F2A0-EDEC-922D2AA60D15}"/>
+              </a:ext>
+            </a:extLst>
+          </p:cNvPr>
+          <p:cNvSpPr/>
+          <p:nvPr/>
+        </p:nvSpPr>
+        <p:spPr>
+          <a:xfrm>
+            <a:off x="4925501" y="3720942"/>
+            <a:ext cx="323682" cy="1153147"/>
+          </a:xfrm>
+          <a:prstGeom prst="downArrow">
+            <a:avLst/>
+          </a:prstGeom>
+        </p:spPr>
+        <p:style>
+          <a:lnRef idx="1">
+            <a:schemeClr val="accent2"/>
+          </a:lnRef>
+          <a:fillRef idx="2">
+            <a:schemeClr val="accent2"/>
+          </a:fillRef>
+          <a:effectRef idx="1">
+            <a:schemeClr val="accent2"/>
+          </a:effectRef>
+          <a:fontRef idx="minor">
+            <a:schemeClr val="dk1"/>
+          </a:fontRef>
+        </p:style>
+        <p:txBody>
+          <a:bodyPr rtlCol="0" anchor="ctr"/>
+          <a:lstStyle/>
+          <a:p>
+            <a:pPr algn="ctr"/>
+            <a:endParaRPr lang="fr-CA" noProof="1"/>
+          </a:p>
+        </p:txBody>
+      </p:sp>
+      <p:sp>
+        <p:nvSpPr>
+          <p:cNvPr id="257" name="Down Arrow 256">
+            <a:extLst>
+              <a:ext uri="{FF2B5EF4-FFF2-40B4-BE49-F238E27FC236}">
+                <a16:creationId xmlns:a16="http://schemas.microsoft.com/office/drawing/2014/main" id="{EB8B595B-D7B6-DAE2-4AAE-5B3FD2E15CE0}"/>
+              </a:ext>
+            </a:extLst>
+          </p:cNvPr>
+          <p:cNvSpPr/>
+          <p:nvPr/>
+        </p:nvSpPr>
+        <p:spPr>
+          <a:xfrm>
+            <a:off x="6990434" y="3721115"/>
+            <a:ext cx="323682" cy="362898"/>
+          </a:xfrm>
+          <a:prstGeom prst="downArrow">
+            <a:avLst/>
+          </a:prstGeom>
+        </p:spPr>
+        <p:style>
+          <a:lnRef idx="1">
+            <a:schemeClr val="accent2"/>
+          </a:lnRef>
+          <a:fillRef idx="2">
+            <a:schemeClr val="accent2"/>
+          </a:fillRef>
+          <a:effectRef idx="1">
+            <a:schemeClr val="accent2"/>
+          </a:effectRef>
+          <a:fontRef idx="minor">
+            <a:schemeClr val="dk1"/>
+          </a:fontRef>
+        </p:style>
+        <p:txBody>
+          <a:bodyPr rtlCol="0" anchor="ctr"/>
+          <a:lstStyle/>
+          <a:p>
+            <a:pPr algn="ctr"/>
+            <a:endParaRPr lang="fr-CA" noProof="1"/>
+          </a:p>
+        </p:txBody>
+      </p:sp>
+      <p:sp>
+        <p:nvSpPr>
+          <p:cNvPr id="258" name="Down Arrow 257">
+            <a:extLst>
+              <a:ext uri="{FF2B5EF4-FFF2-40B4-BE49-F238E27FC236}">
+                <a16:creationId xmlns:a16="http://schemas.microsoft.com/office/drawing/2014/main" id="{577B6831-ED7E-DB2B-850B-6C14042EAFDF}"/>
+              </a:ext>
+            </a:extLst>
+          </p:cNvPr>
+          <p:cNvSpPr/>
+          <p:nvPr/>
+        </p:nvSpPr>
+        <p:spPr>
+          <a:xfrm>
+            <a:off x="8670690" y="3720942"/>
+            <a:ext cx="323682" cy="362899"/>
+          </a:xfrm>
+          <a:prstGeom prst="downArrow">
+            <a:avLst/>
+          </a:prstGeom>
+        </p:spPr>
+        <p:style>
+          <a:lnRef idx="1">
+            <a:schemeClr val="accent2"/>
+          </a:lnRef>
+          <a:fillRef idx="2">
+            <a:schemeClr val="accent2"/>
+          </a:fillRef>
+          <a:effectRef idx="1">
+            <a:schemeClr val="accent2"/>
+          </a:effectRef>
+          <a:fontRef idx="minor">
+            <a:schemeClr val="dk1"/>
+          </a:fontRef>
+        </p:style>
+        <p:txBody>
+          <a:bodyPr rtlCol="0" anchor="ctr"/>
+          <a:lstStyle/>
+          <a:p>
+            <a:pPr algn="ctr"/>
+            <a:endParaRPr lang="fr-CA" noProof="1"/>
+          </a:p>
+        </p:txBody>
+      </p:sp>
+      <p:sp>
+        <p:nvSpPr>
+          <p:cNvPr id="259" name="Down Arrow 258">
+            <a:extLst>
+              <a:ext uri="{FF2B5EF4-FFF2-40B4-BE49-F238E27FC236}">
+                <a16:creationId xmlns:a16="http://schemas.microsoft.com/office/drawing/2014/main" id="{E832D934-029D-EC7B-CEC0-2A5D3A1C2F98}"/>
+              </a:ext>
+            </a:extLst>
+          </p:cNvPr>
+          <p:cNvSpPr/>
+          <p:nvPr/>
+        </p:nvSpPr>
+        <p:spPr>
+          <a:xfrm>
+            <a:off x="3873881" y="5929424"/>
+            <a:ext cx="323682" cy="362898"/>
+          </a:xfrm>
+          <a:prstGeom prst="downArrow">
+            <a:avLst/>
+          </a:prstGeom>
+        </p:spPr>
+        <p:style>
+          <a:lnRef idx="1">
+            <a:schemeClr val="accent2"/>
+          </a:lnRef>
+          <a:fillRef idx="2">
+            <a:schemeClr val="accent2"/>
+          </a:fillRef>
+          <a:effectRef idx="1">
+            <a:schemeClr val="accent2"/>
+          </a:effectRef>
+          <a:fontRef idx="minor">
+            <a:schemeClr val="dk1"/>
+          </a:fontRef>
+        </p:style>
+        <p:txBody>
+          <a:bodyPr rtlCol="0" anchor="ctr"/>
+          <a:lstStyle/>
+          <a:p>
+            <a:pPr algn="ctr"/>
+            <a:endParaRPr lang="fr-CA" noProof="1"/>
+          </a:p>
+        </p:txBody>
+      </p:sp>
+      <p:sp>
+        <p:nvSpPr>
+          <p:cNvPr id="260" name="Down Arrow 259">
+            <a:extLst>
+              <a:ext uri="{FF2B5EF4-FFF2-40B4-BE49-F238E27FC236}">
+                <a16:creationId xmlns:a16="http://schemas.microsoft.com/office/drawing/2014/main" id="{F362161D-6A15-FF1E-F930-DBF525F3C9D2}"/>
+              </a:ext>
+            </a:extLst>
+          </p:cNvPr>
+          <p:cNvSpPr/>
+          <p:nvPr/>
+        </p:nvSpPr>
+        <p:spPr>
+          <a:xfrm>
+            <a:off x="4921756" y="5929424"/>
+            <a:ext cx="323682" cy="362898"/>
+          </a:xfrm>
+          <a:prstGeom prst="downArrow">
+            <a:avLst/>
+          </a:prstGeom>
+        </p:spPr>
+        <p:style>
+          <a:lnRef idx="1">
+            <a:schemeClr val="accent2"/>
+          </a:lnRef>
+          <a:fillRef idx="2">
+            <a:schemeClr val="accent2"/>
+          </a:fillRef>
+          <a:effectRef idx="1">
+            <a:schemeClr val="accent2"/>
+          </a:effectRef>
+          <a:fontRef idx="minor">
+            <a:schemeClr val="dk1"/>
+          </a:fontRef>
+        </p:style>
+        <p:txBody>
+          <a:bodyPr rtlCol="0" anchor="ctr"/>
+          <a:lstStyle/>
+          <a:p>
+            <a:pPr algn="ctr"/>
+            <a:endParaRPr lang="fr-CA" noProof="1"/>
+          </a:p>
+        </p:txBody>
+      </p:sp>
+      <p:sp>
+        <p:nvSpPr>
+          <p:cNvPr id="261" name="Down Arrow 260">
+            <a:extLst>
+              <a:ext uri="{FF2B5EF4-FFF2-40B4-BE49-F238E27FC236}">
+                <a16:creationId xmlns:a16="http://schemas.microsoft.com/office/drawing/2014/main" id="{CE1A9F3A-BFAC-8757-B15F-210BEBF21C7E}"/>
+              </a:ext>
+            </a:extLst>
+          </p:cNvPr>
+          <p:cNvSpPr/>
+          <p:nvPr/>
+        </p:nvSpPr>
+        <p:spPr>
+          <a:xfrm>
+            <a:off x="5969631" y="5942435"/>
+            <a:ext cx="323682" cy="362898"/>
+          </a:xfrm>
+          <a:prstGeom prst="downArrow">
+            <a:avLst/>
+          </a:prstGeom>
+        </p:spPr>
+        <p:style>
+          <a:lnRef idx="1">
+            <a:schemeClr val="accent2"/>
+          </a:lnRef>
+          <a:fillRef idx="2">
+            <a:schemeClr val="accent2"/>
+          </a:fillRef>
+          <a:effectRef idx="1">
+            <a:schemeClr val="accent2"/>
+          </a:effectRef>
+          <a:fontRef idx="minor">
+            <a:schemeClr val="dk1"/>
+          </a:fontRef>
+        </p:style>
+        <p:txBody>
+          <a:bodyPr rtlCol="0" anchor="ctr"/>
+          <a:lstStyle/>
+          <a:p>
+            <a:pPr algn="ctr"/>
+            <a:endParaRPr lang="fr-CA" noProof="1"/>
+          </a:p>
+        </p:txBody>
+      </p:sp>
+      <p:sp>
+        <p:nvSpPr>
+          <p:cNvPr id="262" name="Down Arrow 261">
+            <a:extLst>
+              <a:ext uri="{FF2B5EF4-FFF2-40B4-BE49-F238E27FC236}">
+                <a16:creationId xmlns:a16="http://schemas.microsoft.com/office/drawing/2014/main" id="{1E4A081D-9287-2267-B259-1623FDBD09B8}"/>
+              </a:ext>
+            </a:extLst>
+          </p:cNvPr>
+          <p:cNvSpPr/>
+          <p:nvPr/>
+        </p:nvSpPr>
+        <p:spPr>
+          <a:xfrm>
+            <a:off x="8676049" y="4491577"/>
+            <a:ext cx="323682" cy="1804044"/>
+          </a:xfrm>
+          <a:prstGeom prst="downArrow">
+            <a:avLst/>
+          </a:prstGeom>
+        </p:spPr>
+        <p:style>
+          <a:lnRef idx="1">
+            <a:schemeClr val="accent2"/>
+          </a:lnRef>
+          <a:fillRef idx="2">
+            <a:schemeClr val="accent2"/>
+          </a:fillRef>
+          <a:effectRef idx="1">
+            <a:schemeClr val="accent2"/>
+          </a:effectRef>
+          <a:fontRef idx="minor">
+            <a:schemeClr val="dk1"/>
+          </a:fontRef>
+        </p:style>
+        <p:txBody>
+          <a:bodyPr rtlCol="0" anchor="ctr"/>
+          <a:lstStyle/>
+          <a:p>
+            <a:pPr algn="ctr"/>
+            <a:endParaRPr lang="fr-CA" noProof="1"/>
+          </a:p>
+        </p:txBody>
+      </p:sp>
+      <p:sp>
+        <p:nvSpPr>
+          <p:cNvPr id="263" name="Down Arrow 262">
+            <a:extLst>
+              <a:ext uri="{FF2B5EF4-FFF2-40B4-BE49-F238E27FC236}">
+                <a16:creationId xmlns:a16="http://schemas.microsoft.com/office/drawing/2014/main" id="{31C2C427-0903-190C-87B4-42B58463213E}"/>
+              </a:ext>
+            </a:extLst>
+          </p:cNvPr>
+          <p:cNvSpPr/>
+          <p:nvPr/>
+        </p:nvSpPr>
+        <p:spPr>
+          <a:xfrm>
+            <a:off x="6990434" y="4491577"/>
+            <a:ext cx="323682" cy="1813756"/>
+          </a:xfrm>
+          <a:prstGeom prst="downArrow">
+            <a:avLst/>
+          </a:prstGeom>
+        </p:spPr>
+        <p:style>
+          <a:lnRef idx="1">
+            <a:schemeClr val="accent2"/>
+          </a:lnRef>
+          <a:fillRef idx="2">
+            <a:schemeClr val="accent2"/>
+          </a:fillRef>
+          <a:effectRef idx="1">
+            <a:schemeClr val="accent2"/>
+          </a:effectRef>
+          <a:fontRef idx="minor">
+            <a:schemeClr val="dk1"/>
+          </a:fontRef>
+        </p:style>
+        <p:txBody>
+          <a:bodyPr rtlCol="0" anchor="ctr"/>
+          <a:lstStyle/>
+          <a:p>
+            <a:pPr algn="ctr"/>
+            <a:endParaRPr lang="fr-CA" noProof="1"/>
+          </a:p>
+        </p:txBody>
+      </p:sp>
+      <p:sp>
+        <p:nvSpPr>
+          <p:cNvPr id="18" name="Can 17">
+            <a:extLst>
+              <a:ext uri="{FF2B5EF4-FFF2-40B4-BE49-F238E27FC236}">
+                <a16:creationId xmlns:a16="http://schemas.microsoft.com/office/drawing/2014/main" id="{F427A5EA-02BB-0424-409F-173EB38F2ACF}"/>
+              </a:ext>
+            </a:extLst>
+          </p:cNvPr>
+          <p:cNvSpPr/>
+          <p:nvPr/>
+        </p:nvSpPr>
+        <p:spPr>
+          <a:xfrm>
+            <a:off x="5786082" y="6293801"/>
+            <a:ext cx="572812" cy="411381"/>
+          </a:xfrm>
+          <a:prstGeom prst="can">
+            <a:avLst/>
+          </a:prstGeom>
+        </p:spPr>
+        <p:style>
+          <a:lnRef idx="2">
+            <a:schemeClr val="accent2"/>
+          </a:lnRef>
+          <a:fillRef idx="1">
+            <a:schemeClr val="lt1"/>
+          </a:fillRef>
+          <a:effectRef idx="0">
+            <a:schemeClr val="accent2"/>
+          </a:effectRef>
+          <a:fontRef idx="minor">
+            <a:schemeClr val="dk1"/>
+          </a:fontRef>
+        </p:style>
+        <p:txBody>
+          <a:bodyPr rtlCol="0" anchor="ctr"/>
+          <a:lstStyle/>
+          <a:p>
+            <a:pPr algn="ctr"/>
+            <a:r>
+              <a:rPr lang="fr-CA" sz="1400" noProof="1"/>
+              <a:t>Excel</a:t>
+            </a:r>
+          </a:p>
+        </p:txBody>
+      </p:sp>
+      <p:sp>
+        <p:nvSpPr>
+          <p:cNvPr id="19" name="Can 18">
+            <a:extLst>
+              <a:ext uri="{FF2B5EF4-FFF2-40B4-BE49-F238E27FC236}">
+                <a16:creationId xmlns:a16="http://schemas.microsoft.com/office/drawing/2014/main" id="{58B64E3F-5567-DFDC-A147-92E64274BBB5}"/>
+              </a:ext>
+            </a:extLst>
+          </p:cNvPr>
+          <p:cNvSpPr/>
+          <p:nvPr/>
+        </p:nvSpPr>
+        <p:spPr>
+          <a:xfrm>
+            <a:off x="3749316" y="6293801"/>
+            <a:ext cx="572812" cy="411381"/>
+          </a:xfrm>
+          <a:prstGeom prst="can">
+            <a:avLst/>
+          </a:prstGeom>
+        </p:spPr>
+        <p:style>
+          <a:lnRef idx="2">
+            <a:schemeClr val="accent2"/>
+          </a:lnRef>
+          <a:fillRef idx="1">
+            <a:schemeClr val="lt1"/>
+          </a:fillRef>
+          <a:effectRef idx="0">
+            <a:schemeClr val="accent2"/>
+          </a:effectRef>
+          <a:fontRef idx="minor">
+            <a:schemeClr val="dk1"/>
+          </a:fontRef>
+        </p:style>
+        <p:txBody>
+          <a:bodyPr rtlCol="0" anchor="ctr"/>
+          <a:lstStyle/>
+          <a:p>
+            <a:pPr algn="ctr"/>
+            <a:r>
+              <a:rPr lang="fr-CA" sz="1400" noProof="1"/>
+              <a:t>csv</a:t>
+            </a:r>
+          </a:p>
+        </p:txBody>
+      </p:sp>
+      <p:sp>
+        <p:nvSpPr>
+          <p:cNvPr id="20" name="Can 19">
+            <a:extLst>
+              <a:ext uri="{FF2B5EF4-FFF2-40B4-BE49-F238E27FC236}">
+                <a16:creationId xmlns:a16="http://schemas.microsoft.com/office/drawing/2014/main" id="{2729CFC4-8A07-D2C8-B08B-352FCFA3BAF1}"/>
+              </a:ext>
+            </a:extLst>
+          </p:cNvPr>
+          <p:cNvSpPr/>
+          <p:nvPr/>
+        </p:nvSpPr>
+        <p:spPr>
+          <a:xfrm>
+            <a:off x="4809378" y="6292323"/>
+            <a:ext cx="572812" cy="411381"/>
+          </a:xfrm>
+          <a:prstGeom prst="can">
+            <a:avLst/>
+          </a:prstGeom>
+        </p:spPr>
+        <p:style>
+          <a:lnRef idx="2">
+            <a:schemeClr val="accent2"/>
+          </a:lnRef>
+          <a:fillRef idx="1">
+            <a:schemeClr val="lt1"/>
+          </a:fillRef>
+          <a:effectRef idx="0">
+            <a:schemeClr val="accent2"/>
+          </a:effectRef>
+          <a:fontRef idx="minor">
+            <a:schemeClr val="dk1"/>
+          </a:fontRef>
+        </p:style>
+        <p:txBody>
+          <a:bodyPr rtlCol="0" anchor="ctr"/>
+          <a:lstStyle/>
+          <a:p>
+            <a:pPr algn="ctr"/>
+            <a:r>
+              <a:rPr lang="fr-CA" sz="1400" noProof="1"/>
+              <a:t>txt</a:t>
+            </a:r>
+          </a:p>
+        </p:txBody>
+      </p:sp>
+      <p:sp>
+        <p:nvSpPr>
+          <p:cNvPr id="21" name="Can 20">
+            <a:extLst>
+              <a:ext uri="{FF2B5EF4-FFF2-40B4-BE49-F238E27FC236}">
+                <a16:creationId xmlns:a16="http://schemas.microsoft.com/office/drawing/2014/main" id="{D9B0DE16-FD1E-172D-603B-626946D80495}"/>
+              </a:ext>
+            </a:extLst>
+          </p:cNvPr>
+          <p:cNvSpPr/>
+          <p:nvPr/>
+        </p:nvSpPr>
+        <p:spPr>
+          <a:xfrm>
+            <a:off x="6883613" y="6309045"/>
+            <a:ext cx="572812" cy="411381"/>
+          </a:xfrm>
+          <a:prstGeom prst="can">
+            <a:avLst/>
+          </a:prstGeom>
+        </p:spPr>
+        <p:style>
+          <a:lnRef idx="2">
+            <a:schemeClr val="accent2"/>
+          </a:lnRef>
+          <a:fillRef idx="1">
+            <a:schemeClr val="lt1"/>
+          </a:fillRef>
+          <a:effectRef idx="0">
+            <a:schemeClr val="accent2"/>
+          </a:effectRef>
+          <a:fontRef idx="minor">
+            <a:schemeClr val="dk1"/>
+          </a:fontRef>
+        </p:style>
+        <p:txBody>
+          <a:bodyPr rtlCol="0" anchor="ctr"/>
+          <a:lstStyle/>
+          <a:p>
+            <a:pPr algn="ctr"/>
+            <a:r>
+              <a:rPr lang="fr-CA" sz="1400" noProof="1"/>
+              <a:t>c3d</a:t>
+            </a:r>
+          </a:p>
+        </p:txBody>
+      </p:sp>
+      <p:sp>
+        <p:nvSpPr>
+          <p:cNvPr id="23" name="Can 22">
+            <a:extLst>
+              <a:ext uri="{FF2B5EF4-FFF2-40B4-BE49-F238E27FC236}">
+                <a16:creationId xmlns:a16="http://schemas.microsoft.com/office/drawing/2014/main" id="{961FC736-1822-89C8-B6A5-7C6B59D030DF}"/>
+              </a:ext>
+            </a:extLst>
+          </p:cNvPr>
+          <p:cNvSpPr/>
+          <p:nvPr/>
+        </p:nvSpPr>
+        <p:spPr>
+          <a:xfrm>
+            <a:off x="8492497" y="6292322"/>
+            <a:ext cx="688987" cy="411381"/>
+          </a:xfrm>
+          <a:prstGeom prst="can">
+            <a:avLst/>
+          </a:prstGeom>
+        </p:spPr>
+        <p:style>
+          <a:lnRef idx="2">
+            <a:schemeClr val="accent2"/>
+          </a:lnRef>
+          <a:fillRef idx="1">
+            <a:schemeClr val="lt1"/>
+          </a:fillRef>
+          <a:effectRef idx="0">
+            <a:schemeClr val="accent2"/>
+          </a:effectRef>
+          <a:fontRef idx="minor">
+            <a:schemeClr val="dk1"/>
+          </a:fontRef>
+        </p:style>
+        <p:txBody>
+          <a:bodyPr rtlCol="0" anchor="ctr"/>
+          <a:lstStyle/>
+          <a:p>
+            <a:pPr algn="ctr"/>
+            <a:r>
+              <a:rPr lang="fr-CA" sz="1400" noProof="1"/>
+              <a:t>ktk.zip</a:t>
+            </a:r>
+          </a:p>
+        </p:txBody>
+      </p:sp>
+      <p:sp>
+        <p:nvSpPr>
+          <p:cNvPr id="24" name="Rectangle 23">
+            <a:extLst>
+              <a:ext uri="{FF2B5EF4-FFF2-40B4-BE49-F238E27FC236}">
+                <a16:creationId xmlns:a16="http://schemas.microsoft.com/office/drawing/2014/main" id="{D6146D44-AA6B-1F60-66F0-D96D3507C6F1}"/>
+              </a:ext>
+            </a:extLst>
+          </p:cNvPr>
+          <p:cNvSpPr/>
+          <p:nvPr/>
+        </p:nvSpPr>
+        <p:spPr>
+          <a:xfrm>
+            <a:off x="3749317" y="5547282"/>
+            <a:ext cx="2676053" cy="411382"/>
+          </a:xfrm>
+          <a:prstGeom prst="rect">
+            <a:avLst/>
+          </a:prstGeom>
+        </p:spPr>
+        <p:style>
+          <a:lnRef idx="2">
+            <a:schemeClr val="accent2"/>
+          </a:lnRef>
+          <a:fillRef idx="1">
+            <a:schemeClr val="lt1"/>
+          </a:fillRef>
+          <a:effectRef idx="0">
+            <a:schemeClr val="accent2"/>
+          </a:effectRef>
+          <a:fontRef idx="minor">
+            <a:schemeClr val="dk1"/>
+          </a:fontRef>
+        </p:style>
+        <p:txBody>
+          <a:bodyPr rtlCol="0" anchor="ctr"/>
+          <a:lstStyle/>
+          <a:p>
+            <a:pPr marL="171450" indent="-171450">
+              <a:buFontTx/>
+              <a:buChar char="-"/>
+            </a:pPr>
+            <a:r>
+              <a:rPr lang="fr-CA" sz="1400" noProof="1"/>
+              <a:t>pd.DataFrame.to_csv()</a:t>
+            </a:r>
+          </a:p>
+          <a:p>
+            <a:pPr marL="171450" indent="-171450">
+              <a:buFontTx/>
+              <a:buChar char="-"/>
+            </a:pPr>
+            <a:r>
+              <a:rPr lang="fr-CA" sz="1400" noProof="1"/>
+              <a:t>pd.DataFrame.to_excel()</a:t>
+            </a:r>
+          </a:p>
+        </p:txBody>
+      </p:sp>
+      <p:sp>
+        <p:nvSpPr>
+          <p:cNvPr id="25" name="Rectangle 24">
+            <a:extLst>
+              <a:ext uri="{FF2B5EF4-FFF2-40B4-BE49-F238E27FC236}">
+                <a16:creationId xmlns:a16="http://schemas.microsoft.com/office/drawing/2014/main" id="{A3D5B599-F7E3-2640-C0DF-74F5078BE9D7}"/>
+              </a:ext>
+            </a:extLst>
+          </p:cNvPr>
+          <p:cNvSpPr/>
+          <p:nvPr/>
+        </p:nvSpPr>
+        <p:spPr>
+          <a:xfrm>
+            <a:off x="6341712" y="4084013"/>
+            <a:ext cx="1656614" cy="411381"/>
+          </a:xfrm>
+          <a:prstGeom prst="rect">
+            <a:avLst/>
+          </a:prstGeom>
+        </p:spPr>
+        <p:style>
+          <a:lnRef idx="2">
+            <a:schemeClr val="accent2"/>
+          </a:lnRef>
+          <a:fillRef idx="1">
+            <a:schemeClr val="lt1"/>
+          </a:fillRef>
+          <a:effectRef idx="0">
+            <a:schemeClr val="accent2"/>
+          </a:effectRef>
+          <a:fontRef idx="minor">
+            <a:schemeClr val="dk1"/>
+          </a:fontRef>
+        </p:style>
+        <p:txBody>
+          <a:bodyPr rtlCol="0" anchor="ctr"/>
+          <a:lstStyle/>
+          <a:p>
+            <a:pPr algn="ctr"/>
+            <a:r>
+              <a:rPr lang="fr-CA" sz="1400" noProof="1"/>
+              <a:t>ktk.write_c3d()</a:t>
+            </a:r>
+          </a:p>
+        </p:txBody>
+      </p:sp>
+      <p:sp>
+        <p:nvSpPr>
+          <p:cNvPr id="26" name="Rectangle 25">
+            <a:extLst>
+              <a:ext uri="{FF2B5EF4-FFF2-40B4-BE49-F238E27FC236}">
+                <a16:creationId xmlns:a16="http://schemas.microsoft.com/office/drawing/2014/main" id="{0862765E-1319-D885-9E12-A605253C9693}"/>
+              </a:ext>
+            </a:extLst>
+          </p:cNvPr>
+          <p:cNvSpPr/>
+          <p:nvPr/>
+        </p:nvSpPr>
+        <p:spPr>
+          <a:xfrm>
+            <a:off x="8360316" y="4081084"/>
+            <a:ext cx="962262" cy="410493"/>
+          </a:xfrm>
+          <a:prstGeom prst="rect">
+            <a:avLst/>
+          </a:prstGeom>
+        </p:spPr>
+        <p:style>
+          <a:lnRef idx="2">
+            <a:schemeClr val="accent2"/>
+          </a:lnRef>
+          <a:fillRef idx="1">
+            <a:schemeClr val="lt1"/>
+          </a:fillRef>
+          <a:effectRef idx="0">
+            <a:schemeClr val="accent2"/>
+          </a:effectRef>
+          <a:fontRef idx="minor">
+            <a:schemeClr val="dk1"/>
+          </a:fontRef>
+        </p:style>
+        <p:txBody>
+          <a:bodyPr rtlCol="0" anchor="ctr"/>
+          <a:lstStyle/>
+          <a:p>
+            <a:pPr algn="ctr"/>
+            <a:r>
+              <a:rPr lang="fr-CA" sz="1400" noProof="1"/>
+              <a:t>ktk.save()</a:t>
+            </a:r>
+          </a:p>
+        </p:txBody>
+      </p:sp>
+      <p:sp>
+        <p:nvSpPr>
+          <p:cNvPr id="27" name="Rectangle 26">
+            <a:extLst>
+              <a:ext uri="{FF2B5EF4-FFF2-40B4-BE49-F238E27FC236}">
+                <a16:creationId xmlns:a16="http://schemas.microsoft.com/office/drawing/2014/main" id="{5D9ED954-61A6-016E-95AB-47C2D6440924}"/>
+              </a:ext>
+            </a:extLst>
+          </p:cNvPr>
+          <p:cNvSpPr/>
+          <p:nvPr/>
+        </p:nvSpPr>
+        <p:spPr>
+          <a:xfrm>
+            <a:off x="3749317" y="4863870"/>
+            <a:ext cx="2676054" cy="414335"/>
+          </a:xfrm>
+          <a:prstGeom prst="rect">
+            <a:avLst/>
+          </a:prstGeom>
+        </p:spPr>
+        <p:style>
+          <a:lnRef idx="2">
+            <a:schemeClr val="accent2"/>
+          </a:lnRef>
+          <a:fillRef idx="1">
+            <a:schemeClr val="lt1"/>
+          </a:fillRef>
+          <a:effectRef idx="0">
+            <a:schemeClr val="accent2"/>
+          </a:effectRef>
+          <a:fontRef idx="minor">
+            <a:schemeClr val="dk1"/>
+          </a:fontRef>
+        </p:style>
+        <p:txBody>
+          <a:bodyPr rtlCol="0" anchor="ctr"/>
+          <a:lstStyle/>
+          <a:p>
+            <a:r>
+              <a:rPr lang="fr-CA" sz="1400" noProof="1"/>
+              <a:t>ktk.TimeSeries.to_dataframe()</a:t>
+            </a:r>
+          </a:p>
+        </p:txBody>
+      </p:sp>
+      <p:sp>
+        <p:nvSpPr>
+          <p:cNvPr id="28" name="Rectangle 27">
+            <a:extLst>
+              <a:ext uri="{FF2B5EF4-FFF2-40B4-BE49-F238E27FC236}">
+                <a16:creationId xmlns:a16="http://schemas.microsoft.com/office/drawing/2014/main" id="{DEA25544-80E3-ECBC-A5F4-ADBCD8A52805}"/>
+              </a:ext>
+            </a:extLst>
+          </p:cNvPr>
+          <p:cNvSpPr/>
+          <p:nvPr/>
+        </p:nvSpPr>
+        <p:spPr>
+          <a:xfrm>
+            <a:off x="169932" y="984716"/>
+            <a:ext cx="3182378" cy="3759161"/>
+          </a:xfrm>
+          <a:prstGeom prst="rect">
+            <a:avLst/>
+          </a:prstGeom>
+        </p:spPr>
+        <p:style>
+          <a:lnRef idx="2">
+            <a:schemeClr val="accent1"/>
+          </a:lnRef>
+          <a:fillRef idx="1">
+            <a:schemeClr val="lt1"/>
+          </a:fillRef>
+          <a:effectRef idx="0">
+            <a:schemeClr val="accent1"/>
+          </a:effectRef>
+          <a:fontRef idx="minor">
+            <a:schemeClr val="dk1"/>
+          </a:fontRef>
+        </p:style>
+        <p:txBody>
+          <a:bodyPr rtlCol="0" anchor="ctr"/>
+          <a:lstStyle/>
+          <a:p>
+            <a:r>
+              <a:rPr lang="fr-CA" sz="1400" b="1" noProof="1">
+                <a:solidFill>
+                  <a:schemeClr val="tx1"/>
+                </a:solidFill>
+              </a:rPr>
+              <a:t>Filtering:</a:t>
+            </a:r>
+          </a:p>
+          <a:p>
+            <a:pPr marL="171450" indent="-171450">
+              <a:buFontTx/>
+              <a:buChar char="-"/>
+            </a:pPr>
+            <a:r>
+              <a:rPr lang="fr-CA" sz="1400" noProof="1"/>
+              <a:t>ktk.filters.butter()</a:t>
+            </a:r>
+          </a:p>
+          <a:p>
+            <a:pPr marL="171450" indent="-171450">
+              <a:buFontTx/>
+              <a:buChar char="-"/>
+            </a:pPr>
+            <a:r>
+              <a:rPr lang="fr-CA" sz="1400" noProof="1"/>
+              <a:t>ktk.filters.smooth()</a:t>
+            </a:r>
+          </a:p>
+          <a:p>
+            <a:pPr marL="171450" indent="-171450">
+              <a:buFontTx/>
+              <a:buChar char="-"/>
+            </a:pPr>
+            <a:r>
+              <a:rPr lang="fr-CA" sz="1400" noProof="1"/>
+              <a:t>ktk.filters.deriv()</a:t>
+            </a:r>
+          </a:p>
+          <a:p>
+            <a:r>
+              <a:rPr lang="fr-CA" sz="1400" b="1" noProof="1">
+                <a:solidFill>
+                  <a:schemeClr val="tx1"/>
+                </a:solidFill>
+              </a:rPr>
+              <a:t>TimeSeries operations:</a:t>
+            </a:r>
+          </a:p>
+          <a:p>
+            <a:pPr marL="171450" indent="-171450">
+              <a:buFontTx/>
+              <a:buChar char="-"/>
+            </a:pPr>
+            <a:r>
+              <a:rPr lang="fr-CA" sz="1400" noProof="1"/>
+              <a:t>TimeSeries.add_event()</a:t>
+            </a:r>
+          </a:p>
+          <a:p>
+            <a:pPr marL="171450" indent="-171450">
+              <a:buFontTx/>
+              <a:buChar char="-"/>
+            </a:pPr>
+            <a:r>
+              <a:rPr lang="fr-CA" sz="1400" noProof="1"/>
+              <a:t>TimeSeries.merge()</a:t>
+            </a:r>
+          </a:p>
+          <a:p>
+            <a:pPr marL="171450" indent="-171450">
+              <a:buFontTx/>
+              <a:buChar char="-"/>
+            </a:pPr>
+            <a:r>
+              <a:rPr lang="fr-CA" sz="1400" noProof="1"/>
+              <a:t>TimeSeries.get_subset()</a:t>
+            </a:r>
+          </a:p>
+          <a:p>
+            <a:pPr marL="171450" indent="-171450">
+              <a:buFontTx/>
+              <a:buChar char="-"/>
+            </a:pPr>
+            <a:r>
+              <a:rPr lang="fr-CA" sz="1400" noProof="1"/>
+              <a:t>TimeSeries.get_ts_before_event()</a:t>
+            </a:r>
+          </a:p>
+          <a:p>
+            <a:pPr marL="171450" indent="-171450">
+              <a:buFontTx/>
+              <a:buChar char="-"/>
+            </a:pPr>
+            <a:r>
+              <a:rPr lang="fr-CA" sz="1400" noProof="1"/>
+              <a:t>TimeSeries.ui_edit_events()</a:t>
+            </a:r>
+          </a:p>
+          <a:p>
+            <a:r>
+              <a:rPr lang="fr-CA" sz="1400" b="1" noProof="1">
+                <a:solidFill>
+                  <a:schemeClr val="tx1"/>
+                </a:solidFill>
+              </a:rPr>
+              <a:t>Cycles:</a:t>
+            </a:r>
+          </a:p>
+          <a:p>
+            <a:pPr marL="171450" indent="-171450">
+              <a:buFontTx/>
+              <a:buChar char="-"/>
+            </a:pPr>
+            <a:r>
+              <a:rPr lang="fr-CA" sz="1400" noProof="1"/>
+              <a:t>ktk.cycles.detect_cycles()</a:t>
+            </a:r>
+          </a:p>
+          <a:p>
+            <a:pPr marL="171450" indent="-171450">
+              <a:buFontTx/>
+              <a:buChar char="-"/>
+            </a:pPr>
+            <a:r>
+              <a:rPr lang="fr-CA" sz="1400" noProof="1"/>
+              <a:t>ktk.cycles.time_normalize()</a:t>
+            </a:r>
+          </a:p>
+          <a:p>
+            <a:r>
+              <a:rPr lang="fr-CA" sz="1400" b="1" noProof="1">
+                <a:solidFill>
+                  <a:schemeClr val="tx1"/>
+                </a:solidFill>
+              </a:rPr>
+              <a:t>Kinematics:</a:t>
+            </a:r>
+          </a:p>
+          <a:p>
+            <a:pPr marL="171450" indent="-171450">
+              <a:buFontTx/>
+              <a:buChar char="-"/>
+            </a:pPr>
+            <a:r>
+              <a:rPr lang="fr-CA" sz="1400" noProof="1"/>
+              <a:t>ktk.kinematics.create_cluster()</a:t>
+            </a:r>
+          </a:p>
+          <a:p>
+            <a:pPr marL="171450" indent="-171450">
+              <a:buFontTx/>
+              <a:buChar char="-"/>
+            </a:pPr>
+            <a:r>
+              <a:rPr lang="fr-CA" sz="1400" noProof="1"/>
+              <a:t>ktk.kinematics.expand_cluster()</a:t>
+            </a:r>
+          </a:p>
+          <a:p>
+            <a:pPr marL="171450" indent="-171450">
+              <a:buFontTx/>
+              <a:buChar char="-"/>
+            </a:pPr>
+            <a:r>
+              <a:rPr lang="fr-CA" sz="1400" noProof="1"/>
+              <a:t>ktk.kinematics.track_cluster()</a:t>
+            </a:r>
+          </a:p>
+        </p:txBody>
+      </p:sp>
+      <p:sp>
+        <p:nvSpPr>
+          <p:cNvPr id="30" name="Rectangle 29">
+            <a:extLst>
+              <a:ext uri="{FF2B5EF4-FFF2-40B4-BE49-F238E27FC236}">
+                <a16:creationId xmlns:a16="http://schemas.microsoft.com/office/drawing/2014/main" id="{08CBDFFD-33A0-857D-A29B-2033A14B19B4}"/>
+              </a:ext>
+            </a:extLst>
+          </p:cNvPr>
+          <p:cNvSpPr/>
+          <p:nvPr/>
+        </p:nvSpPr>
+        <p:spPr>
+          <a:xfrm>
+            <a:off x="165900" y="5142919"/>
+            <a:ext cx="3186411" cy="1309704"/>
+          </a:xfrm>
+          <a:prstGeom prst="rect">
+            <a:avLst/>
+          </a:prstGeom>
+        </p:spPr>
+        <p:style>
+          <a:lnRef idx="2">
+            <a:schemeClr val="accent1"/>
+          </a:lnRef>
+          <a:fillRef idx="1">
+            <a:schemeClr val="lt1"/>
+          </a:fillRef>
+          <a:effectRef idx="0">
+            <a:schemeClr val="accent1"/>
+          </a:effectRef>
+          <a:fontRef idx="minor">
+            <a:schemeClr val="dk1"/>
+          </a:fontRef>
+        </p:style>
+        <p:txBody>
+          <a:bodyPr rtlCol="0" anchor="ctr"/>
+          <a:lstStyle/>
+          <a:p>
+            <a:r>
+              <a:rPr lang="fr-CA" sz="1400" b="1" noProof="1">
+                <a:solidFill>
+                  <a:schemeClr val="tx1"/>
+                </a:solidFill>
+              </a:rPr>
+              <a:t>Geometrical operations:</a:t>
+            </a:r>
+          </a:p>
+          <a:p>
+            <a:pPr marL="171450" indent="-171450">
+              <a:buFontTx/>
+              <a:buChar char="-"/>
+            </a:pPr>
+            <a:r>
+              <a:rPr lang="fr-CA" sz="1400" noProof="1"/>
+              <a:t>ktk.geometry.create_frames()</a:t>
+            </a:r>
+          </a:p>
+          <a:p>
+            <a:pPr marL="171450" indent="-171450">
+              <a:buFontTx/>
+              <a:buChar char="-"/>
+            </a:pPr>
+            <a:r>
+              <a:rPr lang="fr-CA" sz="1400" noProof="1"/>
+              <a:t>ktk.geometry.get_local_coordinates()</a:t>
+            </a:r>
+          </a:p>
+          <a:p>
+            <a:pPr marL="171450" indent="-171450">
+              <a:buFontTx/>
+              <a:buChar char="-"/>
+            </a:pPr>
+            <a:r>
+              <a:rPr lang="fr-CA" sz="1400" noProof="1"/>
+              <a:t>ktk.geometry.get_global_coordinates()</a:t>
+            </a:r>
+          </a:p>
+          <a:p>
+            <a:pPr marL="171450" indent="-171450">
+              <a:buFontTx/>
+              <a:buChar char="-"/>
+            </a:pPr>
+            <a:r>
+              <a:rPr lang="fr-CA" sz="1400" noProof="1"/>
+              <a:t>ktk.geometry.get_angles()</a:t>
+            </a:r>
+          </a:p>
+        </p:txBody>
+      </p:sp>
+      <p:sp>
+        <p:nvSpPr>
+          <p:cNvPr id="180" name="Rectangle 179">
+            <a:extLst>
+              <a:ext uri="{FF2B5EF4-FFF2-40B4-BE49-F238E27FC236}">
+                <a16:creationId xmlns:a16="http://schemas.microsoft.com/office/drawing/2014/main" id="{C2BB8645-98DA-B890-B980-D27F6C01FD33}"/>
+              </a:ext>
+            </a:extLst>
+          </p:cNvPr>
+          <p:cNvSpPr/>
+          <p:nvPr/>
+        </p:nvSpPr>
+        <p:spPr>
+          <a:xfrm>
+            <a:off x="169932" y="581428"/>
+            <a:ext cx="3182378" cy="411381"/>
+          </a:xfrm>
+          <a:prstGeom prst="rect">
+            <a:avLst/>
+          </a:prstGeom>
+          <a:ln/>
+        </p:spPr>
+        <p:style>
+          <a:lnRef idx="2">
+            <a:schemeClr val="accent1">
+              <a:shade val="50000"/>
+            </a:schemeClr>
+          </a:lnRef>
+          <a:fillRef idx="1">
+            <a:schemeClr val="accent1"/>
+          </a:fillRef>
+          <a:effectRef idx="0">
+            <a:schemeClr val="accent1"/>
+          </a:effectRef>
+          <a:fontRef idx="minor">
+            <a:schemeClr val="lt1"/>
+          </a:fontRef>
+        </p:style>
+        <p:txBody>
+          <a:bodyPr rtlCol="0" anchor="ctr"/>
+          <a:lstStyle/>
+          <a:p>
+            <a:pPr algn="ctr"/>
+            <a:r>
+              <a:rPr lang="fr-CA" sz="1400" noProof="1">
+                <a:solidFill>
+                  <a:schemeClr val="bg1"/>
+                </a:solidFill>
+              </a:rPr>
+              <a:t>Examples of operations on TimeSeries</a:t>
+            </a:r>
+          </a:p>
+        </p:txBody>
+      </p:sp>
+      <p:sp>
+        <p:nvSpPr>
+          <p:cNvPr id="183" name="Rectangle 182">
+            <a:extLst>
+              <a:ext uri="{FF2B5EF4-FFF2-40B4-BE49-F238E27FC236}">
+                <a16:creationId xmlns:a16="http://schemas.microsoft.com/office/drawing/2014/main" id="{6954DF3B-3132-C039-0C84-5F2FF7F1EEFF}"/>
+              </a:ext>
+            </a:extLst>
+          </p:cNvPr>
+          <p:cNvSpPr/>
+          <p:nvPr/>
+        </p:nvSpPr>
+        <p:spPr>
+          <a:xfrm>
+            <a:off x="169932" y="4743877"/>
+            <a:ext cx="3182379" cy="411381"/>
+          </a:xfrm>
+          <a:prstGeom prst="rect">
+            <a:avLst/>
+          </a:prstGeom>
+          <a:ln/>
+        </p:spPr>
+        <p:style>
+          <a:lnRef idx="2">
+            <a:schemeClr val="accent1">
+              <a:shade val="50000"/>
+            </a:schemeClr>
+          </a:lnRef>
+          <a:fillRef idx="1">
+            <a:schemeClr val="accent1"/>
+          </a:fillRef>
+          <a:effectRef idx="0">
+            <a:schemeClr val="accent1"/>
+          </a:effectRef>
+          <a:fontRef idx="minor">
+            <a:schemeClr val="lt1"/>
+          </a:fontRef>
+        </p:style>
+        <p:txBody>
+          <a:bodyPr rtlCol="0" anchor="ctr"/>
+          <a:lstStyle/>
+          <a:p>
+            <a:pPr algn="ctr"/>
+            <a:r>
+              <a:rPr lang="fr-CA" sz="1400" noProof="1">
+                <a:solidFill>
+                  <a:schemeClr val="bg1"/>
+                </a:solidFill>
+              </a:rPr>
+              <a:t>Examples of operations on TimeSeries' data attribute</a:t>
+            </a:r>
+          </a:p>
+        </p:txBody>
+      </p:sp>
+      <p:sp>
+        <p:nvSpPr>
+          <p:cNvPr id="31" name="Rectangle 30">
+            <a:extLst>
+              <a:ext uri="{FF2B5EF4-FFF2-40B4-BE49-F238E27FC236}">
+                <a16:creationId xmlns:a16="http://schemas.microsoft.com/office/drawing/2014/main" id="{27F6535F-3713-95D9-F890-474C7B6B46D2}"/>
+              </a:ext>
+            </a:extLst>
+          </p:cNvPr>
+          <p:cNvSpPr/>
+          <p:nvPr/>
+        </p:nvSpPr>
+        <p:spPr>
+          <a:xfrm>
+            <a:off x="9677863" y="2634546"/>
+            <a:ext cx="2330717" cy="2067748"/>
+          </a:xfrm>
+          <a:prstGeom prst="rect">
+            <a:avLst/>
+          </a:prstGeom>
+        </p:spPr>
+        <p:style>
+          <a:lnRef idx="2">
+            <a:schemeClr val="accent1"/>
+          </a:lnRef>
+          <a:fillRef idx="1">
+            <a:schemeClr val="lt1"/>
+          </a:fillRef>
+          <a:effectRef idx="0">
+            <a:schemeClr val="accent1"/>
+          </a:effectRef>
+          <a:fontRef idx="minor">
+            <a:schemeClr val="dk1"/>
+          </a:fontRef>
+        </p:style>
+        <p:txBody>
+          <a:bodyPr rtlCol="0" anchor="ctr"/>
+          <a:lstStyle/>
+          <a:p>
+            <a:r>
+              <a:rPr lang="fr-CA" sz="1400" b="1" noProof="1">
+                <a:solidFill>
+                  <a:schemeClr val="tx1"/>
+                </a:solidFill>
+              </a:rPr>
+              <a:t>Plot with events using Matplotlib:</a:t>
+            </a:r>
+          </a:p>
+          <a:p>
+            <a:pPr marL="171450" indent="-171450">
+              <a:buFontTx/>
+              <a:buChar char="-"/>
+            </a:pPr>
+            <a:r>
+              <a:rPr lang="fr-CA" sz="1400" noProof="1"/>
+              <a:t>ktk.TimeSeries.plot()</a:t>
+            </a:r>
+          </a:p>
+          <a:p>
+            <a:pPr marL="171450" indent="-171450">
+              <a:buFontTx/>
+              <a:buChar char="-"/>
+            </a:pPr>
+            <a:endParaRPr lang="fr-CA" sz="1400" noProof="1"/>
+          </a:p>
+          <a:p>
+            <a:r>
+              <a:rPr lang="fr-CA" sz="1400" b="1" noProof="1">
+                <a:solidFill>
+                  <a:schemeClr val="tx1"/>
+                </a:solidFill>
+              </a:rPr>
+              <a:t>Interconnected, animated markers in a 3D window:</a:t>
+            </a:r>
+          </a:p>
+          <a:p>
+            <a:pPr marL="171450" indent="-171450">
+              <a:buFontTx/>
+              <a:buChar char="-"/>
+            </a:pPr>
+            <a:r>
+              <a:rPr lang="fr-CA" sz="1400" noProof="1"/>
+              <a:t>ktk.Player()</a:t>
+            </a:r>
+          </a:p>
+        </p:txBody>
+      </p:sp>
+      <p:sp>
+        <p:nvSpPr>
+          <p:cNvPr id="185" name="Rectangle 184">
+            <a:extLst>
+              <a:ext uri="{FF2B5EF4-FFF2-40B4-BE49-F238E27FC236}">
+                <a16:creationId xmlns:a16="http://schemas.microsoft.com/office/drawing/2014/main" id="{219D6709-FB59-0256-B374-7252F93C8173}"/>
+              </a:ext>
+            </a:extLst>
+          </p:cNvPr>
+          <p:cNvSpPr/>
+          <p:nvPr/>
+        </p:nvSpPr>
+        <p:spPr>
+          <a:xfrm>
+            <a:off x="9677862" y="2223164"/>
+            <a:ext cx="2330718" cy="411381"/>
+          </a:xfrm>
+          <a:prstGeom prst="rect">
+            <a:avLst/>
+          </a:prstGeom>
+          <a:ln/>
+        </p:spPr>
+        <p:style>
+          <a:lnRef idx="2">
+            <a:schemeClr val="accent1">
+              <a:shade val="50000"/>
+            </a:schemeClr>
+          </a:lnRef>
+          <a:fillRef idx="1">
+            <a:schemeClr val="accent1"/>
+          </a:fillRef>
+          <a:effectRef idx="0">
+            <a:schemeClr val="accent1"/>
+          </a:effectRef>
+          <a:fontRef idx="minor">
+            <a:schemeClr val="lt1"/>
+          </a:fontRef>
+        </p:style>
+        <p:txBody>
+          <a:bodyPr rtlCol="0" anchor="ctr"/>
+          <a:lstStyle/>
+          <a:p>
+            <a:pPr algn="ctr"/>
+            <a:r>
+              <a:rPr lang="fr-CA" sz="1400" noProof="1">
+                <a:solidFill>
+                  <a:schemeClr val="bg1"/>
+                </a:solidFill>
+              </a:rPr>
+              <a:t>Visualizing TimeSeries</a:t>
+            </a:r>
+          </a:p>
+        </p:txBody>
+      </p:sp>
+      <p:sp>
+        <p:nvSpPr>
+          <p:cNvPr id="3" name="Left-Right Arrow 2">
+            <a:extLst>
+              <a:ext uri="{FF2B5EF4-FFF2-40B4-BE49-F238E27FC236}">
+                <a16:creationId xmlns:a16="http://schemas.microsoft.com/office/drawing/2014/main" id="{AC10CF36-4310-38C7-F868-8F43102AC988}"/>
+              </a:ext>
+            </a:extLst>
+          </p:cNvPr>
+          <p:cNvSpPr/>
+          <p:nvPr/>
+        </p:nvSpPr>
+        <p:spPr>
+          <a:xfrm>
+            <a:off x="3352311" y="3363514"/>
+            <a:ext cx="394641" cy="261718"/>
+          </a:xfrm>
+          <a:prstGeom prst="leftRightArrow">
+            <a:avLst/>
+          </a:prstGeom>
+          <a:solidFill>
+            <a:schemeClr val="accent1">
+              <a:lumMod val="60000"/>
+              <a:lumOff val="40000"/>
+            </a:schemeClr>
+          </a:solidFill>
+          <a:ln w="6350"/>
+        </p:spPr>
+        <p:style>
+          <a:lnRef idx="2">
+            <a:schemeClr val="accent1">
+              <a:shade val="50000"/>
+            </a:schemeClr>
+          </a:lnRef>
+          <a:fillRef idx="1">
+            <a:schemeClr val="accent1"/>
+          </a:fillRef>
+          <a:effectRef idx="0">
+            <a:schemeClr val="accent1"/>
+          </a:effectRef>
+          <a:fontRef idx="minor">
+            <a:schemeClr val="lt1"/>
+          </a:fontRef>
+        </p:style>
+        <p:txBody>
+          <a:bodyPr rtlCol="0" anchor="ctr"/>
+          <a:lstStyle/>
+          <a:p>
+            <a:pPr algn="ctr"/>
+            <a:endParaRPr lang="fr-CA"/>
+          </a:p>
+        </p:txBody>
+      </p:sp>
+      <p:sp>
+        <p:nvSpPr>
+          <p:cNvPr id="12" name="Right Arrow 11">
+            <a:extLst>
+              <a:ext uri="{FF2B5EF4-FFF2-40B4-BE49-F238E27FC236}">
+                <a16:creationId xmlns:a16="http://schemas.microsoft.com/office/drawing/2014/main" id="{12FC4CCF-0BA5-A411-2D34-DA335B557AE0}"/>
+              </a:ext>
+            </a:extLst>
+          </p:cNvPr>
+          <p:cNvSpPr/>
+          <p:nvPr/>
+        </p:nvSpPr>
+        <p:spPr>
+          <a:xfrm>
+            <a:off x="9313662" y="3363515"/>
+            <a:ext cx="355286" cy="261718"/>
+          </a:xfrm>
+          <a:prstGeom prst="rightArrow">
+            <a:avLst/>
+          </a:prstGeom>
+          <a:solidFill>
+            <a:schemeClr val="accent1">
+              <a:lumMod val="60000"/>
+              <a:lumOff val="40000"/>
+            </a:schemeClr>
+          </a:solidFill>
+          <a:ln w="6350"/>
+        </p:spPr>
+        <p:style>
+          <a:lnRef idx="2">
+            <a:schemeClr val="accent1">
+              <a:shade val="50000"/>
+            </a:schemeClr>
+          </a:lnRef>
+          <a:fillRef idx="1">
+            <a:schemeClr val="accent1"/>
+          </a:fillRef>
+          <a:effectRef idx="0">
+            <a:schemeClr val="accent1"/>
+          </a:effectRef>
+          <a:fontRef idx="minor">
+            <a:schemeClr val="lt1"/>
+          </a:fontRef>
+        </p:style>
+        <p:txBody>
+          <a:bodyPr rtlCol="0" anchor="ctr"/>
+          <a:lstStyle/>
+          <a:p>
+            <a:pPr algn="ctr"/>
+            <a:endParaRPr lang="fr-CA"/>
+          </a:p>
+        </p:txBody>
+      </p:sp>
+      <p:sp>
+        <p:nvSpPr>
+          <p:cNvPr id="16" name="Rectangle 15">
+            <a:extLst>
+              <a:ext uri="{FF2B5EF4-FFF2-40B4-BE49-F238E27FC236}">
+                <a16:creationId xmlns:a16="http://schemas.microsoft.com/office/drawing/2014/main" id="{34BF4377-791D-3C58-A020-3458B37C76C7}"/>
+              </a:ext>
+            </a:extLst>
+          </p:cNvPr>
+          <p:cNvSpPr/>
+          <p:nvPr/>
+        </p:nvSpPr>
+        <p:spPr>
+          <a:xfrm>
+            <a:off x="3746952" y="3310597"/>
+            <a:ext cx="5566710" cy="414335"/>
+          </a:xfrm>
+          <a:prstGeom prst="rect">
+            <a:avLst/>
+          </a:prstGeom>
+        </p:spPr>
+        <p:style>
+          <a:lnRef idx="2">
+            <a:schemeClr val="accent1"/>
+          </a:lnRef>
+          <a:fillRef idx="1">
+            <a:schemeClr val="lt1"/>
+          </a:fillRef>
+          <a:effectRef idx="0">
+            <a:schemeClr val="accent1"/>
+          </a:effectRef>
+          <a:fontRef idx="minor">
+            <a:schemeClr val="dk1"/>
+          </a:fontRef>
+        </p:style>
+        <p:txBody>
+          <a:bodyPr rtlCol="0" anchor="ctr"/>
+          <a:lstStyle/>
+          <a:p>
+            <a:pPr algn="ctr"/>
+            <a:r>
+              <a:rPr lang="fr-CA" sz="1400" noProof="1"/>
+              <a:t>Working variables</a:t>
+            </a:r>
+          </a:p>
+        </p:txBody>
+      </p:sp>
+    </p:spTree>
+    <p:extLst>
+      <p:ext uri="{BB962C8B-B14F-4D97-AF65-F5344CB8AC3E}">
+        <p14:creationId xmlns:p14="http://schemas.microsoft.com/office/powerpoint/2010/main" val="827150360"/>
       </p:ext>
     </p:extLst>
   </p:cSld>
@@ -33798,8 +36196,8 @@
           </a:p>
         </p:txBody>
       </p:sp>
-      <mc:AlternateContent xmlns:mc="http://schemas.openxmlformats.org/markup-compatibility/2006">
-        <mc:Choice xmlns:a14="http://schemas.microsoft.com/office/drawing/2010/main" Requires="a14">
+      <mc:AlternateContent xmlns:mc="http://schemas.openxmlformats.org/markup-compatibility/2006" xmlns:a14="http://schemas.microsoft.com/office/drawing/2010/main">
+        <mc:Choice Requires="a14">
           <p:sp>
             <p:nvSpPr>
               <p:cNvPr id="5" name="TextBox 4">
@@ -33834,6 +36232,7 @@
                 </a:r>
               </a:p>
               <a:p>
+                <a:pPr/>
                 <a14:m>
                   <m:oMathPara xmlns:m="http://schemas.openxmlformats.org/officeDocument/2006/math">
                     <m:oMathParaPr>
@@ -33866,7 +36265,7 @@
             </p:txBody>
           </p:sp>
         </mc:Choice>
-        <mc:Fallback>
+        <mc:Fallback xmlns="">
           <p:sp>
             <p:nvSpPr>
               <p:cNvPr id="5" name="TextBox 4">
@@ -33911,8 +36310,8 @@
           </p:sp>
         </mc:Fallback>
       </mc:AlternateContent>
-      <mc:AlternateContent xmlns:mc="http://schemas.openxmlformats.org/markup-compatibility/2006">
-        <mc:Choice xmlns:a14="http://schemas.microsoft.com/office/drawing/2010/main" Requires="a14">
+      <mc:AlternateContent xmlns:mc="http://schemas.openxmlformats.org/markup-compatibility/2006" xmlns:a14="http://schemas.microsoft.com/office/drawing/2010/main">
+        <mc:Choice Requires="a14">
           <p:sp>
             <p:nvSpPr>
               <p:cNvPr id="6" name="TextBox 5">
@@ -33947,6 +36346,7 @@
                 </a:r>
               </a:p>
               <a:p>
+                <a:pPr/>
                 <a14:m>
                   <m:oMathPara xmlns:m="http://schemas.openxmlformats.org/officeDocument/2006/math">
                     <m:oMathParaPr>
@@ -33967,7 +36367,7 @@
             </p:txBody>
           </p:sp>
         </mc:Choice>
-        <mc:Fallback>
+        <mc:Fallback xmlns="">
           <p:sp>
             <p:nvSpPr>
               <p:cNvPr id="6" name="TextBox 5">
@@ -34012,8 +36412,8 @@
           </p:sp>
         </mc:Fallback>
       </mc:AlternateContent>
-      <mc:AlternateContent xmlns:mc="http://schemas.openxmlformats.org/markup-compatibility/2006">
-        <mc:Choice xmlns:a14="http://schemas.microsoft.com/office/drawing/2010/main" Requires="a14">
+      <mc:AlternateContent xmlns:mc="http://schemas.openxmlformats.org/markup-compatibility/2006" xmlns:a14="http://schemas.microsoft.com/office/drawing/2010/main">
+        <mc:Choice Requires="a14">
           <p:sp>
             <p:nvSpPr>
               <p:cNvPr id="7" name="TextBox 6">
@@ -34048,6 +36448,7 @@
                 </a:r>
               </a:p>
               <a:p>
+                <a:pPr/>
                 <a14:m>
                   <m:oMathPara xmlns:m="http://schemas.openxmlformats.org/officeDocument/2006/math">
                     <m:oMathParaPr>
@@ -34068,7 +36469,7 @@
             </p:txBody>
           </p:sp>
         </mc:Choice>
-        <mc:Fallback>
+        <mc:Fallback xmlns="">
           <p:sp>
             <p:nvSpPr>
               <p:cNvPr id="7" name="TextBox 6">

</xml_diff>